<commit_message>
Updated project files and folders again
</commit_message>
<xml_diff>
--- a/PresentationE/The-COVID-19-Impact-on-ABC's-Business.pptx
+++ b/PresentationE/The-COVID-19-Impact-on-ABC's-Business.pptx
@@ -6,40 +6,45 @@
     <p:sldMasterId id="2147483660" r:id="rId2"/>
   </p:sldMasterIdLst>
   <p:notesMasterIdLst>
-    <p:notesMasterId r:id="rId19"/>
+    <p:notesMasterId r:id="rId23"/>
   </p:notesMasterIdLst>
   <p:sldIdLst>
     <p:sldId id="266" r:id="rId3"/>
     <p:sldId id="257" r:id="rId4"/>
-    <p:sldId id="267" r:id="rId5"/>
+    <p:sldId id="286" r:id="rId5"/>
     <p:sldId id="259" r:id="rId6"/>
     <p:sldId id="268" r:id="rId7"/>
     <p:sldId id="269" r:id="rId8"/>
     <p:sldId id="262" r:id="rId9"/>
-    <p:sldId id="270" r:id="rId10"/>
-    <p:sldId id="271" r:id="rId11"/>
-    <p:sldId id="277" r:id="rId12"/>
+    <p:sldId id="283" r:id="rId10"/>
+    <p:sldId id="277" r:id="rId11"/>
+    <p:sldId id="282" r:id="rId12"/>
     <p:sldId id="272" r:id="rId13"/>
     <p:sldId id="274" r:id="rId14"/>
     <p:sldId id="276" r:id="rId15"/>
-    <p:sldId id="275" r:id="rId16"/>
-    <p:sldId id="278" r:id="rId17"/>
-    <p:sldId id="279" r:id="rId18"/>
+    <p:sldId id="278" r:id="rId16"/>
+    <p:sldId id="280" r:id="rId17"/>
+    <p:sldId id="275" r:id="rId18"/>
+    <p:sldId id="281" r:id="rId19"/>
+    <p:sldId id="271" r:id="rId20"/>
+    <p:sldId id="279" r:id="rId21"/>
+    <p:sldId id="287" r:id="rId22"/>
   </p:sldIdLst>
   <p:sldSz cx="14630400" cy="8229600"/>
   <p:notesSz cx="8229600" cy="14630400"/>
   <p:embeddedFontLst>
     <p:embeddedFont>
       <p:font typeface="DM Sans" pitchFamily="2" charset="0"/>
-      <p:regular r:id="rId20"/>
-      <p:bold r:id="rId21"/>
-      <p:italic r:id="rId22"/>
+      <p:regular r:id="rId24"/>
+      <p:bold r:id="rId25"/>
+      <p:italic r:id="rId26"/>
+      <p:boldItalic r:id="rId27"/>
     </p:embeddedFont>
     <p:embeddedFont>
       <p:font typeface="Libre Baskerville" panose="02000000000000000000" pitchFamily="2" charset="0"/>
-      <p:regular r:id="rId23"/>
-      <p:bold r:id="rId24"/>
-      <p:italic r:id="rId25"/>
+      <p:regular r:id="rId28"/>
+      <p:bold r:id="rId29"/>
+      <p:italic r:id="rId30"/>
     </p:embeddedFont>
   </p:embeddedFontLst>
   <p:defaultTextStyle>
@@ -405,7 +410,21 @@
             <p:ph type="sldImg"/>
           </p:nvPr>
         </p:nvSpPr>
-        <p:spPr/>
+        <p:spPr>
+          <a:xfrm>
+            <a:off x="-273050" y="1828800"/>
+            <a:ext cx="8775700" cy="4937125"/>
+          </a:xfrm>
+          <a:prstGeom prst="rect">
+            <a:avLst/>
+          </a:prstGeom>
+          <a:noFill/>
+          <a:ln w="12700">
+            <a:solidFill>
+              <a:prstClr val="black"/>
+            </a:solidFill>
+          </a:ln>
+        </p:spPr>
       </p:sp>
       <p:sp>
         <p:nvSpPr>
@@ -417,42 +436,100 @@
             <p:ph type="body" idx="1"/>
           </p:nvPr>
         </p:nvSpPr>
-        <p:spPr/>
+        <p:spPr>
+          <a:xfrm>
+            <a:off x="822325" y="7040563"/>
+            <a:ext cx="6584950" cy="5761037"/>
+          </a:xfrm>
+          <a:prstGeom prst="rect">
+            <a:avLst/>
+          </a:prstGeom>
+        </p:spPr>
         <p:txBody>
           <a:bodyPr/>
           <a:lstStyle/>
           <a:p>
+            <a:pPr marL="0" marR="0" lvl="0" indent="0" algn="l" defTabSz="914400" rtl="0" eaLnBrk="1" fontAlgn="auto" latinLnBrk="0" hangingPunct="1">
+              <a:lnSpc>
+                <a:spcPct val="100000"/>
+              </a:lnSpc>
+              <a:spcBef>
+                <a:spcPts val="0"/>
+              </a:spcBef>
+              <a:spcAft>
+                <a:spcPts val="0"/>
+              </a:spcAft>
+              <a:buClrTx/>
+              <a:buSzTx/>
+              <a:buFontTx/>
+              <a:buNone/>
+              <a:tabLst/>
+              <a:defRPr/>
+            </a:pPr>
+            <a:r>
+              <a:rPr lang="en-US" b="1" dirty="0"/>
+              <a:t>Key Takeaway:</a:t>
+            </a:r>
+            <a:br>
+              <a:rPr lang="en-US" dirty="0"/>
+            </a:br>
+            <a:r>
+              <a:rPr lang="en-US" dirty="0"/>
+              <a:t>The COVID-19 pandemic drove exceptional parcel volume growth, dominated by high-value established customers, while a small number of low-volume new entrants emerged, suggesting opportunities for targeted engagement and revenue optimization.</a:t>
+            </a:r>
+            <a:endParaRPr lang="en-US" sz="1200" dirty="0">
+              <a:solidFill>
+                <a:srgbClr val="002060"/>
+              </a:solidFill>
+              <a:latin typeface="DM Sans" pitchFamily="34" charset="0"/>
+              <a:ea typeface="DM Sans" pitchFamily="34" charset="-122"/>
+              <a:cs typeface="DM Sans" pitchFamily="34" charset="-120"/>
+            </a:endParaRPr>
+          </a:p>
+          <a:p>
+            <a:pPr marL="0" marR="0" lvl="0" indent="0" algn="l" defTabSz="914400" rtl="0" eaLnBrk="1" fontAlgn="auto" latinLnBrk="0" hangingPunct="1">
+              <a:lnSpc>
+                <a:spcPct val="100000"/>
+              </a:lnSpc>
+              <a:spcBef>
+                <a:spcPts val="0"/>
+              </a:spcBef>
+              <a:spcAft>
+                <a:spcPts val="0"/>
+              </a:spcAft>
+              <a:buClrTx/>
+              <a:buSzTx/>
+              <a:buFontTx/>
+              <a:buNone/>
+              <a:tabLst/>
+              <a:defRPr/>
+            </a:pPr>
+            <a:r>
+              <a:rPr lang="en-US" sz="1200" dirty="0">
+                <a:solidFill>
+                  <a:srgbClr val="002060"/>
+                </a:solidFill>
+                <a:latin typeface="DM Sans" pitchFamily="34" charset="0"/>
+                <a:ea typeface="DM Sans" pitchFamily="34" charset="-122"/>
+                <a:cs typeface="DM Sans" pitchFamily="34" charset="-120"/>
+              </a:rPr>
+              <a:t>1046 customer base in 2020, from which 56% of the customers were high growth accounts, 7% stable accounts, 36% declining accounts and 1% lost accounts during the pandemic.  </a:t>
+            </a:r>
+            <a:endParaRPr lang="en-US" sz="1200" dirty="0">
+              <a:solidFill>
+                <a:srgbClr val="002060"/>
+              </a:solidFill>
+            </a:endParaRPr>
+          </a:p>
+          <a:p>
             <a:endParaRPr lang="en-US" dirty="0"/>
-          </a:p>
-        </p:txBody>
-      </p:sp>
-      <p:sp>
-        <p:nvSpPr>
-          <p:cNvPr id="4" name="Slide Number Placeholder 3"/>
-          <p:cNvSpPr>
-            <a:spLocks noGrp="1"/>
-          </p:cNvSpPr>
-          <p:nvPr>
-            <p:ph type="sldNum" sz="quarter" idx="10"/>
-          </p:nvPr>
-        </p:nvSpPr>
-        <p:spPr/>
-        <p:txBody>
-          <a:bodyPr/>
-          <a:lstStyle/>
-          <a:p>
-            <a:fld id="{F7021451-1387-4CA6-816F-3879F97B5CBC}" type="slidenum">
-              <a:rPr lang="en-US"/>
-              <a:t>4</a:t>
-            </a:fld>
-            <a:endParaRPr lang="en-US"/>
           </a:p>
         </p:txBody>
       </p:sp>
     </p:spTree>
     <p:extLst>
       <p:ext uri="{BB962C8B-B14F-4D97-AF65-F5344CB8AC3E}">
-        <p14:creationId xmlns:p14="http://schemas.microsoft.com/office/powerpoint/2010/main" val="1024086991"/>
+        <p14:creationId xmlns:p14="http://schemas.microsoft.com/office/powerpoint/2010/main" val="1350666737"/>
       </p:ext>
     </p:extLst>
   </p:cSld>
@@ -506,6 +583,107 @@
           <a:bodyPr/>
           <a:lstStyle/>
           <a:p>
+            <a:pPr marL="0" marR="0" lvl="0" indent="0" algn="l" defTabSz="914400" rtl="0" eaLnBrk="1" fontAlgn="auto" latinLnBrk="0" hangingPunct="1">
+              <a:lnSpc>
+                <a:spcPct val="100000"/>
+              </a:lnSpc>
+              <a:spcBef>
+                <a:spcPts val="0"/>
+              </a:spcBef>
+              <a:spcAft>
+                <a:spcPts val="0"/>
+              </a:spcAft>
+              <a:buClrTx/>
+              <a:buSzTx/>
+              <a:buFontTx/>
+              <a:buNone/>
+              <a:tabLst/>
+              <a:defRPr/>
+            </a:pPr>
+            <a:r>
+              <a:rPr lang="en-US" b="1" dirty="0">
+                <a:solidFill>
+                  <a:srgbClr val="002060"/>
+                </a:solidFill>
+                <a:latin typeface="DM Sans" pitchFamily="2" charset="0"/>
+              </a:rPr>
+              <a:t>Comparing 2020 with 2029 same periods</a:t>
+            </a:r>
+          </a:p>
+          <a:p>
+            <a:pPr marL="0" marR="0" lvl="0" indent="0" algn="l" defTabSz="914400" rtl="0" eaLnBrk="1" fontAlgn="auto" latinLnBrk="0" hangingPunct="1">
+              <a:lnSpc>
+                <a:spcPct val="100000"/>
+              </a:lnSpc>
+              <a:spcBef>
+                <a:spcPts val="0"/>
+              </a:spcBef>
+              <a:spcAft>
+                <a:spcPts val="0"/>
+              </a:spcAft>
+              <a:buClrTx/>
+              <a:buSzTx/>
+              <a:buFontTx/>
+              <a:buNone/>
+              <a:tabLst/>
+              <a:defRPr/>
+            </a:pPr>
+            <a:endParaRPr lang="en-US" b="1" dirty="0">
+              <a:solidFill>
+                <a:srgbClr val="002060"/>
+              </a:solidFill>
+              <a:latin typeface="Libre Baskerville" pitchFamily="34" charset="0"/>
+              <a:ea typeface="Libre Baskerville" pitchFamily="34" charset="-122"/>
+              <a:cs typeface="Libre Baskerville" pitchFamily="34" charset="-120"/>
+            </a:endParaRPr>
+          </a:p>
+          <a:p>
+            <a:pPr marL="0" marR="0" lvl="0" indent="0" algn="l" defTabSz="914400" rtl="0" eaLnBrk="1" fontAlgn="auto" latinLnBrk="0" hangingPunct="1">
+              <a:lnSpc>
+                <a:spcPct val="100000"/>
+              </a:lnSpc>
+              <a:spcBef>
+                <a:spcPts val="0"/>
+              </a:spcBef>
+              <a:spcAft>
+                <a:spcPts val="0"/>
+              </a:spcAft>
+              <a:buClrTx/>
+              <a:buSzTx/>
+              <a:buFontTx/>
+              <a:buNone/>
+              <a:tabLst/>
+              <a:defRPr/>
+            </a:pPr>
+            <a:r>
+              <a:rPr lang="en-US" b="1" dirty="0">
+                <a:solidFill>
+                  <a:srgbClr val="002060"/>
+                </a:solidFill>
+                <a:latin typeface="Libre Baskerville" pitchFamily="34" charset="0"/>
+                <a:ea typeface="Libre Baskerville" pitchFamily="34" charset="-122"/>
+                <a:cs typeface="Libre Baskerville" pitchFamily="34" charset="-120"/>
+              </a:rPr>
+              <a:t>Key Inflection Point : </a:t>
+            </a:r>
+            <a:r>
+              <a:rPr lang="en-US" sz="1200" dirty="0">
+                <a:solidFill>
+                  <a:srgbClr val="002060"/>
+                </a:solidFill>
+                <a:latin typeface="DM Sans" pitchFamily="34" charset="0"/>
+                <a:ea typeface="DM Sans" pitchFamily="34" charset="-122"/>
+                <a:cs typeface="DM Sans" pitchFamily="34" charset="-120"/>
+              </a:rPr>
+              <a:t>The shift began abruptly after  Week 11, 2020, driven by the WHO pandemic declaration and subsequent work-from-home mandates.</a:t>
+            </a:r>
+            <a:endParaRPr lang="en-US" sz="1200" dirty="0">
+              <a:solidFill>
+                <a:srgbClr val="002060"/>
+              </a:solidFill>
+            </a:endParaRPr>
+          </a:p>
+          <a:p>
             <a:endParaRPr lang="en-US" dirty="0"/>
           </a:p>
         </p:txBody>
@@ -527,7 +705,7 @@
           <a:p>
             <a:fld id="{F7021451-1387-4CA6-816F-3879F97B5CBC}" type="slidenum">
               <a:rPr lang="en-US"/>
-              <a:t>7</a:t>
+              <a:t>4</a:t>
             </a:fld>
             <a:endParaRPr lang="en-US"/>
           </a:p>
@@ -547,6 +725,201 @@
 </file>
 
 <file path=ppt/notesSlides/notesSlide4.xml><?xml version="1.0" encoding="utf-8"?>
+<p:notes xmlns:a="http://schemas.openxmlformats.org/drawingml/2006/main" xmlns:r="http://schemas.openxmlformats.org/officeDocument/2006/relationships" xmlns:p="http://schemas.openxmlformats.org/presentationml/2006/main">
+  <p:cSld>
+    <p:spTree>
+      <p:nvGrpSpPr>
+        <p:cNvPr id="1" name=""/>
+        <p:cNvGrpSpPr/>
+        <p:nvPr/>
+      </p:nvGrpSpPr>
+      <p:grpSpPr>
+        <a:xfrm>
+          <a:off x="0" y="0"/>
+          <a:ext cx="0" cy="0"/>
+          <a:chOff x="0" y="0"/>
+          <a:chExt cx="0" cy="0"/>
+        </a:xfrm>
+      </p:grpSpPr>
+      <p:sp>
+        <p:nvSpPr>
+          <p:cNvPr id="2" name="Slide Image Placeholder 1"/>
+          <p:cNvSpPr>
+            <a:spLocks noGrp="1" noRot="1" noChangeAspect="1"/>
+          </p:cNvSpPr>
+          <p:nvPr>
+            <p:ph type="sldImg"/>
+          </p:nvPr>
+        </p:nvSpPr>
+        <p:spPr>
+          <a:xfrm>
+            <a:off x="-273050" y="1828800"/>
+            <a:ext cx="8775700" cy="4937125"/>
+          </a:xfrm>
+          <a:prstGeom prst="rect">
+            <a:avLst/>
+          </a:prstGeom>
+          <a:noFill/>
+          <a:ln w="12700">
+            <a:solidFill>
+              <a:prstClr val="black"/>
+            </a:solidFill>
+          </a:ln>
+        </p:spPr>
+      </p:sp>
+      <p:sp>
+        <p:nvSpPr>
+          <p:cNvPr id="3" name="Notes Placeholder 2"/>
+          <p:cNvSpPr>
+            <a:spLocks noGrp="1"/>
+          </p:cNvSpPr>
+          <p:nvPr>
+            <p:ph type="body" idx="1"/>
+          </p:nvPr>
+        </p:nvSpPr>
+        <p:spPr>
+          <a:xfrm>
+            <a:off x="822325" y="7040563"/>
+            <a:ext cx="6584950" cy="5761037"/>
+          </a:xfrm>
+          <a:prstGeom prst="rect">
+            <a:avLst/>
+          </a:prstGeom>
+        </p:spPr>
+        <p:txBody>
+          <a:bodyPr/>
+          <a:lstStyle/>
+          <a:p>
+            <a:pPr marL="0" marR="0" lvl="0" indent="0" algn="l" defTabSz="914400" rtl="0" eaLnBrk="1" fontAlgn="auto" latinLnBrk="0" hangingPunct="1">
+              <a:lnSpc>
+                <a:spcPct val="100000"/>
+              </a:lnSpc>
+              <a:spcBef>
+                <a:spcPts val="0"/>
+              </a:spcBef>
+              <a:spcAft>
+                <a:spcPts val="0"/>
+              </a:spcAft>
+              <a:buClrTx/>
+              <a:buSzTx/>
+              <a:buFontTx/>
+              <a:buNone/>
+              <a:tabLst/>
+              <a:defRPr/>
+            </a:pPr>
+            <a:r>
+              <a:rPr lang="en-US" altLang="en-US" sz="1200" dirty="0">
+                <a:solidFill>
+                  <a:srgbClr val="002060"/>
+                </a:solidFill>
+                <a:latin typeface="DM Sans" pitchFamily="34" charset="0"/>
+              </a:rPr>
+              <a:t>COVID drove accelerated e-commerce activity, resulting in above-normal growth compared to ISGR (11.40%).</a:t>
+            </a:r>
+          </a:p>
+          <a:p>
+            <a:endParaRPr lang="en-US" dirty="0"/>
+          </a:p>
+        </p:txBody>
+      </p:sp>
+    </p:spTree>
+    <p:extLst>
+      <p:ext uri="{BB962C8B-B14F-4D97-AF65-F5344CB8AC3E}">
+        <p14:creationId xmlns:p14="http://schemas.microsoft.com/office/powerpoint/2010/main" val="3632083190"/>
+      </p:ext>
+    </p:extLst>
+  </p:cSld>
+  <p:clrMapOvr>
+    <a:masterClrMapping/>
+  </p:clrMapOvr>
+</p:notes>
+</file>
+
+<file path=ppt/notesSlides/notesSlide5.xml><?xml version="1.0" encoding="utf-8"?>
+<p:notes xmlns:a="http://schemas.openxmlformats.org/drawingml/2006/main" xmlns:r="http://schemas.openxmlformats.org/officeDocument/2006/relationships" xmlns:p="http://schemas.openxmlformats.org/presentationml/2006/main">
+  <p:cSld>
+    <p:spTree>
+      <p:nvGrpSpPr>
+        <p:cNvPr id="1" name=""/>
+        <p:cNvGrpSpPr/>
+        <p:nvPr/>
+      </p:nvGrpSpPr>
+      <p:grpSpPr>
+        <a:xfrm>
+          <a:off x="0" y="0"/>
+          <a:ext cx="0" cy="0"/>
+          <a:chOff x="0" y="0"/>
+          <a:chExt cx="0" cy="0"/>
+        </a:xfrm>
+      </p:grpSpPr>
+      <p:sp>
+        <p:nvSpPr>
+          <p:cNvPr id="2" name="Slide Image Placeholder 1"/>
+          <p:cNvSpPr>
+            <a:spLocks noGrp="1" noRot="1" noChangeAspect="1"/>
+          </p:cNvSpPr>
+          <p:nvPr>
+            <p:ph type="sldImg"/>
+          </p:nvPr>
+        </p:nvSpPr>
+        <p:spPr/>
+      </p:sp>
+      <p:sp>
+        <p:nvSpPr>
+          <p:cNvPr id="3" name="Notes Placeholder 2"/>
+          <p:cNvSpPr>
+            <a:spLocks noGrp="1"/>
+          </p:cNvSpPr>
+          <p:nvPr>
+            <p:ph type="body" idx="1"/>
+          </p:nvPr>
+        </p:nvSpPr>
+        <p:spPr/>
+        <p:txBody>
+          <a:bodyPr/>
+          <a:lstStyle/>
+          <a:p>
+            <a:endParaRPr lang="en-US" dirty="0"/>
+          </a:p>
+        </p:txBody>
+      </p:sp>
+      <p:sp>
+        <p:nvSpPr>
+          <p:cNvPr id="4" name="Slide Number Placeholder 3"/>
+          <p:cNvSpPr>
+            <a:spLocks noGrp="1"/>
+          </p:cNvSpPr>
+          <p:nvPr>
+            <p:ph type="sldNum" sz="quarter" idx="10"/>
+          </p:nvPr>
+        </p:nvSpPr>
+        <p:spPr/>
+        <p:txBody>
+          <a:bodyPr/>
+          <a:lstStyle/>
+          <a:p>
+            <a:fld id="{F7021451-1387-4CA6-816F-3879F97B5CBC}" type="slidenum">
+              <a:rPr lang="en-US"/>
+              <a:t>7</a:t>
+            </a:fld>
+            <a:endParaRPr lang="en-US"/>
+          </a:p>
+        </p:txBody>
+      </p:sp>
+    </p:spTree>
+    <p:extLst>
+      <p:ext uri="{BB962C8B-B14F-4D97-AF65-F5344CB8AC3E}">
+        <p14:creationId xmlns:p14="http://schemas.microsoft.com/office/powerpoint/2010/main" val="1024086991"/>
+      </p:ext>
+    </p:extLst>
+  </p:cSld>
+  <p:clrMapOvr>
+    <a:masterClrMapping/>
+  </p:clrMapOvr>
+</p:notes>
+</file>
+
+<file path=ppt/notesSlides/notesSlide6.xml><?xml version="1.0" encoding="utf-8"?>
 <p:notes xmlns:a="http://schemas.openxmlformats.org/drawingml/2006/main" xmlns:r="http://schemas.openxmlformats.org/officeDocument/2006/relationships" xmlns:p="http://schemas.openxmlformats.org/presentationml/2006/main">
   <p:cSld>
     <p:spTree>
@@ -618,6 +991,174 @@
             <a:extLst>
               <a:ext uri="{FF2B5EF4-FFF2-40B4-BE49-F238E27FC236}">
                 <a16:creationId xmlns:a16="http://schemas.microsoft.com/office/drawing/2014/main" id="{F8E334B1-6A10-CCD2-906F-09958F4FE458}"/>
+              </a:ext>
+            </a:extLst>
+          </p:cNvPr>
+          <p:cNvSpPr>
+            <a:spLocks noGrp="1"/>
+          </p:cNvSpPr>
+          <p:nvPr>
+            <p:ph type="sldNum" sz="quarter" idx="10"/>
+          </p:nvPr>
+        </p:nvSpPr>
+        <p:spPr/>
+        <p:txBody>
+          <a:bodyPr/>
+          <a:lstStyle/>
+          <a:p>
+            <a:pPr marL="0" marR="0" lvl="0" indent="0" algn="l" defTabSz="914400" rtl="0" eaLnBrk="1" fontAlgn="auto" latinLnBrk="0" hangingPunct="1">
+              <a:lnSpc>
+                <a:spcPct val="100000"/>
+              </a:lnSpc>
+              <a:spcBef>
+                <a:spcPts val="0"/>
+              </a:spcBef>
+              <a:spcAft>
+                <a:spcPts val="0"/>
+              </a:spcAft>
+              <a:buClrTx/>
+              <a:buSzTx/>
+              <a:buFontTx/>
+              <a:buNone/>
+              <a:tabLst/>
+              <a:defRPr/>
+            </a:pPr>
+            <a:fld id="{F7021451-1387-4CA6-816F-3879F97B5CBC}" type="slidenum">
+              <a:rPr kumimoji="0" lang="en-US" sz="1800" b="0" i="0" u="none" strike="noStrike" kern="1200" cap="none" spc="0" normalizeH="0" baseline="0" noProof="0">
+                <a:ln>
+                  <a:noFill/>
+                </a:ln>
+                <a:solidFill>
+                  <a:prstClr val="black"/>
+                </a:solidFill>
+                <a:effectLst/>
+                <a:uLnTx/>
+                <a:uFillTx/>
+                <a:latin typeface="Calibri" panose="020F0502020204030204"/>
+                <a:ea typeface="+mn-ea"/>
+                <a:cs typeface="+mn-cs"/>
+              </a:rPr>
+              <a:pPr marL="0" marR="0" lvl="0" indent="0" algn="l" defTabSz="914400" rtl="0" eaLnBrk="1" fontAlgn="auto" latinLnBrk="0" hangingPunct="1">
+                <a:lnSpc>
+                  <a:spcPct val="100000"/>
+                </a:lnSpc>
+                <a:spcBef>
+                  <a:spcPts val="0"/>
+                </a:spcBef>
+                <a:spcAft>
+                  <a:spcPts val="0"/>
+                </a:spcAft>
+                <a:buClrTx/>
+                <a:buSzTx/>
+                <a:buFontTx/>
+                <a:buNone/>
+                <a:tabLst/>
+                <a:defRPr/>
+              </a:pPr>
+              <a:t>14</a:t>
+            </a:fld>
+            <a:endParaRPr kumimoji="0" lang="en-US" sz="1800" b="0" i="0" u="none" strike="noStrike" kern="1200" cap="none" spc="0" normalizeH="0" baseline="0" noProof="0">
+              <a:ln>
+                <a:noFill/>
+              </a:ln>
+              <a:solidFill>
+                <a:prstClr val="black"/>
+              </a:solidFill>
+              <a:effectLst/>
+              <a:uLnTx/>
+              <a:uFillTx/>
+              <a:latin typeface="Calibri" panose="020F0502020204030204"/>
+              <a:ea typeface="+mn-ea"/>
+              <a:cs typeface="+mn-cs"/>
+            </a:endParaRPr>
+          </a:p>
+        </p:txBody>
+      </p:sp>
+    </p:spTree>
+    <p:extLst>
+      <p:ext uri="{BB962C8B-B14F-4D97-AF65-F5344CB8AC3E}">
+        <p14:creationId xmlns:p14="http://schemas.microsoft.com/office/powerpoint/2010/main" val="303398949"/>
+      </p:ext>
+    </p:extLst>
+  </p:cSld>
+  <p:clrMapOvr>
+    <a:masterClrMapping/>
+  </p:clrMapOvr>
+</p:notes>
+</file>
+
+<file path=ppt/notesSlides/notesSlide7.xml><?xml version="1.0" encoding="utf-8"?>
+<p:notes xmlns:a="http://schemas.openxmlformats.org/drawingml/2006/main" xmlns:r="http://schemas.openxmlformats.org/officeDocument/2006/relationships" xmlns:p="http://schemas.openxmlformats.org/presentationml/2006/main">
+  <p:cSld>
+    <p:spTree>
+      <p:nvGrpSpPr>
+        <p:cNvPr id="1" name="">
+          <a:extLst>
+            <a:ext uri="{FF2B5EF4-FFF2-40B4-BE49-F238E27FC236}">
+              <a16:creationId xmlns:a16="http://schemas.microsoft.com/office/drawing/2014/main" id="{EB11C36F-15EE-993D-3ECE-100EA9300648}"/>
+            </a:ext>
+          </a:extLst>
+        </p:cNvPr>
+        <p:cNvGrpSpPr/>
+        <p:nvPr/>
+      </p:nvGrpSpPr>
+      <p:grpSpPr>
+        <a:xfrm>
+          <a:off x="0" y="0"/>
+          <a:ext cx="0" cy="0"/>
+          <a:chOff x="0" y="0"/>
+          <a:chExt cx="0" cy="0"/>
+        </a:xfrm>
+      </p:grpSpPr>
+      <p:sp>
+        <p:nvSpPr>
+          <p:cNvPr id="2" name="Slide Image Placeholder 1">
+            <a:extLst>
+              <a:ext uri="{FF2B5EF4-FFF2-40B4-BE49-F238E27FC236}">
+                <a16:creationId xmlns:a16="http://schemas.microsoft.com/office/drawing/2014/main" id="{89E74F2B-2237-FA30-71AE-A8A41CDA90EC}"/>
+              </a:ext>
+            </a:extLst>
+          </p:cNvPr>
+          <p:cNvSpPr>
+            <a:spLocks noGrp="1" noRot="1" noChangeAspect="1"/>
+          </p:cNvSpPr>
+          <p:nvPr>
+            <p:ph type="sldImg"/>
+          </p:nvPr>
+        </p:nvSpPr>
+        <p:spPr/>
+      </p:sp>
+      <p:sp>
+        <p:nvSpPr>
+          <p:cNvPr id="3" name="Notes Placeholder 2">
+            <a:extLst>
+              <a:ext uri="{FF2B5EF4-FFF2-40B4-BE49-F238E27FC236}">
+                <a16:creationId xmlns:a16="http://schemas.microsoft.com/office/drawing/2014/main" id="{17180A8F-29F5-F5C9-DB57-04BAC4926ABC}"/>
+              </a:ext>
+            </a:extLst>
+          </p:cNvPr>
+          <p:cNvSpPr>
+            <a:spLocks noGrp="1"/>
+          </p:cNvSpPr>
+          <p:nvPr>
+            <p:ph type="body" idx="1"/>
+          </p:nvPr>
+        </p:nvSpPr>
+        <p:spPr/>
+        <p:txBody>
+          <a:bodyPr/>
+          <a:lstStyle/>
+          <a:p>
+            <a:endParaRPr lang="en-US" dirty="0"/>
+          </a:p>
+        </p:txBody>
+      </p:sp>
+      <p:sp>
+        <p:nvSpPr>
+          <p:cNvPr id="4" name="Slide Number Placeholder 3">
+            <a:extLst>
+              <a:ext uri="{FF2B5EF4-FFF2-40B4-BE49-F238E27FC236}">
+                <a16:creationId xmlns:a16="http://schemas.microsoft.com/office/drawing/2014/main" id="{C42BD30C-B877-5F25-E3E5-CBC6D0EB9E05}"/>
               </a:ext>
             </a:extLst>
           </p:cNvPr>
@@ -704,7 +1245,7 @@
     </p:spTree>
     <p:extLst>
       <p:ext uri="{BB962C8B-B14F-4D97-AF65-F5344CB8AC3E}">
-        <p14:creationId xmlns:p14="http://schemas.microsoft.com/office/powerpoint/2010/main" val="303398949"/>
+        <p14:creationId xmlns:p14="http://schemas.microsoft.com/office/powerpoint/2010/main" val="995587371"/>
       </p:ext>
     </p:extLst>
   </p:cSld>
@@ -3497,8 +4038,27 @@
                 <a:ea typeface="DM Sans" pitchFamily="34" charset="-122"/>
                 <a:cs typeface="DM Sans" pitchFamily="34" charset="-120"/>
               </a:rPr>
-              <a:t>By: Evelyn &amp; Gracious</a:t>
-            </a:r>
+              <a:t>By: Evelyn George &amp; Gracious </a:t>
+            </a:r>
+            <a:r>
+              <a:rPr lang="en-US" sz="1750" b="1" dirty="0" err="1">
+                <a:solidFill>
+                  <a:srgbClr val="002060"/>
+                </a:solidFill>
+                <a:latin typeface="DM Sans" pitchFamily="34" charset="0"/>
+                <a:ea typeface="DM Sans" pitchFamily="34" charset="-122"/>
+                <a:cs typeface="DM Sans" pitchFamily="34" charset="-120"/>
+              </a:rPr>
+              <a:t>Akokadike</a:t>
+            </a:r>
+            <a:endParaRPr lang="en-US" sz="1750" b="1" dirty="0">
+              <a:solidFill>
+                <a:srgbClr val="002060"/>
+              </a:solidFill>
+              <a:latin typeface="DM Sans" pitchFamily="34" charset="0"/>
+              <a:ea typeface="DM Sans" pitchFamily="34" charset="-122"/>
+              <a:cs typeface="DM Sans" pitchFamily="34" charset="-120"/>
+            </a:endParaRPr>
           </a:p>
           <a:p>
             <a:pPr marL="0" indent="0" algn="l">
@@ -3566,7 +4126,7 @@
         <p:cNvPr id="1" name="">
           <a:extLst>
             <a:ext uri="{FF2B5EF4-FFF2-40B4-BE49-F238E27FC236}">
-              <a16:creationId xmlns:a16="http://schemas.microsoft.com/office/drawing/2014/main" id="{60510960-F2C1-D06A-FC2A-8EBE84EC2DD9}"/>
+              <a16:creationId xmlns:a16="http://schemas.microsoft.com/office/drawing/2014/main" id="{0966BBBE-25BF-A8F9-92D4-9E28E1FBA78A}"/>
             </a:ext>
           </a:extLst>
         </p:cNvPr>
@@ -3586,7 +4146,7 @@
           <p:cNvPr id="2" name="TextBox 1">
             <a:extLst>
               <a:ext uri="{FF2B5EF4-FFF2-40B4-BE49-F238E27FC236}">
-                <a16:creationId xmlns:a16="http://schemas.microsoft.com/office/drawing/2014/main" id="{6DFFABA4-17A9-52D3-D3F2-C53FF6F40E0D}"/>
+                <a16:creationId xmlns:a16="http://schemas.microsoft.com/office/drawing/2014/main" id="{BE1B49C1-8A36-3C3E-6987-43953D5D15EC}"/>
               </a:ext>
             </a:extLst>
           </p:cNvPr>
@@ -3595,8 +4155,8 @@
         </p:nvSpPr>
         <p:spPr>
           <a:xfrm>
-            <a:off x="458268" y="328186"/>
-            <a:ext cx="12279324" cy="638636"/>
+            <a:off x="393731" y="275468"/>
+            <a:ext cx="13135327" cy="638636"/>
           </a:xfrm>
           <a:prstGeom prst="rect">
             <a:avLst/>
@@ -3616,17 +4176,17 @@
                 </a:solidFill>
                 <a:latin typeface="Libre Baskerville" pitchFamily="34" charset="0"/>
               </a:rPr>
-              <a:t>Pandemic Effects Across Customer Segments (2/2)</a:t>
+              <a:t>Customer Group Performance Status Breakdown (1/2)</a:t>
             </a:r>
           </a:p>
         </p:txBody>
       </p:sp>
       <p:pic>
         <p:nvPicPr>
-          <p:cNvPr id="5" name="Picture 4" descr="A graph with numbers and a bar&#10;&#10;AI-generated content may be incorrect.">
+          <p:cNvPr id="8" name="Picture 7">
             <a:extLst>
               <a:ext uri="{FF2B5EF4-FFF2-40B4-BE49-F238E27FC236}">
-                <a16:creationId xmlns:a16="http://schemas.microsoft.com/office/drawing/2014/main" id="{DAB57380-CDCB-E4FD-BD21-191642EEE049}"/>
+                <a16:creationId xmlns:a16="http://schemas.microsoft.com/office/drawing/2014/main" id="{1B6AA30E-76C1-1122-6587-9E7809C15E79}"/>
               </a:ext>
             </a:extLst>
           </p:cNvPr>
@@ -3643,8 +4203,8 @@
         </p:blipFill>
         <p:spPr>
           <a:xfrm>
-            <a:off x="261108" y="1468933"/>
-            <a:ext cx="9792939" cy="4491278"/>
+            <a:off x="393731" y="2573123"/>
+            <a:ext cx="8549300" cy="3083354"/>
           </a:xfrm>
           <a:prstGeom prst="rect">
             <a:avLst/>
@@ -3653,74 +4213,44 @@
       </p:pic>
       <p:sp>
         <p:nvSpPr>
-          <p:cNvPr id="6" name="Rectangle 5">
+          <p:cNvPr id="9" name="TextBox 8">
             <a:extLst>
               <a:ext uri="{FF2B5EF4-FFF2-40B4-BE49-F238E27FC236}">
-                <a16:creationId xmlns:a16="http://schemas.microsoft.com/office/drawing/2014/main" id="{91A47D82-1C45-34A2-6595-1000DB0CEAAA}"/>
+                <a16:creationId xmlns:a16="http://schemas.microsoft.com/office/drawing/2014/main" id="{3A5984BB-5C7A-9D5D-0403-8D54970FD410}"/>
               </a:ext>
             </a:extLst>
           </p:cNvPr>
-          <p:cNvSpPr/>
-          <p:nvPr/>
-        </p:nvSpPr>
-        <p:spPr>
-          <a:xfrm>
-            <a:off x="9529012" y="1347538"/>
-            <a:ext cx="5233736" cy="6424862"/>
-          </a:xfrm>
-          <a:prstGeom prst="rect">
-            <a:avLst/>
-          </a:prstGeom>
-          <a:solidFill>
-            <a:schemeClr val="bg1"/>
-          </a:solidFill>
-          <a:ln>
-            <a:solidFill>
-              <a:schemeClr val="bg1"/>
-            </a:solidFill>
-          </a:ln>
-        </p:spPr>
-        <p:style>
-          <a:lnRef idx="2">
-            <a:schemeClr val="accent1">
-              <a:shade val="15000"/>
-            </a:schemeClr>
-          </a:lnRef>
-          <a:fillRef idx="1">
-            <a:schemeClr val="accent1"/>
-          </a:fillRef>
-          <a:effectRef idx="0">
-            <a:schemeClr val="accent1"/>
-          </a:effectRef>
-          <a:fontRef idx="minor">
-            <a:schemeClr val="lt1"/>
-          </a:fontRef>
-        </p:style>
-        <p:txBody>
-          <a:bodyPr rtlCol="0" anchor="ctr"/>
+          <p:cNvSpPr txBox="1"/>
+          <p:nvPr/>
+        </p:nvSpPr>
+        <p:spPr>
+          <a:xfrm>
+            <a:off x="9303657" y="1634476"/>
+            <a:ext cx="5117667" cy="5909310"/>
+          </a:xfrm>
+          <a:prstGeom prst="rect">
+            <a:avLst/>
+          </a:prstGeom>
+          <a:noFill/>
+        </p:spPr>
+        <p:txBody>
+          <a:bodyPr wrap="square" rtlCol="0">
+            <a:spAutoFit/>
+          </a:bodyPr>
           <a:lstStyle/>
           <a:p>
             <a:r>
-              <a:rPr lang="en-US" sz="2000" b="1" dirty="0">
+              <a:rPr lang="en-US" b="1" dirty="0">
                 <a:solidFill>
                   <a:srgbClr val="002060"/>
                 </a:solidFill>
                 <a:latin typeface="DM Sans" pitchFamily="2" charset="0"/>
               </a:rPr>
-              <a:t>Enterprise Customers:</a:t>
-            </a:r>
-            <a:r>
-              <a:rPr lang="en-US" sz="2000" dirty="0">
-                <a:solidFill>
-                  <a:srgbClr val="002060"/>
-                </a:solidFill>
-                <a:latin typeface="DM Sans" pitchFamily="2" charset="0"/>
-              </a:rPr>
-              <a:t> Slight increase from 12 → 14 (+16.67%). </a:t>
-            </a:r>
-          </a:p>
-          <a:p>
-            <a:endParaRPr lang="en-US" sz="2000" dirty="0">
+              <a:t>Key Observations</a:t>
+            </a:r>
+          </a:p>
+          <a:p>
+            <a:endParaRPr lang="en-US" dirty="0">
               <a:solidFill>
                 <a:srgbClr val="002060"/>
               </a:solidFill>
@@ -3729,26 +4259,15 @@
           </a:p>
           <a:p>
             <a:r>
-              <a:rPr lang="en-US" sz="2000" b="1" dirty="0">
+              <a:rPr lang="en-US" b="1" dirty="0">
                 <a:solidFill>
                   <a:srgbClr val="002060"/>
                 </a:solidFill>
                 <a:latin typeface="DM Sans" pitchFamily="2" charset="0"/>
               </a:rPr>
-              <a:t>Large Customers:</a:t>
-            </a:r>
-            <a:r>
-              <a:rPr lang="en-US" sz="2000" dirty="0">
-                <a:solidFill>
-                  <a:srgbClr val="002060"/>
-                </a:solidFill>
-                <a:latin typeface="DM Sans" pitchFamily="2" charset="0"/>
-              </a:rPr>
-              <a:t> Noticeable growth from 15 → 22 (+46.67%).</a:t>
-            </a:r>
-          </a:p>
-          <a:p>
-            <a:endParaRPr lang="en-US" sz="2000" dirty="0">
+              <a:t>Enterprise Customers</a:t>
+            </a:r>
+            <a:endParaRPr lang="en-US" dirty="0">
               <a:solidFill>
                 <a:srgbClr val="002060"/>
               </a:solidFill>
@@ -3756,27 +4275,20 @@
             </a:endParaRPr>
           </a:p>
           <a:p>
-            <a:r>
-              <a:rPr lang="en-US" sz="2000" b="1" dirty="0">
+            <a:pPr lvl="1"/>
+            <a:r>
+              <a:rPr lang="en-US" dirty="0">
                 <a:solidFill>
                   <a:srgbClr val="002060"/>
                 </a:solidFill>
                 <a:latin typeface="DM Sans" pitchFamily="2" charset="0"/>
               </a:rPr>
-              <a:t>Medium Customers:</a:t>
-            </a:r>
-            <a:r>
-              <a:rPr lang="en-US" sz="2000" dirty="0">
-                <a:solidFill>
-                  <a:srgbClr val="002060"/>
-                </a:solidFill>
-                <a:latin typeface="DM Sans" pitchFamily="2" charset="0"/>
-              </a:rPr>
-              <a:t> Significant growth from 174 → 234 (+34.48%).</a:t>
-            </a:r>
-          </a:p>
-          <a:p>
-            <a:endParaRPr lang="en-US" sz="2000" dirty="0">
+              <a:t>10 high growth, reflecting significant parcel increases. 3 declined and 1 stable.</a:t>
+            </a:r>
+          </a:p>
+          <a:p>
+            <a:pPr lvl="1"/>
+            <a:endParaRPr lang="en-US" dirty="0">
               <a:solidFill>
                 <a:srgbClr val="002060"/>
               </a:solidFill>
@@ -3785,26 +4297,15 @@
           </a:p>
           <a:p>
             <a:r>
-              <a:rPr lang="en-US" sz="2000" b="1" dirty="0">
+              <a:rPr lang="en-US" b="1" dirty="0">
                 <a:solidFill>
                   <a:srgbClr val="002060"/>
                 </a:solidFill>
                 <a:latin typeface="DM Sans" pitchFamily="2" charset="0"/>
               </a:rPr>
-              <a:t>Small Customers:</a:t>
-            </a:r>
-            <a:r>
-              <a:rPr lang="en-US" sz="2000" dirty="0">
-                <a:solidFill>
-                  <a:srgbClr val="002060"/>
-                </a:solidFill>
-                <a:latin typeface="DM Sans" pitchFamily="2" charset="0"/>
-              </a:rPr>
-              <a:t> Decrease from 860 → 681 (-20.81%). </a:t>
-            </a:r>
-          </a:p>
-          <a:p>
-            <a:endParaRPr lang="en-US" sz="2000" dirty="0">
+              <a:t>Large Customers</a:t>
+            </a:r>
+            <a:endParaRPr lang="en-US" dirty="0">
               <a:solidFill>
                 <a:srgbClr val="002060"/>
               </a:solidFill>
@@ -3812,23 +4313,153 @@
             </a:endParaRPr>
           </a:p>
           <a:p>
-            <a:r>
-              <a:rPr lang="en-US" sz="2000" b="1" dirty="0">
+            <a:pPr lvl="1"/>
+            <a:r>
+              <a:rPr lang="en-US" dirty="0">
                 <a:solidFill>
                   <a:srgbClr val="002060"/>
                 </a:solidFill>
                 <a:latin typeface="DM Sans" pitchFamily="2" charset="0"/>
               </a:rPr>
-              <a:t>Other:</a:t>
-            </a:r>
-            <a:r>
-              <a:rPr lang="en-US" sz="2000" dirty="0">
+              <a:t>19 high growth, 1 declined, 2 stable.</a:t>
+            </a:r>
+          </a:p>
+          <a:p>
+            <a:pPr lvl="1"/>
+            <a:endParaRPr lang="en-US" dirty="0">
+              <a:solidFill>
+                <a:srgbClr val="002060"/>
+              </a:solidFill>
+              <a:latin typeface="DM Sans" pitchFamily="2" charset="0"/>
+            </a:endParaRPr>
+          </a:p>
+          <a:p>
+            <a:r>
+              <a:rPr lang="en-US" b="1" dirty="0">
                 <a:solidFill>
                   <a:srgbClr val="002060"/>
                 </a:solidFill>
                 <a:latin typeface="DM Sans" pitchFamily="2" charset="0"/>
               </a:rPr>
-              <a:t> 95 new customers in 2020 appear in “Other” (9.08% of total with balances below 1k). Very low-volume accounts that did not fit into standard categories in 2020.</a:t>
+              <a:t>Medium Customers</a:t>
+            </a:r>
+            <a:endParaRPr lang="en-US" dirty="0">
+              <a:solidFill>
+                <a:srgbClr val="002060"/>
+              </a:solidFill>
+              <a:latin typeface="DM Sans" pitchFamily="2" charset="0"/>
+            </a:endParaRPr>
+          </a:p>
+          <a:p>
+            <a:pPr lvl="1"/>
+            <a:r>
+              <a:rPr lang="en-US" dirty="0">
+                <a:solidFill>
+                  <a:srgbClr val="002060"/>
+                </a:solidFill>
+                <a:latin typeface="DM Sans" pitchFamily="2" charset="0"/>
+              </a:rPr>
+              <a:t>171 high growth, 44 declined, 19 stable.</a:t>
+            </a:r>
+          </a:p>
+          <a:p>
+            <a:pPr lvl="1"/>
+            <a:endParaRPr lang="en-US" dirty="0">
+              <a:solidFill>
+                <a:srgbClr val="002060"/>
+              </a:solidFill>
+              <a:latin typeface="DM Sans" pitchFamily="2" charset="0"/>
+            </a:endParaRPr>
+          </a:p>
+          <a:p>
+            <a:r>
+              <a:rPr lang="en-US" b="1" dirty="0">
+                <a:solidFill>
+                  <a:srgbClr val="002060"/>
+                </a:solidFill>
+                <a:latin typeface="DM Sans" pitchFamily="2" charset="0"/>
+              </a:rPr>
+              <a:t>Small Customers</a:t>
+            </a:r>
+            <a:endParaRPr lang="en-US" dirty="0">
+              <a:solidFill>
+                <a:srgbClr val="002060"/>
+              </a:solidFill>
+              <a:latin typeface="DM Sans" pitchFamily="2" charset="0"/>
+            </a:endParaRPr>
+          </a:p>
+          <a:p>
+            <a:pPr lvl="1"/>
+            <a:r>
+              <a:rPr lang="en-US" dirty="0">
+                <a:solidFill>
+                  <a:srgbClr val="002060"/>
+                </a:solidFill>
+                <a:latin typeface="DM Sans" pitchFamily="2" charset="0"/>
+              </a:rPr>
+              <a:t>386 high growth, 54 stable.</a:t>
+            </a:r>
+          </a:p>
+          <a:p>
+            <a:pPr lvl="1"/>
+            <a:r>
+              <a:rPr lang="en-US" dirty="0">
+                <a:solidFill>
+                  <a:srgbClr val="002060"/>
+                </a:solidFill>
+                <a:latin typeface="DM Sans" pitchFamily="2" charset="0"/>
+              </a:rPr>
+              <a:t>241 declined, showing vulnerability in smaller accounts.</a:t>
+            </a:r>
+          </a:p>
+          <a:p>
+            <a:pPr lvl="1"/>
+            <a:endParaRPr lang="en-US" dirty="0">
+              <a:solidFill>
+                <a:srgbClr val="002060"/>
+              </a:solidFill>
+              <a:latin typeface="DM Sans" pitchFamily="2" charset="0"/>
+            </a:endParaRPr>
+          </a:p>
+          <a:p>
+            <a:r>
+              <a:rPr lang="en-US" b="1" dirty="0">
+                <a:solidFill>
+                  <a:srgbClr val="002060"/>
+                </a:solidFill>
+                <a:latin typeface="DM Sans" pitchFamily="2" charset="0"/>
+              </a:rPr>
+              <a:t>Small → Other Transition</a:t>
+            </a:r>
+            <a:endParaRPr lang="en-US" dirty="0">
+              <a:solidFill>
+                <a:srgbClr val="002060"/>
+              </a:solidFill>
+              <a:latin typeface="DM Sans" pitchFamily="2" charset="0"/>
+            </a:endParaRPr>
+          </a:p>
+          <a:p>
+            <a:pPr lvl="1"/>
+            <a:r>
+              <a:rPr lang="en-US" dirty="0">
+                <a:solidFill>
+                  <a:srgbClr val="002060"/>
+                </a:solidFill>
+                <a:latin typeface="DM Sans" pitchFamily="2" charset="0"/>
+              </a:rPr>
+              <a:t>“Other” represents downgraded small customers.</a:t>
+            </a:r>
+          </a:p>
+          <a:p>
+            <a:pPr lvl="1"/>
+            <a:r>
+              <a:rPr lang="en-US" dirty="0">
+                <a:solidFill>
+                  <a:srgbClr val="002060"/>
+                </a:solidFill>
+                <a:latin typeface="DM Sans" pitchFamily="2" charset="0"/>
+              </a:rPr>
+              <a:t>84 declined, 11 lost.</a:t>
             </a:r>
           </a:p>
         </p:txBody>
@@ -3836,7 +4467,7 @@
     </p:spTree>
     <p:extLst>
       <p:ext uri="{BB962C8B-B14F-4D97-AF65-F5344CB8AC3E}">
-        <p14:creationId xmlns:p14="http://schemas.microsoft.com/office/powerpoint/2010/main" val="2787815850"/>
+        <p14:creationId xmlns:p14="http://schemas.microsoft.com/office/powerpoint/2010/main" val="2851167416"/>
       </p:ext>
     </p:extLst>
   </p:cSld>
@@ -4011,7 +4642,7 @@
                 </a:solidFill>
                 <a:latin typeface="DM Sans" pitchFamily="2" charset="0"/>
               </a:rPr>
-              <a:t>86.36% high growth, 4.55% declined, 9.09% stable.</a:t>
+              <a:t>86.36% high growth, 4.55% declined, .09% stable.</a:t>
             </a:r>
           </a:p>
           <a:p>
@@ -4168,8 +4799,8 @@
         </p:nvSpPr>
         <p:spPr>
           <a:xfrm>
-            <a:off x="1960155" y="155014"/>
-            <a:ext cx="11990783" cy="638636"/>
+            <a:off x="464457" y="155014"/>
+            <a:ext cx="13956867" cy="638636"/>
           </a:xfrm>
           <a:prstGeom prst="rect">
             <a:avLst/>
@@ -4177,7 +4808,7 @@
           <a:noFill/>
         </p:spPr>
         <p:txBody>
-          <a:bodyPr wrap="none" rtlCol="0">
+          <a:bodyPr wrap="square" rtlCol="0">
             <a:spAutoFit/>
           </a:bodyPr>
           <a:lstStyle/>
@@ -4189,7 +4820,7 @@
                 </a:solidFill>
                 <a:latin typeface="Libre Baskerville" pitchFamily="34" charset="0"/>
               </a:rPr>
-              <a:t>Customer Group Performance Status Breakdown</a:t>
+              <a:t>Customer Group Performance Status Breakdown (2/2)</a:t>
             </a:r>
           </a:p>
         </p:txBody>
@@ -4232,87 +4863,6 @@
           <a:chExt cx="0" cy="0"/>
         </a:xfrm>
       </p:grpSpPr>
-      <p:grpSp>
-        <p:nvGrpSpPr>
-          <p:cNvPr id="9" name="Group 8">
-            <a:extLst>
-              <a:ext uri="{FF2B5EF4-FFF2-40B4-BE49-F238E27FC236}">
-                <a16:creationId xmlns:a16="http://schemas.microsoft.com/office/drawing/2014/main" id="{8CC259C9-40C5-84FF-5AEB-B1B9A1D33F0D}"/>
-              </a:ext>
-            </a:extLst>
-          </p:cNvPr>
-          <p:cNvGrpSpPr/>
-          <p:nvPr/>
-        </p:nvGrpSpPr>
-        <p:grpSpPr>
-          <a:xfrm>
-            <a:off x="806115" y="1284966"/>
-            <a:ext cx="12272397" cy="4454097"/>
-            <a:chOff x="164869" y="752578"/>
-            <a:chExt cx="13948360" cy="5394971"/>
-          </a:xfrm>
-        </p:grpSpPr>
-        <p:pic>
-          <p:nvPicPr>
-            <p:cNvPr id="3" name="Picture 2" descr="A graph with numbers and a number of customers&#10;&#10;AI-generated content may be incorrect.">
-              <a:extLst>
-                <a:ext uri="{FF2B5EF4-FFF2-40B4-BE49-F238E27FC236}">
-                  <a16:creationId xmlns:a16="http://schemas.microsoft.com/office/drawing/2014/main" id="{C0E77160-4754-899B-D7C6-99F722C7C8BF}"/>
-                </a:ext>
-              </a:extLst>
-            </p:cNvPr>
-            <p:cNvPicPr>
-              <a:picLocks noChangeAspect="1"/>
-            </p:cNvPicPr>
-            <p:nvPr/>
-          </p:nvPicPr>
-          <p:blipFill>
-            <a:blip r:embed="rId2"/>
-            <a:stretch>
-              <a:fillRect/>
-            </a:stretch>
-          </p:blipFill>
-          <p:spPr>
-            <a:xfrm>
-              <a:off x="164869" y="752578"/>
-              <a:ext cx="9006858" cy="5394971"/>
-            </a:xfrm>
-            <a:prstGeom prst="rect">
-              <a:avLst/>
-            </a:prstGeom>
-          </p:spPr>
-        </p:pic>
-        <p:pic>
-          <p:nvPicPr>
-            <p:cNvPr id="7" name="Picture 6" descr="A white background with black text&#10;&#10;AI-generated content may be incorrect.">
-              <a:extLst>
-                <a:ext uri="{FF2B5EF4-FFF2-40B4-BE49-F238E27FC236}">
-                  <a16:creationId xmlns:a16="http://schemas.microsoft.com/office/drawing/2014/main" id="{4A6E53AC-E12E-98F4-8FA0-2BCD975141F5}"/>
-                </a:ext>
-              </a:extLst>
-            </p:cNvPr>
-            <p:cNvPicPr>
-              <a:picLocks noChangeAspect="1"/>
-            </p:cNvPicPr>
-            <p:nvPr/>
-          </p:nvPicPr>
-          <p:blipFill>
-            <a:blip r:embed="rId3"/>
-            <a:stretch>
-              <a:fillRect/>
-            </a:stretch>
-          </p:blipFill>
-          <p:spPr>
-            <a:xfrm>
-              <a:off x="9084029" y="984315"/>
-              <a:ext cx="5029200" cy="4798859"/>
-            </a:xfrm>
-            <a:prstGeom prst="rect">
-              <a:avLst/>
-            </a:prstGeom>
-          </p:spPr>
-        </p:pic>
-      </p:grpSp>
       <p:sp>
         <p:nvSpPr>
           <p:cNvPr id="8" name="TextBox 7">
@@ -4370,8 +4920,8 @@
         </p:nvSpPr>
         <p:spPr>
           <a:xfrm>
-            <a:off x="964503" y="5629557"/>
-            <a:ext cx="11933349" cy="2130812"/>
+            <a:off x="10130970" y="2296983"/>
+            <a:ext cx="3893948" cy="3635633"/>
           </a:xfrm>
           <a:prstGeom prst="rect">
             <a:avLst/>
@@ -4416,8 +4966,16 @@
                 </a:solidFill>
                 <a:latin typeface="DM Sans" pitchFamily="2" charset="0"/>
               </a:rPr>
-              <a:t>Lost customers: Mostly in Small group (drop of 14 of Small customers and 1 medium).</a:t>
-            </a:r>
+              <a:t>Lost customers: Mostly in Small group (drop of 11 of Small customers).</a:t>
+            </a:r>
+          </a:p>
+          <a:p>
+            <a:endParaRPr lang="en-US" dirty="0">
+              <a:solidFill>
+                <a:srgbClr val="002060"/>
+              </a:solidFill>
+              <a:latin typeface="DM Sans" pitchFamily="2" charset="0"/>
+            </a:endParaRPr>
           </a:p>
           <a:p>
             <a:pPr marL="285750" indent="-285750">
@@ -4431,7 +4989,7 @@
                 </a:solidFill>
                 <a:latin typeface="DM Sans" pitchFamily="2" charset="0"/>
               </a:rPr>
-              <a:t>Retention of Small customers could improve profitability.</a:t>
+              <a:t>No new customer was recorded in 2020.</a:t>
             </a:r>
           </a:p>
           <a:p>
@@ -4439,6 +4997,18 @@
               <a:buFont typeface="Arial" panose="020B0604020202020204" pitchFamily="34" charset="0"/>
               <a:buChar char="•"/>
             </a:pPr>
+            <a:endParaRPr lang="en-US" dirty="0">
+              <a:solidFill>
+                <a:srgbClr val="002060"/>
+              </a:solidFill>
+              <a:latin typeface="DM Sans" pitchFamily="2" charset="0"/>
+            </a:endParaRPr>
+          </a:p>
+          <a:p>
+            <a:pPr marL="285750" indent="-285750">
+              <a:buFont typeface="Arial" panose="020B0604020202020204" pitchFamily="34" charset="0"/>
+              <a:buChar char="•"/>
+            </a:pPr>
             <a:r>
               <a:rPr lang="en-US" dirty="0">
                 <a:solidFill>
@@ -4446,11 +5016,41 @@
                 </a:solidFill>
                 <a:latin typeface="DM Sans" pitchFamily="2" charset="0"/>
               </a:rPr>
-              <a:t>No new customer was recorded in 2020.</a:t>
-            </a:r>
-          </a:p>
-        </p:txBody>
-      </p:sp>
+              <a:t>Retention of Small customers could improve profitability.</a:t>
+            </a:r>
+          </a:p>
+        </p:txBody>
+      </p:sp>
+      <p:pic>
+        <p:nvPicPr>
+          <p:cNvPr id="10" name="Picture 9" descr="A graph with blue and white bars&#10;&#10;AI-generated content may be incorrect.">
+            <a:extLst>
+              <a:ext uri="{FF2B5EF4-FFF2-40B4-BE49-F238E27FC236}">
+                <a16:creationId xmlns:a16="http://schemas.microsoft.com/office/drawing/2014/main" id="{6E8205D6-ACD4-1372-ECEB-78EA032ADD04}"/>
+              </a:ext>
+            </a:extLst>
+          </p:cNvPr>
+          <p:cNvPicPr>
+            <a:picLocks noChangeAspect="1"/>
+          </p:cNvPicPr>
+          <p:nvPr/>
+        </p:nvPicPr>
+        <p:blipFill>
+          <a:blip r:embed="rId2"/>
+          <a:stretch>
+            <a:fillRect/>
+          </a:stretch>
+        </p:blipFill>
+        <p:spPr>
+          <a:xfrm>
+            <a:off x="243393" y="1322518"/>
+            <a:ext cx="9887577" cy="5584564"/>
+          </a:xfrm>
+          <a:prstGeom prst="rect">
+            <a:avLst/>
+          </a:prstGeom>
+        </p:spPr>
+      </p:pic>
     </p:spTree>
     <p:extLst>
       <p:ext uri="{BB962C8B-B14F-4D97-AF65-F5344CB8AC3E}">
@@ -4712,165 +5312,6 @@
 </file>
 
 <file path=ppt/slides/slide14.xml><?xml version="1.0" encoding="utf-8"?>
-<p:sld xmlns:a="http://schemas.openxmlformats.org/drawingml/2006/main" xmlns:r="http://schemas.openxmlformats.org/officeDocument/2006/relationships" xmlns:p="http://schemas.openxmlformats.org/presentationml/2006/main">
-  <p:cSld>
-    <p:bg>
-      <p:bgPr>
-        <a:solidFill>
-          <a:schemeClr val="bg1"/>
-        </a:solidFill>
-        <a:effectLst/>
-      </p:bgPr>
-    </p:bg>
-    <p:spTree>
-      <p:nvGrpSpPr>
-        <p:cNvPr id="1" name=""/>
-        <p:cNvGrpSpPr/>
-        <p:nvPr/>
-      </p:nvGrpSpPr>
-      <p:grpSpPr>
-        <a:xfrm>
-          <a:off x="0" y="0"/>
-          <a:ext cx="0" cy="0"/>
-          <a:chOff x="0" y="0"/>
-          <a:chExt cx="0" cy="0"/>
-        </a:xfrm>
-      </p:grpSpPr>
-      <p:sp>
-        <p:nvSpPr>
-          <p:cNvPr id="6" name="TextBox 5">
-            <a:extLst>
-              <a:ext uri="{FF2B5EF4-FFF2-40B4-BE49-F238E27FC236}">
-                <a16:creationId xmlns:a16="http://schemas.microsoft.com/office/drawing/2014/main" id="{1CFFAC44-E175-CB24-7ADA-51B41A603335}"/>
-              </a:ext>
-            </a:extLst>
-          </p:cNvPr>
-          <p:cNvSpPr txBox="1"/>
-          <p:nvPr/>
-        </p:nvSpPr>
-        <p:spPr>
-          <a:xfrm>
-            <a:off x="9685421" y="2560111"/>
-            <a:ext cx="4704346" cy="1323439"/>
-          </a:xfrm>
-          <a:prstGeom prst="rect">
-            <a:avLst/>
-          </a:prstGeom>
-          <a:noFill/>
-        </p:spPr>
-        <p:txBody>
-          <a:bodyPr wrap="square" rtlCol="0">
-            <a:spAutoFit/>
-          </a:bodyPr>
-          <a:lstStyle/>
-          <a:p>
-            <a:r>
-              <a:rPr lang="en-US" sz="2000" b="1" dirty="0">
-                <a:solidFill>
-                  <a:srgbClr val="002060"/>
-                </a:solidFill>
-                <a:latin typeface="DM Sans" pitchFamily="2" charset="0"/>
-              </a:rPr>
-              <a:t>Overall Performance</a:t>
-            </a:r>
-          </a:p>
-          <a:p>
-            <a:r>
-              <a:rPr lang="en-US" sz="2000" dirty="0">
-                <a:solidFill>
-                  <a:srgbClr val="002060"/>
-                </a:solidFill>
-                <a:latin typeface="DM Sans" pitchFamily="2" charset="0"/>
-              </a:rPr>
-              <a:t>Revenue grew significantly above the normal rate, aligning with the volume spike. </a:t>
-            </a:r>
-          </a:p>
-        </p:txBody>
-      </p:sp>
-      <p:sp>
-        <p:nvSpPr>
-          <p:cNvPr id="2" name="TextBox 1">
-            <a:extLst>
-              <a:ext uri="{FF2B5EF4-FFF2-40B4-BE49-F238E27FC236}">
-                <a16:creationId xmlns:a16="http://schemas.microsoft.com/office/drawing/2014/main" id="{7159A5AB-C005-7FB3-0F1B-AFA22BD83319}"/>
-              </a:ext>
-            </a:extLst>
-          </p:cNvPr>
-          <p:cNvSpPr txBox="1"/>
-          <p:nvPr/>
-        </p:nvSpPr>
-        <p:spPr>
-          <a:xfrm>
-            <a:off x="421107" y="425006"/>
-            <a:ext cx="4870244" cy="638636"/>
-          </a:xfrm>
-          <a:prstGeom prst="rect">
-            <a:avLst/>
-          </a:prstGeom>
-          <a:noFill/>
-        </p:spPr>
-        <p:txBody>
-          <a:bodyPr wrap="square" rtlCol="0">
-            <a:spAutoFit/>
-          </a:bodyPr>
-          <a:lstStyle/>
-          <a:p>
-            <a:r>
-              <a:rPr lang="en-US" sz="3550" b="1" dirty="0">
-                <a:solidFill>
-                  <a:srgbClr val="002060"/>
-                </a:solidFill>
-                <a:latin typeface="Libre Baskerville" pitchFamily="34" charset="0"/>
-              </a:rPr>
-              <a:t>Impact on Revenue</a:t>
-            </a:r>
-          </a:p>
-        </p:txBody>
-      </p:sp>
-      <p:pic>
-        <p:nvPicPr>
-          <p:cNvPr id="10" name="Picture 9" descr="A graph of a bar chart&#10;&#10;AI-generated content may be incorrect.">
-            <a:extLst>
-              <a:ext uri="{FF2B5EF4-FFF2-40B4-BE49-F238E27FC236}">
-                <a16:creationId xmlns:a16="http://schemas.microsoft.com/office/drawing/2014/main" id="{BF3AEFC7-EC63-4EF7-1946-C9EFCF7C5EA8}"/>
-              </a:ext>
-            </a:extLst>
-          </p:cNvPr>
-          <p:cNvPicPr>
-            <a:picLocks noChangeAspect="1"/>
-          </p:cNvPicPr>
-          <p:nvPr/>
-        </p:nvPicPr>
-        <p:blipFill>
-          <a:blip r:embed="rId2"/>
-          <a:stretch>
-            <a:fillRect/>
-          </a:stretch>
-        </p:blipFill>
-        <p:spPr>
-          <a:xfrm>
-            <a:off x="421107" y="1658301"/>
-            <a:ext cx="9264314" cy="5144564"/>
-          </a:xfrm>
-          <a:prstGeom prst="rect">
-            <a:avLst/>
-          </a:prstGeom>
-        </p:spPr>
-      </p:pic>
-    </p:spTree>
-    <p:extLst>
-      <p:ext uri="{BB962C8B-B14F-4D97-AF65-F5344CB8AC3E}">
-        <p14:creationId xmlns:p14="http://schemas.microsoft.com/office/powerpoint/2010/main" val="397055138"/>
-      </p:ext>
-    </p:extLst>
-  </p:cSld>
-  <p:clrMapOvr>
-    <a:masterClrMapping/>
-  </p:clrMapOvr>
-</p:sld>
-</file>
-
-<file path=ppt/slides/slide15.xml><?xml version="1.0" encoding="utf-8"?>
 <p:sld xmlns:a="http://schemas.openxmlformats.org/drawingml/2006/main" xmlns:r="http://schemas.openxmlformats.org/officeDocument/2006/relationships" xmlns:p="http://schemas.openxmlformats.org/presentationml/2006/main">
   <p:cSld>
     <p:bg>
@@ -5046,7 +5487,733 @@
 </p:sld>
 </file>
 
+<file path=ppt/slides/slide15.xml><?xml version="1.0" encoding="utf-8"?>
+<p:sld xmlns:a="http://schemas.openxmlformats.org/drawingml/2006/main" xmlns:r="http://schemas.openxmlformats.org/officeDocument/2006/relationships" xmlns:p="http://schemas.openxmlformats.org/presentationml/2006/main">
+  <p:cSld>
+    <p:bg>
+      <p:bgPr>
+        <a:gradFill>
+          <a:gsLst>
+            <a:gs pos="0">
+              <a:schemeClr val="bg1">
+                <a:tint val="93000"/>
+                <a:satMod val="150000"/>
+                <a:shade val="98000"/>
+                <a:lumMod val="102000"/>
+              </a:schemeClr>
+            </a:gs>
+            <a:gs pos="50000">
+              <a:schemeClr val="bg1">
+                <a:tint val="98000"/>
+                <a:satMod val="130000"/>
+                <a:shade val="90000"/>
+                <a:lumMod val="103000"/>
+              </a:schemeClr>
+            </a:gs>
+            <a:gs pos="100000">
+              <a:schemeClr val="bg1">
+                <a:shade val="63000"/>
+                <a:satMod val="120000"/>
+              </a:schemeClr>
+            </a:gs>
+          </a:gsLst>
+          <a:lin ang="5400000" scaled="0"/>
+        </a:gradFill>
+        <a:effectLst/>
+      </p:bgPr>
+    </p:bg>
+    <p:spTree>
+      <p:nvGrpSpPr>
+        <p:cNvPr id="1" name="">
+          <a:extLst>
+            <a:ext uri="{FF2B5EF4-FFF2-40B4-BE49-F238E27FC236}">
+              <a16:creationId xmlns:a16="http://schemas.microsoft.com/office/drawing/2014/main" id="{4506AB94-4AD4-CFB4-0A7F-5DEA48DB174C}"/>
+            </a:ext>
+          </a:extLst>
+        </p:cNvPr>
+        <p:cNvGrpSpPr/>
+        <p:nvPr/>
+      </p:nvGrpSpPr>
+      <p:grpSpPr>
+        <a:xfrm>
+          <a:off x="0" y="0"/>
+          <a:ext cx="0" cy="0"/>
+          <a:chOff x="0" y="0"/>
+          <a:chExt cx="0" cy="0"/>
+        </a:xfrm>
+      </p:grpSpPr>
+      <p:sp>
+        <p:nvSpPr>
+          <p:cNvPr id="3" name="Text 0">
+            <a:extLst>
+              <a:ext uri="{FF2B5EF4-FFF2-40B4-BE49-F238E27FC236}">
+                <a16:creationId xmlns:a16="http://schemas.microsoft.com/office/drawing/2014/main" id="{4E066BBA-E681-1F54-9CCD-73761B0B6CF7}"/>
+              </a:ext>
+            </a:extLst>
+          </p:cNvPr>
+          <p:cNvSpPr/>
+          <p:nvPr/>
+        </p:nvSpPr>
+        <p:spPr>
+          <a:xfrm>
+            <a:off x="562234" y="3564599"/>
+            <a:ext cx="12392526" cy="1993991"/>
+          </a:xfrm>
+          <a:prstGeom prst="rect">
+            <a:avLst/>
+          </a:prstGeom>
+          <a:noFill/>
+          <a:ln/>
+        </p:spPr>
+        <p:txBody>
+          <a:bodyPr wrap="square" lIns="0" tIns="0" rIns="0" bIns="0" rtlCol="0" anchor="t"/>
+          <a:lstStyle/>
+          <a:p>
+            <a:pPr marL="0" marR="0" lvl="0" indent="0" algn="ctr" defTabSz="914400" rtl="0" eaLnBrk="1" fontAlgn="auto" latinLnBrk="0" hangingPunct="1">
+              <a:lnSpc>
+                <a:spcPct val="100000"/>
+              </a:lnSpc>
+              <a:spcBef>
+                <a:spcPts val="0"/>
+              </a:spcBef>
+              <a:spcAft>
+                <a:spcPts val="0"/>
+              </a:spcAft>
+              <a:buClrTx/>
+              <a:buSzTx/>
+              <a:buFontTx/>
+              <a:buNone/>
+              <a:tabLst/>
+              <a:defRPr/>
+            </a:pPr>
+            <a:r>
+              <a:rPr kumimoji="0" lang="en-US" sz="7200" b="1" i="0" u="none" strike="noStrike" kern="1200" cap="none" spc="0" normalizeH="0" baseline="0" noProof="0" dirty="0">
+                <a:ln>
+                  <a:noFill/>
+                </a:ln>
+                <a:solidFill>
+                  <a:srgbClr val="002060"/>
+                </a:solidFill>
+                <a:effectLst/>
+                <a:uLnTx/>
+                <a:uFillTx/>
+                <a:latin typeface="Libre Baskerville" pitchFamily="34" charset="0"/>
+                <a:ea typeface="Libre Baskerville" pitchFamily="34" charset="-122"/>
+                <a:cs typeface="Libre Baskerville" pitchFamily="34" charset="-120"/>
+              </a:rPr>
+              <a:t>Appendix </a:t>
+            </a:r>
+            <a:endParaRPr kumimoji="0" lang="en-US" sz="7200" b="1" i="0" u="none" strike="noStrike" kern="1200" cap="none" spc="0" normalizeH="0" baseline="0" noProof="0" dirty="0">
+              <a:ln>
+                <a:noFill/>
+              </a:ln>
+              <a:solidFill>
+                <a:srgbClr val="002060"/>
+              </a:solidFill>
+              <a:effectLst/>
+              <a:uLnTx/>
+              <a:uFillTx/>
+              <a:latin typeface="Calibri" panose="020F0502020204030204"/>
+              <a:ea typeface="+mn-ea"/>
+              <a:cs typeface="+mn-cs"/>
+            </a:endParaRPr>
+          </a:p>
+        </p:txBody>
+      </p:sp>
+    </p:spTree>
+    <p:extLst>
+      <p:ext uri="{BB962C8B-B14F-4D97-AF65-F5344CB8AC3E}">
+        <p14:creationId xmlns:p14="http://schemas.microsoft.com/office/powerpoint/2010/main" val="4028644408"/>
+      </p:ext>
+    </p:extLst>
+  </p:cSld>
+  <p:clrMapOvr>
+    <a:masterClrMapping/>
+  </p:clrMapOvr>
+</p:sld>
+</file>
+
 <file path=ppt/slides/slide16.xml><?xml version="1.0" encoding="utf-8"?>
+<p:sld xmlns:a="http://schemas.openxmlformats.org/drawingml/2006/main" xmlns:r="http://schemas.openxmlformats.org/officeDocument/2006/relationships" xmlns:p="http://schemas.openxmlformats.org/presentationml/2006/main">
+  <p:cSld>
+    <p:bg>
+      <p:bgPr>
+        <a:solidFill>
+          <a:schemeClr val="bg1"/>
+        </a:solidFill>
+        <a:effectLst/>
+      </p:bgPr>
+    </p:bg>
+    <p:spTree>
+      <p:nvGrpSpPr>
+        <p:cNvPr id="1" name=""/>
+        <p:cNvGrpSpPr/>
+        <p:nvPr/>
+      </p:nvGrpSpPr>
+      <p:grpSpPr>
+        <a:xfrm>
+          <a:off x="0" y="0"/>
+          <a:ext cx="0" cy="0"/>
+          <a:chOff x="0" y="0"/>
+          <a:chExt cx="0" cy="0"/>
+        </a:xfrm>
+      </p:grpSpPr>
+      <p:sp>
+        <p:nvSpPr>
+          <p:cNvPr id="6" name="TextBox 5">
+            <a:extLst>
+              <a:ext uri="{FF2B5EF4-FFF2-40B4-BE49-F238E27FC236}">
+                <a16:creationId xmlns:a16="http://schemas.microsoft.com/office/drawing/2014/main" id="{1CFFAC44-E175-CB24-7ADA-51B41A603335}"/>
+              </a:ext>
+            </a:extLst>
+          </p:cNvPr>
+          <p:cNvSpPr txBox="1"/>
+          <p:nvPr/>
+        </p:nvSpPr>
+        <p:spPr>
+          <a:xfrm>
+            <a:off x="9685421" y="2560111"/>
+            <a:ext cx="4704346" cy="1323439"/>
+          </a:xfrm>
+          <a:prstGeom prst="rect">
+            <a:avLst/>
+          </a:prstGeom>
+          <a:noFill/>
+        </p:spPr>
+        <p:txBody>
+          <a:bodyPr wrap="square" rtlCol="0">
+            <a:spAutoFit/>
+          </a:bodyPr>
+          <a:lstStyle/>
+          <a:p>
+            <a:r>
+              <a:rPr lang="en-US" sz="2000" b="1" dirty="0">
+                <a:solidFill>
+                  <a:srgbClr val="002060"/>
+                </a:solidFill>
+                <a:latin typeface="DM Sans" pitchFamily="2" charset="0"/>
+              </a:rPr>
+              <a:t>Overall Performance</a:t>
+            </a:r>
+          </a:p>
+          <a:p>
+            <a:r>
+              <a:rPr lang="en-US" sz="2000" dirty="0">
+                <a:solidFill>
+                  <a:srgbClr val="002060"/>
+                </a:solidFill>
+                <a:latin typeface="DM Sans" pitchFamily="2" charset="0"/>
+              </a:rPr>
+              <a:t>Revenue grew significantly above the normal rate, aligning with the volume spike. </a:t>
+            </a:r>
+          </a:p>
+        </p:txBody>
+      </p:sp>
+      <p:sp>
+        <p:nvSpPr>
+          <p:cNvPr id="2" name="TextBox 1">
+            <a:extLst>
+              <a:ext uri="{FF2B5EF4-FFF2-40B4-BE49-F238E27FC236}">
+                <a16:creationId xmlns:a16="http://schemas.microsoft.com/office/drawing/2014/main" id="{7159A5AB-C005-7FB3-0F1B-AFA22BD83319}"/>
+              </a:ext>
+            </a:extLst>
+          </p:cNvPr>
+          <p:cNvSpPr txBox="1"/>
+          <p:nvPr/>
+        </p:nvSpPr>
+        <p:spPr>
+          <a:xfrm>
+            <a:off x="421107" y="425006"/>
+            <a:ext cx="4870244" cy="638636"/>
+          </a:xfrm>
+          <a:prstGeom prst="rect">
+            <a:avLst/>
+          </a:prstGeom>
+          <a:noFill/>
+        </p:spPr>
+        <p:txBody>
+          <a:bodyPr wrap="square" rtlCol="0">
+            <a:spAutoFit/>
+          </a:bodyPr>
+          <a:lstStyle/>
+          <a:p>
+            <a:r>
+              <a:rPr lang="en-US" sz="3550" b="1" dirty="0">
+                <a:solidFill>
+                  <a:srgbClr val="002060"/>
+                </a:solidFill>
+                <a:latin typeface="Libre Baskerville" pitchFamily="34" charset="0"/>
+              </a:rPr>
+              <a:t>Impact on Revenue</a:t>
+            </a:r>
+          </a:p>
+        </p:txBody>
+      </p:sp>
+      <p:pic>
+        <p:nvPicPr>
+          <p:cNvPr id="10" name="Picture 9" descr="A graph of a bar chart&#10;&#10;AI-generated content may be incorrect.">
+            <a:extLst>
+              <a:ext uri="{FF2B5EF4-FFF2-40B4-BE49-F238E27FC236}">
+                <a16:creationId xmlns:a16="http://schemas.microsoft.com/office/drawing/2014/main" id="{BF3AEFC7-EC63-4EF7-1946-C9EFCF7C5EA8}"/>
+              </a:ext>
+            </a:extLst>
+          </p:cNvPr>
+          <p:cNvPicPr>
+            <a:picLocks noChangeAspect="1"/>
+          </p:cNvPicPr>
+          <p:nvPr/>
+        </p:nvPicPr>
+        <p:blipFill>
+          <a:blip r:embed="rId2"/>
+          <a:stretch>
+            <a:fillRect/>
+          </a:stretch>
+        </p:blipFill>
+        <p:spPr>
+          <a:xfrm>
+            <a:off x="421107" y="1658301"/>
+            <a:ext cx="9264314" cy="5144564"/>
+          </a:xfrm>
+          <a:prstGeom prst="rect">
+            <a:avLst/>
+          </a:prstGeom>
+        </p:spPr>
+      </p:pic>
+    </p:spTree>
+    <p:extLst>
+      <p:ext uri="{BB962C8B-B14F-4D97-AF65-F5344CB8AC3E}">
+        <p14:creationId xmlns:p14="http://schemas.microsoft.com/office/powerpoint/2010/main" val="397055138"/>
+      </p:ext>
+    </p:extLst>
+  </p:cSld>
+  <p:clrMapOvr>
+    <a:masterClrMapping/>
+  </p:clrMapOvr>
+</p:sld>
+</file>
+
+<file path=ppt/slides/slide17.xml><?xml version="1.0" encoding="utf-8"?>
+<p:sld xmlns:a="http://schemas.openxmlformats.org/drawingml/2006/main" xmlns:r="http://schemas.openxmlformats.org/officeDocument/2006/relationships" xmlns:p="http://schemas.openxmlformats.org/presentationml/2006/main">
+  <p:cSld>
+    <p:bg>
+      <p:bgPr>
+        <a:solidFill>
+          <a:schemeClr val="bg1"/>
+        </a:solidFill>
+        <a:effectLst/>
+      </p:bgPr>
+    </p:bg>
+    <p:spTree>
+      <p:nvGrpSpPr>
+        <p:cNvPr id="1" name="">
+          <a:extLst>
+            <a:ext uri="{FF2B5EF4-FFF2-40B4-BE49-F238E27FC236}">
+              <a16:creationId xmlns:a16="http://schemas.microsoft.com/office/drawing/2014/main" id="{89F7DAC9-BC6D-6218-FE8C-E34D8F0F02C9}"/>
+            </a:ext>
+          </a:extLst>
+        </p:cNvPr>
+        <p:cNvGrpSpPr/>
+        <p:nvPr/>
+      </p:nvGrpSpPr>
+      <p:grpSpPr>
+        <a:xfrm>
+          <a:off x="0" y="0"/>
+          <a:ext cx="0" cy="0"/>
+          <a:chOff x="0" y="0"/>
+          <a:chExt cx="0" cy="0"/>
+        </a:xfrm>
+      </p:grpSpPr>
+      <p:pic>
+        <p:nvPicPr>
+          <p:cNvPr id="3" name="Picture 2" descr="A graph of blue and orange bars&#10;&#10;AI-generated content may be incorrect.">
+            <a:extLst>
+              <a:ext uri="{FF2B5EF4-FFF2-40B4-BE49-F238E27FC236}">
+                <a16:creationId xmlns:a16="http://schemas.microsoft.com/office/drawing/2014/main" id="{D65ED109-D7D7-0F3A-A048-05B98D5EE303}"/>
+              </a:ext>
+            </a:extLst>
+          </p:cNvPr>
+          <p:cNvPicPr>
+            <a:picLocks noChangeAspect="1"/>
+          </p:cNvPicPr>
+          <p:nvPr/>
+        </p:nvPicPr>
+        <p:blipFill>
+          <a:blip r:embed="rId2"/>
+          <a:stretch>
+            <a:fillRect/>
+          </a:stretch>
+        </p:blipFill>
+        <p:spPr>
+          <a:xfrm>
+            <a:off x="814192" y="1014609"/>
+            <a:ext cx="12641481" cy="5022936"/>
+          </a:xfrm>
+          <a:prstGeom prst="rect">
+            <a:avLst/>
+          </a:prstGeom>
+        </p:spPr>
+      </p:pic>
+      <p:sp>
+        <p:nvSpPr>
+          <p:cNvPr id="4" name="TextBox 3">
+            <a:extLst>
+              <a:ext uri="{FF2B5EF4-FFF2-40B4-BE49-F238E27FC236}">
+                <a16:creationId xmlns:a16="http://schemas.microsoft.com/office/drawing/2014/main" id="{24995259-8878-7C8B-2212-B880BDA7F3A1}"/>
+              </a:ext>
+            </a:extLst>
+          </p:cNvPr>
+          <p:cNvSpPr txBox="1"/>
+          <p:nvPr/>
+        </p:nvSpPr>
+        <p:spPr>
+          <a:xfrm>
+            <a:off x="313151" y="6309434"/>
+            <a:ext cx="14112288" cy="1323439"/>
+          </a:xfrm>
+          <a:prstGeom prst="rect">
+            <a:avLst/>
+          </a:prstGeom>
+          <a:noFill/>
+        </p:spPr>
+        <p:txBody>
+          <a:bodyPr wrap="square" rtlCol="0">
+            <a:spAutoFit/>
+          </a:bodyPr>
+          <a:lstStyle/>
+          <a:p>
+            <a:r>
+              <a:rPr lang="en-US" sz="2000" b="1" dirty="0">
+                <a:solidFill>
+                  <a:srgbClr val="002060"/>
+                </a:solidFill>
+                <a:latin typeface="DM Sans" pitchFamily="2" charset="0"/>
+              </a:rPr>
+              <a:t>2020 Volume Surge</a:t>
+            </a:r>
+            <a:r>
+              <a:rPr lang="en-US" sz="2000" dirty="0">
+                <a:solidFill>
+                  <a:srgbClr val="002060"/>
+                </a:solidFill>
+                <a:latin typeface="DM Sans" pitchFamily="2" charset="0"/>
+              </a:rPr>
+              <a:t>: 2020 volumes were consistently higher than 2019, confirming that COVID-19 significantly increased peak season parcel demand.</a:t>
+            </a:r>
+          </a:p>
+          <a:p>
+            <a:r>
+              <a:rPr lang="en-US" sz="2000" b="1" dirty="0">
+                <a:solidFill>
+                  <a:srgbClr val="002060"/>
+                </a:solidFill>
+                <a:latin typeface="DM Sans" pitchFamily="2" charset="0"/>
+              </a:rPr>
+              <a:t>Strategic Insight</a:t>
+            </a:r>
+            <a:r>
+              <a:rPr lang="en-US" sz="2000" dirty="0">
+                <a:solidFill>
+                  <a:srgbClr val="002060"/>
+                </a:solidFill>
+                <a:latin typeface="DM Sans" pitchFamily="2" charset="0"/>
+              </a:rPr>
+              <a:t>: ABC should expect a higher baseline post-pandemic due to accelerated customer habit formation (Shift to online shopping) </a:t>
+            </a:r>
+          </a:p>
+        </p:txBody>
+      </p:sp>
+      <p:sp>
+        <p:nvSpPr>
+          <p:cNvPr id="2" name="TextBox 1">
+            <a:extLst>
+              <a:ext uri="{FF2B5EF4-FFF2-40B4-BE49-F238E27FC236}">
+                <a16:creationId xmlns:a16="http://schemas.microsoft.com/office/drawing/2014/main" id="{D8832306-7C6E-F650-F752-4CC2180050BD}"/>
+              </a:ext>
+            </a:extLst>
+          </p:cNvPr>
+          <p:cNvSpPr txBox="1"/>
+          <p:nvPr/>
+        </p:nvSpPr>
+        <p:spPr>
+          <a:xfrm>
+            <a:off x="684042" y="277409"/>
+            <a:ext cx="10059164" cy="638636"/>
+          </a:xfrm>
+          <a:prstGeom prst="rect">
+            <a:avLst/>
+          </a:prstGeom>
+          <a:noFill/>
+        </p:spPr>
+        <p:txBody>
+          <a:bodyPr wrap="none" rtlCol="0">
+            <a:spAutoFit/>
+          </a:bodyPr>
+          <a:lstStyle/>
+          <a:p>
+            <a:r>
+              <a:rPr lang="en-US" sz="3550" b="1" dirty="0">
+                <a:solidFill>
+                  <a:srgbClr val="002060"/>
+                </a:solidFill>
+                <a:latin typeface="Libre Baskerville" pitchFamily="34" charset="0"/>
+              </a:rPr>
+              <a:t>COVID-19’s Impact on 2020 Peak Season</a:t>
+            </a:r>
+          </a:p>
+        </p:txBody>
+      </p:sp>
+    </p:spTree>
+    <p:extLst>
+      <p:ext uri="{BB962C8B-B14F-4D97-AF65-F5344CB8AC3E}">
+        <p14:creationId xmlns:p14="http://schemas.microsoft.com/office/powerpoint/2010/main" val="4038750650"/>
+      </p:ext>
+    </p:extLst>
+  </p:cSld>
+  <p:clrMapOvr>
+    <a:masterClrMapping/>
+  </p:clrMapOvr>
+</p:sld>
+</file>
+
+<file path=ppt/slides/slide18.xml><?xml version="1.0" encoding="utf-8"?>
+<p:sld xmlns:a="http://schemas.openxmlformats.org/drawingml/2006/main" xmlns:r="http://schemas.openxmlformats.org/officeDocument/2006/relationships" xmlns:p="http://schemas.openxmlformats.org/presentationml/2006/main">
+  <p:cSld>
+    <p:bg>
+      <p:bgPr>
+        <a:solidFill>
+          <a:schemeClr val="bg1"/>
+        </a:solidFill>
+        <a:effectLst/>
+      </p:bgPr>
+    </p:bg>
+    <p:spTree>
+      <p:nvGrpSpPr>
+        <p:cNvPr id="1" name=""/>
+        <p:cNvGrpSpPr/>
+        <p:nvPr/>
+      </p:nvGrpSpPr>
+      <p:grpSpPr>
+        <a:xfrm>
+          <a:off x="0" y="0"/>
+          <a:ext cx="0" cy="0"/>
+          <a:chOff x="0" y="0"/>
+          <a:chExt cx="0" cy="0"/>
+        </a:xfrm>
+      </p:grpSpPr>
+      <p:sp>
+        <p:nvSpPr>
+          <p:cNvPr id="4" name="TextBox 3">
+            <a:extLst>
+              <a:ext uri="{FF2B5EF4-FFF2-40B4-BE49-F238E27FC236}">
+                <a16:creationId xmlns:a16="http://schemas.microsoft.com/office/drawing/2014/main" id="{090E51ED-40D4-12C4-31B5-3D9578A51C8F}"/>
+              </a:ext>
+            </a:extLst>
+          </p:cNvPr>
+          <p:cNvSpPr txBox="1"/>
+          <p:nvPr/>
+        </p:nvSpPr>
+        <p:spPr>
+          <a:xfrm>
+            <a:off x="261108" y="5654645"/>
+            <a:ext cx="13972250" cy="2246769"/>
+          </a:xfrm>
+          <a:prstGeom prst="rect">
+            <a:avLst/>
+          </a:prstGeom>
+          <a:noFill/>
+        </p:spPr>
+        <p:txBody>
+          <a:bodyPr wrap="square" rtlCol="0">
+            <a:spAutoFit/>
+          </a:bodyPr>
+          <a:lstStyle/>
+          <a:p>
+            <a:r>
+              <a:rPr lang="en-US" sz="2000" b="1" dirty="0">
+                <a:solidFill>
+                  <a:srgbClr val="002060"/>
+                </a:solidFill>
+                <a:latin typeface="DM Sans" pitchFamily="2" charset="0"/>
+              </a:rPr>
+              <a:t>Small Customers</a:t>
+            </a:r>
+            <a:r>
+              <a:rPr lang="en-US" sz="2000" dirty="0">
+                <a:solidFill>
+                  <a:srgbClr val="002060"/>
+                </a:solidFill>
+                <a:latin typeface="DM Sans" pitchFamily="2" charset="0"/>
+              </a:rPr>
+              <a:t>: Experienced a substantial decline (-15.96%), suggesting they were disproportionately impacted by the pandemic (closures/consolidation).</a:t>
+            </a:r>
+          </a:p>
+          <a:p>
+            <a:r>
+              <a:rPr lang="en-US" sz="2000" b="1" dirty="0">
+                <a:solidFill>
+                  <a:srgbClr val="002060"/>
+                </a:solidFill>
+                <a:latin typeface="DM Sans" pitchFamily="2" charset="0"/>
+              </a:rPr>
+              <a:t>Medium Customers</a:t>
+            </a:r>
+            <a:r>
+              <a:rPr lang="en-US" sz="2000" dirty="0">
+                <a:solidFill>
+                  <a:srgbClr val="002060"/>
+                </a:solidFill>
+                <a:latin typeface="DM Sans" pitchFamily="2" charset="0"/>
+              </a:rPr>
+              <a:t>: showed significant growth (+6%).</a:t>
+            </a:r>
+          </a:p>
+          <a:p>
+            <a:r>
+              <a:rPr lang="en-US" sz="2000" b="1" dirty="0">
+                <a:solidFill>
+                  <a:srgbClr val="002060"/>
+                </a:solidFill>
+                <a:latin typeface="DM Sans" pitchFamily="2" charset="0"/>
+              </a:rPr>
+              <a:t>Large Customers</a:t>
+            </a:r>
+            <a:r>
+              <a:rPr lang="en-US" sz="2000" dirty="0">
+                <a:solidFill>
+                  <a:srgbClr val="002060"/>
+                </a:solidFill>
+                <a:latin typeface="DM Sans" pitchFamily="2" charset="0"/>
+              </a:rPr>
+              <a:t>: the highest percentage growth (+0.67%), confirming volume acquisition in the higher-tier segments.</a:t>
+            </a:r>
+          </a:p>
+          <a:p>
+            <a:r>
+              <a:rPr lang="en-US" sz="2000" dirty="0">
+                <a:solidFill>
+                  <a:srgbClr val="002060"/>
+                </a:solidFill>
+                <a:latin typeface="DM Sans" pitchFamily="2" charset="0"/>
+              </a:rPr>
+              <a:t>A new segment of customer emerged in 2020 which we categorized as others. They had volumes lower than 1k and they contributed 9.1% of 2020 volumes.</a:t>
+            </a:r>
+          </a:p>
+        </p:txBody>
+      </p:sp>
+      <p:sp>
+        <p:nvSpPr>
+          <p:cNvPr id="2" name="TextBox 1">
+            <a:extLst>
+              <a:ext uri="{FF2B5EF4-FFF2-40B4-BE49-F238E27FC236}">
+                <a16:creationId xmlns:a16="http://schemas.microsoft.com/office/drawing/2014/main" id="{02E72C60-E9CB-362B-BB50-BF13500114A3}"/>
+              </a:ext>
+            </a:extLst>
+          </p:cNvPr>
+          <p:cNvSpPr txBox="1"/>
+          <p:nvPr/>
+        </p:nvSpPr>
+        <p:spPr>
+          <a:xfrm>
+            <a:off x="349984" y="161372"/>
+            <a:ext cx="12181540" cy="638636"/>
+          </a:xfrm>
+          <a:prstGeom prst="rect">
+            <a:avLst/>
+          </a:prstGeom>
+          <a:noFill/>
+        </p:spPr>
+        <p:txBody>
+          <a:bodyPr wrap="none" rtlCol="0">
+            <a:spAutoFit/>
+          </a:bodyPr>
+          <a:lstStyle/>
+          <a:p>
+            <a:r>
+              <a:rPr lang="en-US" sz="3550" b="1" dirty="0">
+                <a:solidFill>
+                  <a:srgbClr val="002060"/>
+                </a:solidFill>
+                <a:latin typeface="Libre Baskerville" pitchFamily="34" charset="0"/>
+              </a:rPr>
+              <a:t>Pandemic Effects Across Customer Segments (1/2)</a:t>
+            </a:r>
+          </a:p>
+        </p:txBody>
+      </p:sp>
+      <p:pic>
+        <p:nvPicPr>
+          <p:cNvPr id="10" name="Picture 9" descr="A pie chart with numbers and a number of percentages&#10;&#10;AI-generated content may be incorrect.">
+            <a:extLst>
+              <a:ext uri="{FF2B5EF4-FFF2-40B4-BE49-F238E27FC236}">
+                <a16:creationId xmlns:a16="http://schemas.microsoft.com/office/drawing/2014/main" id="{A1D69358-C36D-4B8D-77A3-C2116FFA4AB3}"/>
+              </a:ext>
+            </a:extLst>
+          </p:cNvPr>
+          <p:cNvPicPr>
+            <a:picLocks noChangeAspect="1"/>
+          </p:cNvPicPr>
+          <p:nvPr/>
+        </p:nvPicPr>
+        <p:blipFill>
+          <a:blip r:embed="rId2"/>
+          <a:stretch>
+            <a:fillRect/>
+          </a:stretch>
+        </p:blipFill>
+        <p:spPr>
+          <a:xfrm>
+            <a:off x="6460958" y="957444"/>
+            <a:ext cx="8073189" cy="4576702"/>
+          </a:xfrm>
+          <a:prstGeom prst="rect">
+            <a:avLst/>
+          </a:prstGeom>
+        </p:spPr>
+      </p:pic>
+      <p:pic>
+        <p:nvPicPr>
+          <p:cNvPr id="14" name="Picture 13" descr="A pie chart with numbers and a number of percentages&#10;&#10;AI-generated content may be incorrect.">
+            <a:extLst>
+              <a:ext uri="{FF2B5EF4-FFF2-40B4-BE49-F238E27FC236}">
+                <a16:creationId xmlns:a16="http://schemas.microsoft.com/office/drawing/2014/main" id="{DFA64C60-AFE2-F994-D3C4-D35BE61BD365}"/>
+              </a:ext>
+            </a:extLst>
+          </p:cNvPr>
+          <p:cNvPicPr>
+            <a:picLocks noChangeAspect="1"/>
+          </p:cNvPicPr>
+          <p:nvPr/>
+        </p:nvPicPr>
+        <p:blipFill>
+          <a:blip r:embed="rId3"/>
+          <a:stretch>
+            <a:fillRect/>
+          </a:stretch>
+        </p:blipFill>
+        <p:spPr>
+          <a:xfrm>
+            <a:off x="261108" y="920507"/>
+            <a:ext cx="6217087" cy="4553917"/>
+          </a:xfrm>
+          <a:prstGeom prst="rect">
+            <a:avLst/>
+          </a:prstGeom>
+        </p:spPr>
+      </p:pic>
+    </p:spTree>
+    <p:extLst>
+      <p:ext uri="{BB962C8B-B14F-4D97-AF65-F5344CB8AC3E}">
+        <p14:creationId xmlns:p14="http://schemas.microsoft.com/office/powerpoint/2010/main" val="2952070450"/>
+      </p:ext>
+    </p:extLst>
+  </p:cSld>
+  <p:clrMapOvr>
+    <a:masterClrMapping/>
+  </p:clrMapOvr>
+</p:sld>
+</file>
+
+<file path=ppt/slides/slide19.xml><?xml version="1.0" encoding="utf-8"?>
 <p:sld xmlns:a="http://schemas.openxmlformats.org/drawingml/2006/main" xmlns:r="http://schemas.openxmlformats.org/officeDocument/2006/relationships" xmlns:p="http://schemas.openxmlformats.org/presentationml/2006/main">
   <p:cSld>
     <p:spTree>
@@ -5163,7 +6330,25 @@
                 </a:solidFill>
                 <a:latin typeface="Libre Baskerville" pitchFamily="34" charset="0"/>
               </a:rPr>
-              <a:t>Table Of Contents</a:t>
+              <a:t>Table </a:t>
+            </a:r>
+            <a:r>
+              <a:rPr lang="en-US" sz="3550" kern="1200" dirty="0">
+                <a:solidFill>
+                  <a:srgbClr val="002060"/>
+                </a:solidFill>
+                <a:latin typeface="Libre Baskerville" pitchFamily="34" charset="0"/>
+              </a:rPr>
+              <a:t>o</a:t>
+            </a:r>
+            <a:r>
+              <a:rPr sz="3550" kern="1200" dirty="0">
+                <a:solidFill>
+                  <a:srgbClr val="002060"/>
+                </a:solidFill>
+                <a:latin typeface="Libre Baskerville" pitchFamily="34" charset="0"/>
+              </a:rPr>
+              <a:t>f Contents</a:t>
             </a:r>
           </a:p>
         </p:txBody>
@@ -5183,10 +6368,13 @@
             <a:avLst/>
           </a:prstGeom>
           <a:solidFill>
-            <a:schemeClr val="accent1">
-              <a:lumMod val="50000"/>
-            </a:schemeClr>
+            <a:schemeClr val="bg1"/>
           </a:solidFill>
+          <a:ln>
+            <a:solidFill>
+              <a:srgbClr val="002060"/>
+            </a:solidFill>
+          </a:ln>
         </p:spPr>
         <p:txBody>
           <a:bodyPr vert="horz" wrap="square" lIns="0" tIns="122682" rIns="0" bIns="0" rtlCol="0">
@@ -5203,7 +6391,7 @@
             <a:r>
               <a:rPr sz="2400" b="1" kern="0" spc="-30" dirty="0">
                 <a:solidFill>
-                  <a:srgbClr val="FFFFFF"/>
+                  <a:srgbClr val="002060"/>
                 </a:solidFill>
                 <a:latin typeface="DM Sans" pitchFamily="2" charset="0"/>
                 <a:cs typeface="Calibri"/>
@@ -5212,7 +6400,7 @@
             </a:r>
             <a:endParaRPr sz="2400" kern="0">
               <a:solidFill>
-                <a:sysClr val="windowText" lastClr="000000"/>
+                <a:srgbClr val="002060"/>
               </a:solidFill>
               <a:latin typeface="DM Sans" pitchFamily="2" charset="0"/>
               <a:cs typeface="Calibri"/>
@@ -5250,12 +6438,16 @@
               <a:defRPr/>
             </a:pPr>
             <a:r>
-              <a:rPr lang="en-US" sz="2400" dirty="0"/>
+              <a:rPr lang="en-US" sz="2400" dirty="0">
+                <a:solidFill>
+                  <a:srgbClr val="002060"/>
+                </a:solidFill>
+              </a:rPr>
               <a:t>When were customer volumes first impacted by COVID-19?</a:t>
             </a:r>
             <a:endParaRPr lang="en-US" sz="2400" dirty="0">
               <a:solidFill>
-                <a:prstClr val="black"/>
+                <a:srgbClr val="002060"/>
               </a:solidFill>
               <a:latin typeface="DM Sans" pitchFamily="2" charset="0"/>
             </a:endParaRPr>
@@ -5277,10 +6469,13 @@
             <a:avLst/>
           </a:prstGeom>
           <a:solidFill>
-            <a:schemeClr val="accent1">
-              <a:lumMod val="50000"/>
-            </a:schemeClr>
+            <a:schemeClr val="bg1"/>
           </a:solidFill>
+          <a:ln>
+            <a:solidFill>
+              <a:srgbClr val="002060"/>
+            </a:solidFill>
+          </a:ln>
         </p:spPr>
         <p:txBody>
           <a:bodyPr vert="horz" wrap="square" lIns="0" tIns="134112" rIns="0" bIns="0" rtlCol="0">
@@ -5297,7 +6492,7 @@
             <a:r>
               <a:rPr sz="2400" b="1" kern="0" spc="-30" dirty="0">
                 <a:solidFill>
-                  <a:srgbClr val="FFFFFF"/>
+                  <a:srgbClr val="002060"/>
                 </a:solidFill>
                 <a:latin typeface="DM Sans" pitchFamily="2" charset="0"/>
                 <a:cs typeface="Calibri"/>
@@ -5306,7 +6501,7 @@
             </a:r>
             <a:endParaRPr sz="2400" kern="0" dirty="0">
               <a:solidFill>
-                <a:sysClr val="windowText" lastClr="000000"/>
+                <a:srgbClr val="002060"/>
               </a:solidFill>
               <a:latin typeface="DM Sans" pitchFamily="2" charset="0"/>
               <a:cs typeface="Calibri"/>
@@ -5346,7 +6541,7 @@
             <a:r>
               <a:rPr lang="en-US" sz="2400" dirty="0">
                 <a:solidFill>
-                  <a:prstClr val="black"/>
+                  <a:srgbClr val="002060"/>
                 </a:solidFill>
                 <a:latin typeface="DM Sans" pitchFamily="2" charset="0"/>
               </a:rPr>
@@ -5370,10 +6565,13 @@
             <a:avLst/>
           </a:prstGeom>
           <a:solidFill>
-            <a:schemeClr val="accent1">
-              <a:lumMod val="50000"/>
-            </a:schemeClr>
+            <a:schemeClr val="bg1"/>
           </a:solidFill>
+          <a:ln>
+            <a:solidFill>
+              <a:srgbClr val="002060"/>
+            </a:solidFill>
+          </a:ln>
         </p:spPr>
         <p:txBody>
           <a:bodyPr vert="horz" wrap="square" lIns="0" tIns="122682" rIns="0" bIns="0" rtlCol="0">
@@ -5390,7 +6588,7 @@
             <a:r>
               <a:rPr sz="2400" b="1" kern="0" spc="-30" dirty="0">
                 <a:solidFill>
-                  <a:srgbClr val="FFFFFF"/>
+                  <a:srgbClr val="002060"/>
                 </a:solidFill>
                 <a:latin typeface="DM Sans" pitchFamily="2" charset="0"/>
                 <a:cs typeface="Calibri"/>
@@ -5399,7 +6597,7 @@
             </a:r>
             <a:endParaRPr sz="2400" kern="0">
               <a:solidFill>
-                <a:sysClr val="windowText" lastClr="000000"/>
+                <a:srgbClr val="002060"/>
               </a:solidFill>
               <a:latin typeface="DM Sans" pitchFamily="2" charset="0"/>
               <a:cs typeface="Calibri"/>
@@ -5437,12 +6635,16 @@
               <a:defRPr/>
             </a:pPr>
             <a:r>
-              <a:rPr lang="en-US" sz="2400" dirty="0"/>
+              <a:rPr lang="en-US" sz="2400" dirty="0">
+                <a:solidFill>
+                  <a:srgbClr val="002060"/>
+                </a:solidFill>
+              </a:rPr>
               <a:t>What events within the COVID timeline may have contributed to the change?</a:t>
             </a:r>
             <a:endParaRPr lang="en-US" sz="2400" dirty="0">
               <a:solidFill>
-                <a:prstClr val="black"/>
+                <a:srgbClr val="002060"/>
               </a:solidFill>
               <a:latin typeface="DM Sans" pitchFamily="2" charset="0"/>
             </a:endParaRPr>
@@ -5464,10 +6666,13 @@
             <a:avLst/>
           </a:prstGeom>
           <a:solidFill>
-            <a:schemeClr val="accent1">
-              <a:lumMod val="50000"/>
-            </a:schemeClr>
+            <a:schemeClr val="bg1"/>
           </a:solidFill>
+          <a:ln>
+            <a:solidFill>
+              <a:srgbClr val="002060"/>
+            </a:solidFill>
+          </a:ln>
         </p:spPr>
         <p:txBody>
           <a:bodyPr vert="horz" wrap="square" lIns="0" tIns="123444" rIns="0" bIns="0" rtlCol="0">
@@ -5484,7 +6689,7 @@
             <a:r>
               <a:rPr lang="en-GB" sz="2400" b="1" kern="0" spc="-30" dirty="0">
                 <a:solidFill>
-                  <a:srgbClr val="FFFFFF"/>
+                  <a:srgbClr val="002060"/>
                 </a:solidFill>
                 <a:latin typeface="DM Sans" pitchFamily="2" charset="0"/>
                 <a:cs typeface="Calibri"/>
@@ -5494,7 +6699,7 @@
             <a:r>
               <a:rPr sz="2400" b="1" kern="0" spc="-30" dirty="0">
                 <a:solidFill>
-                  <a:srgbClr val="FFFFFF"/>
+                  <a:srgbClr val="002060"/>
                 </a:solidFill>
                 <a:latin typeface="DM Sans" pitchFamily="2" charset="0"/>
                 <a:cs typeface="Calibri"/>
@@ -5503,7 +6708,7 @@
             </a:r>
             <a:endParaRPr sz="2400" kern="0" dirty="0">
               <a:solidFill>
-                <a:sysClr val="windowText" lastClr="000000"/>
+                <a:srgbClr val="002060"/>
               </a:solidFill>
               <a:latin typeface="DM Sans" pitchFamily="2" charset="0"/>
               <a:cs typeface="Calibri"/>
@@ -5541,12 +6746,16 @@
               <a:defRPr/>
             </a:pPr>
             <a:r>
-              <a:rPr lang="en-US" sz="2400" dirty="0"/>
+              <a:rPr lang="en-US" sz="2400" dirty="0">
+                <a:solidFill>
+                  <a:srgbClr val="002060"/>
+                </a:solidFill>
+              </a:rPr>
               <a:t>What % of each customer group is growing, stable, or declining?</a:t>
             </a:r>
             <a:endParaRPr lang="en-US" sz="2400" dirty="0">
               <a:solidFill>
-                <a:prstClr val="black"/>
+                <a:srgbClr val="002060"/>
               </a:solidFill>
               <a:latin typeface="DM Sans" pitchFamily="2" charset="0"/>
             </a:endParaRPr>
@@ -5568,10 +6777,13 @@
             <a:avLst/>
           </a:prstGeom>
           <a:solidFill>
-            <a:schemeClr val="accent1">
-              <a:lumMod val="50000"/>
-            </a:schemeClr>
+            <a:schemeClr val="bg1"/>
           </a:solidFill>
+          <a:ln>
+            <a:solidFill>
+              <a:srgbClr val="002060"/>
+            </a:solidFill>
+          </a:ln>
         </p:spPr>
         <p:txBody>
           <a:bodyPr vert="horz" wrap="square" lIns="0" tIns="134874" rIns="0" bIns="0" rtlCol="0">
@@ -5588,7 +6800,7 @@
             <a:r>
               <a:rPr sz="2400" b="1" kern="0" spc="-30" dirty="0">
                 <a:solidFill>
-                  <a:srgbClr val="FFFFFF"/>
+                  <a:srgbClr val="002060"/>
                 </a:solidFill>
                 <a:latin typeface="DM Sans" pitchFamily="2" charset="0"/>
                 <a:cs typeface="Calibri"/>
@@ -5597,7 +6809,7 @@
             </a:r>
             <a:endParaRPr sz="2400" kern="0">
               <a:solidFill>
-                <a:sysClr val="windowText" lastClr="000000"/>
+                <a:srgbClr val="002060"/>
               </a:solidFill>
               <a:latin typeface="DM Sans" pitchFamily="2" charset="0"/>
               <a:cs typeface="Calibri"/>
@@ -5635,12 +6847,16 @@
               <a:defRPr/>
             </a:pPr>
             <a:r>
-              <a:rPr lang="en-US" sz="2400" dirty="0"/>
+              <a:rPr lang="en-US" sz="2400" dirty="0">
+                <a:solidFill>
+                  <a:srgbClr val="002060"/>
+                </a:solidFill>
+              </a:rPr>
               <a:t>How did COVID-19 impact peak season in 2020?</a:t>
             </a:r>
             <a:endParaRPr lang="en-US" sz="2400" dirty="0">
               <a:solidFill>
-                <a:prstClr val="black"/>
+                <a:srgbClr val="002060"/>
               </a:solidFill>
               <a:latin typeface="DM Sans" pitchFamily="2" charset="0"/>
             </a:endParaRPr>
@@ -5662,10 +6878,13 @@
             <a:avLst/>
           </a:prstGeom>
           <a:solidFill>
-            <a:schemeClr val="accent1">
-              <a:lumMod val="50000"/>
-            </a:schemeClr>
+            <a:schemeClr val="bg1"/>
           </a:solidFill>
+          <a:ln>
+            <a:solidFill>
+              <a:srgbClr val="002060"/>
+            </a:solidFill>
+          </a:ln>
         </p:spPr>
         <p:txBody>
           <a:bodyPr vert="horz" wrap="square" lIns="0" tIns="123444" rIns="0" bIns="0" rtlCol="0">
@@ -5682,7 +6901,7 @@
             <a:r>
               <a:rPr lang="en-GB" sz="2400" b="1" kern="0" spc="-30" dirty="0">
                 <a:solidFill>
-                  <a:srgbClr val="FFFFFF"/>
+                  <a:srgbClr val="002060"/>
                 </a:solidFill>
                 <a:latin typeface="DM Sans" pitchFamily="2" charset="0"/>
                 <a:cs typeface="Calibri"/>
@@ -5692,7 +6911,7 @@
             <a:r>
               <a:rPr sz="2400" b="1" kern="0" spc="-30" dirty="0">
                 <a:solidFill>
-                  <a:srgbClr val="FFFFFF"/>
+                  <a:srgbClr val="002060"/>
                 </a:solidFill>
                 <a:latin typeface="DM Sans" pitchFamily="2" charset="0"/>
                 <a:cs typeface="Calibri"/>
@@ -5701,7 +6920,7 @@
             </a:r>
             <a:endParaRPr sz="2400" kern="0" dirty="0">
               <a:solidFill>
-                <a:sysClr val="windowText" lastClr="000000"/>
+                <a:srgbClr val="002060"/>
               </a:solidFill>
               <a:latin typeface="DM Sans" pitchFamily="2" charset="0"/>
               <a:cs typeface="Calibri"/>
@@ -5739,12 +6958,16 @@
               <a:defRPr/>
             </a:pPr>
             <a:r>
-              <a:rPr lang="en-US" sz="2400" dirty="0"/>
+              <a:rPr lang="en-US" sz="2400" dirty="0">
+                <a:solidFill>
+                  <a:srgbClr val="002060"/>
+                </a:solidFill>
+              </a:rPr>
               <a:t>How has COVID affected different customer groups (Enterprise, Large, etc.)?</a:t>
             </a:r>
             <a:endParaRPr lang="en-US" sz="2400" dirty="0">
               <a:solidFill>
-                <a:prstClr val="black"/>
+                <a:srgbClr val="002060"/>
               </a:solidFill>
               <a:latin typeface="DM Sans" pitchFamily="2" charset="0"/>
             </a:endParaRPr>
@@ -5766,10 +6989,13 @@
             <a:avLst/>
           </a:prstGeom>
           <a:solidFill>
-            <a:schemeClr val="accent1">
-              <a:lumMod val="50000"/>
-            </a:schemeClr>
+            <a:schemeClr val="bg1"/>
           </a:solidFill>
+          <a:ln>
+            <a:solidFill>
+              <a:srgbClr val="002060"/>
+            </a:solidFill>
+          </a:ln>
         </p:spPr>
         <p:txBody>
           <a:bodyPr vert="horz" wrap="square" lIns="0" tIns="123444" rIns="0" bIns="0" rtlCol="0">
@@ -5786,7 +7012,7 @@
             <a:r>
               <a:rPr lang="en-GB" sz="2400" b="1" kern="0" spc="-30" dirty="0">
                 <a:solidFill>
-                  <a:srgbClr val="FFFFFF"/>
+                  <a:srgbClr val="002060"/>
                 </a:solidFill>
                 <a:latin typeface="DM Sans" pitchFamily="2" charset="0"/>
                 <a:cs typeface="Calibri"/>
@@ -5796,7 +7022,7 @@
             <a:r>
               <a:rPr sz="2400" b="1" kern="0" spc="-30" dirty="0">
                 <a:solidFill>
-                  <a:srgbClr val="FFFFFF"/>
+                  <a:srgbClr val="002060"/>
                 </a:solidFill>
                 <a:latin typeface="DM Sans" pitchFamily="2" charset="0"/>
                 <a:cs typeface="Calibri"/>
@@ -5805,7 +7031,7 @@
             </a:r>
             <a:endParaRPr sz="2400" kern="0" dirty="0">
               <a:solidFill>
-                <a:sysClr val="windowText" lastClr="000000"/>
+                <a:srgbClr val="002060"/>
               </a:solidFill>
               <a:latin typeface="DM Sans" pitchFamily="2" charset="0"/>
               <a:cs typeface="Calibri"/>
@@ -5849,12 +7075,16 @@
               <a:defRPr/>
             </a:pPr>
             <a:r>
-              <a:rPr lang="en-US" sz="2400" dirty="0"/>
+              <a:rPr lang="en-US" sz="2400" dirty="0">
+                <a:solidFill>
+                  <a:srgbClr val="002060"/>
+                </a:solidFill>
+              </a:rPr>
               <a:t>What % of each group are new customers during COVID?</a:t>
             </a:r>
             <a:endParaRPr lang="en-US" sz="2400" dirty="0">
               <a:solidFill>
-                <a:prstClr val="black"/>
+                <a:srgbClr val="002060"/>
               </a:solidFill>
               <a:latin typeface="DM Sans" pitchFamily="2" charset="0"/>
             </a:endParaRPr>
@@ -5897,12 +7127,16 @@
               <a:defRPr/>
             </a:pPr>
             <a:r>
-              <a:rPr lang="en-US" sz="2400" dirty="0"/>
+              <a:rPr lang="en-US" sz="2400" dirty="0">
+                <a:solidFill>
+                  <a:srgbClr val="002060"/>
+                </a:solidFill>
+              </a:rPr>
               <a:t>What % of 2019 customers in each group were lost?</a:t>
             </a:r>
             <a:endParaRPr lang="en-US" sz="2400" dirty="0">
               <a:solidFill>
-                <a:prstClr val="black"/>
+                <a:srgbClr val="002060"/>
               </a:solidFill>
               <a:latin typeface="DM Sans" pitchFamily="2" charset="0"/>
             </a:endParaRPr>
@@ -5945,12 +7179,16 @@
               <a:defRPr/>
             </a:pPr>
             <a:r>
-              <a:rPr lang="en-US" sz="2400" dirty="0"/>
+              <a:rPr lang="en-US" sz="2400" dirty="0">
+                <a:solidFill>
+                  <a:srgbClr val="002060"/>
+                </a:solidFill>
+              </a:rPr>
               <a:t>What was the overall impact on volume and revenue by group?</a:t>
             </a:r>
             <a:endParaRPr lang="en-US" sz="2400" dirty="0">
               <a:solidFill>
-                <a:prstClr val="black"/>
+                <a:srgbClr val="002060"/>
               </a:solidFill>
               <a:latin typeface="DM Sans" pitchFamily="2" charset="0"/>
             </a:endParaRPr>
@@ -5978,10 +7216,13 @@
             <a:avLst/>
           </a:prstGeom>
           <a:solidFill>
-            <a:schemeClr val="accent1">
-              <a:lumMod val="50000"/>
-            </a:schemeClr>
+            <a:schemeClr val="bg1"/>
           </a:solidFill>
+          <a:ln>
+            <a:solidFill>
+              <a:srgbClr val="002060"/>
+            </a:solidFill>
+          </a:ln>
         </p:spPr>
         <p:txBody>
           <a:bodyPr vert="horz" wrap="square" lIns="0" tIns="123444" rIns="0" bIns="0" rtlCol="0">
@@ -5998,7 +7239,7 @@
             <a:r>
               <a:rPr lang="en-GB" sz="2400" b="1" kern="0" spc="-30" dirty="0">
                 <a:solidFill>
-                  <a:srgbClr val="FFFFFF"/>
+                  <a:srgbClr val="002060"/>
                 </a:solidFill>
                 <a:latin typeface="DM Sans" pitchFamily="2" charset="0"/>
                 <a:cs typeface="Calibri"/>
@@ -6008,7 +7249,7 @@
             <a:r>
               <a:rPr sz="2400" b="1" kern="0" spc="-30" dirty="0">
                 <a:solidFill>
-                  <a:srgbClr val="FFFFFF"/>
+                  <a:srgbClr val="002060"/>
                 </a:solidFill>
                 <a:latin typeface="DM Sans" pitchFamily="2" charset="0"/>
                 <a:cs typeface="Calibri"/>
@@ -6017,7 +7258,7 @@
             </a:r>
             <a:endParaRPr sz="2400" kern="0" dirty="0">
               <a:solidFill>
-                <a:sysClr val="windowText" lastClr="000000"/>
+                <a:srgbClr val="002060"/>
               </a:solidFill>
               <a:latin typeface="DM Sans" pitchFamily="2" charset="0"/>
               <a:cs typeface="Calibri"/>
@@ -6046,10 +7287,13 @@
             <a:avLst/>
           </a:prstGeom>
           <a:solidFill>
-            <a:schemeClr val="accent1">
-              <a:lumMod val="50000"/>
-            </a:schemeClr>
+            <a:schemeClr val="bg1"/>
           </a:solidFill>
+          <a:ln>
+            <a:solidFill>
+              <a:srgbClr val="002060"/>
+            </a:solidFill>
+          </a:ln>
         </p:spPr>
         <p:txBody>
           <a:bodyPr vert="horz" wrap="square" lIns="0" tIns="123444" rIns="0" bIns="0" rtlCol="0">
@@ -6066,7 +7310,7 @@
             <a:r>
               <a:rPr lang="en-GB" sz="2400" b="1" kern="0" spc="-30" dirty="0">
                 <a:solidFill>
-                  <a:srgbClr val="FFFFFF"/>
+                  <a:srgbClr val="002060"/>
                 </a:solidFill>
                 <a:latin typeface="DM Sans" pitchFamily="2" charset="0"/>
                 <a:cs typeface="Calibri"/>
@@ -6076,7 +7320,7 @@
             <a:r>
               <a:rPr sz="2400" b="1" kern="0" spc="-30" dirty="0">
                 <a:solidFill>
-                  <a:srgbClr val="FFFFFF"/>
+                  <a:srgbClr val="002060"/>
                 </a:solidFill>
                 <a:latin typeface="DM Sans" pitchFamily="2" charset="0"/>
                 <a:cs typeface="Calibri"/>
@@ -6085,7 +7329,7 @@
             </a:r>
             <a:endParaRPr sz="2400" kern="0" dirty="0">
               <a:solidFill>
-                <a:sysClr val="windowText" lastClr="000000"/>
+                <a:srgbClr val="002060"/>
               </a:solidFill>
               <a:latin typeface="DM Sans" pitchFamily="2" charset="0"/>
               <a:cs typeface="Calibri"/>
@@ -6094,6 +7338,66 @@
         </p:txBody>
       </p:sp>
     </p:spTree>
+  </p:cSld>
+  <p:clrMapOvr>
+    <a:masterClrMapping/>
+  </p:clrMapOvr>
+</p:sld>
+</file>
+
+<file path=ppt/slides/slide20.xml><?xml version="1.0" encoding="utf-8"?>
+<p:sld xmlns:a="http://schemas.openxmlformats.org/drawingml/2006/main" xmlns:r="http://schemas.openxmlformats.org/officeDocument/2006/relationships" xmlns:p="http://schemas.openxmlformats.org/presentationml/2006/main">
+  <p:cSld>
+    <p:spTree>
+      <p:nvGrpSpPr>
+        <p:cNvPr id="1" name=""/>
+        <p:cNvGrpSpPr/>
+        <p:nvPr/>
+      </p:nvGrpSpPr>
+      <p:grpSpPr>
+        <a:xfrm>
+          <a:off x="0" y="0"/>
+          <a:ext cx="0" cy="0"/>
+          <a:chOff x="0" y="0"/>
+          <a:chExt cx="0" cy="0"/>
+        </a:xfrm>
+      </p:grpSpPr>
+      <p:pic>
+        <p:nvPicPr>
+          <p:cNvPr id="3" name="Picture 2" descr="A close-up of a graph&#10;&#10;AI-generated content may be incorrect.">
+            <a:extLst>
+              <a:ext uri="{FF2B5EF4-FFF2-40B4-BE49-F238E27FC236}">
+                <a16:creationId xmlns:a16="http://schemas.microsoft.com/office/drawing/2014/main" id="{D26ABEB1-F9D1-6C7A-ED62-0A08843D7C9D}"/>
+              </a:ext>
+            </a:extLst>
+          </p:cNvPr>
+          <p:cNvPicPr>
+            <a:picLocks noChangeAspect="1"/>
+          </p:cNvPicPr>
+          <p:nvPr/>
+        </p:nvPicPr>
+        <p:blipFill>
+          <a:blip r:embed="rId2"/>
+          <a:stretch>
+            <a:fillRect/>
+          </a:stretch>
+        </p:blipFill>
+        <p:spPr>
+          <a:xfrm>
+            <a:off x="0" y="127814"/>
+            <a:ext cx="14630400" cy="8175812"/>
+          </a:xfrm>
+          <a:prstGeom prst="rect">
+            <a:avLst/>
+          </a:prstGeom>
+        </p:spPr>
+      </p:pic>
+    </p:spTree>
+    <p:extLst>
+      <p:ext uri="{BB962C8B-B14F-4D97-AF65-F5344CB8AC3E}">
+        <p14:creationId xmlns:p14="http://schemas.microsoft.com/office/powerpoint/2010/main" val="2468848264"/>
+      </p:ext>
+    </p:extLst>
   </p:cSld>
   <p:clrMapOvr>
     <a:masterClrMapping/>
@@ -6117,7 +7421,7 @@
         <p:cNvPr id="1" name="">
           <a:extLst>
             <a:ext uri="{FF2B5EF4-FFF2-40B4-BE49-F238E27FC236}">
-              <a16:creationId xmlns:a16="http://schemas.microsoft.com/office/drawing/2014/main" id="{08BD8CDE-884D-E2D2-56D9-7FE9D721171A}"/>
+              <a16:creationId xmlns:a16="http://schemas.microsoft.com/office/drawing/2014/main" id="{43D20305-B12A-E8CA-233A-8920326F4CC1}"/>
             </a:ext>
           </a:extLst>
         </p:cNvPr>
@@ -6137,7 +7441,7 @@
           <p:cNvPr id="20" name="Text 0">
             <a:extLst>
               <a:ext uri="{FF2B5EF4-FFF2-40B4-BE49-F238E27FC236}">
-                <a16:creationId xmlns:a16="http://schemas.microsoft.com/office/drawing/2014/main" id="{F8DE7BF9-B920-4054-7509-A991DEE3DDB4}"/>
+                <a16:creationId xmlns:a16="http://schemas.microsoft.com/office/drawing/2014/main" id="{489D208E-4489-34F8-0122-91ADB6286267}"/>
               </a:ext>
             </a:extLst>
           </p:cNvPr>
@@ -6146,8 +7450,8 @@
         </p:nvSpPr>
         <p:spPr>
           <a:xfrm>
-            <a:off x="247134" y="260261"/>
-            <a:ext cx="14185557" cy="866258"/>
+            <a:off x="290384" y="59622"/>
+            <a:ext cx="14049632" cy="866258"/>
           </a:xfrm>
           <a:prstGeom prst="rect">
             <a:avLst/>
@@ -6161,7 +7465,7 @@
           <a:bodyPr wrap="none" lIns="0" tIns="0" rIns="0" bIns="0" rtlCol="0" anchor="ctr"/>
           <a:lstStyle/>
           <a:p>
-            <a:pPr marL="0" indent="0" algn="ctr">
+            <a:pPr marL="0" indent="0">
               <a:lnSpc>
                 <a:spcPts val="4450"/>
               </a:lnSpc>
@@ -6188,10 +7492,10 @@
       </p:sp>
       <p:sp>
         <p:nvSpPr>
-          <p:cNvPr id="21" name="Shape 1">
+          <p:cNvPr id="6" name="Text 3">
             <a:extLst>
               <a:ext uri="{FF2B5EF4-FFF2-40B4-BE49-F238E27FC236}">
-                <a16:creationId xmlns:a16="http://schemas.microsoft.com/office/drawing/2014/main" id="{B2F7F7E6-DBB9-DCD6-A081-6AC248A0913D}"/>
+                <a16:creationId xmlns:a16="http://schemas.microsoft.com/office/drawing/2014/main" id="{57A9D4AC-59ED-85FA-432A-04DAF210D46F}"/>
               </a:ext>
             </a:extLst>
           </p:cNvPr>
@@ -6200,104 +7504,19 @@
         </p:nvSpPr>
         <p:spPr>
           <a:xfrm>
-            <a:off x="793790" y="1554662"/>
-            <a:ext cx="510302" cy="510302"/>
-          </a:xfrm>
-          <a:prstGeom prst="roundRect">
-            <a:avLst>
-              <a:gd name="adj" fmla="val 18669"/>
-            </a:avLst>
-          </a:prstGeom>
-          <a:solidFill>
-            <a:srgbClr val="002060"/>
-          </a:solidFill>
-          <a:ln w="7620">
-            <a:noFill/>
-            <a:prstDash val="solid"/>
-          </a:ln>
-        </p:spPr>
-        <p:txBody>
-          <a:bodyPr/>
-          <a:lstStyle/>
-          <a:p>
-            <a:endParaRPr lang="en-US"/>
-          </a:p>
-        </p:txBody>
-      </p:sp>
-      <p:sp>
-        <p:nvSpPr>
-          <p:cNvPr id="22" name="Text 2">
-            <a:extLst>
-              <a:ext uri="{FF2B5EF4-FFF2-40B4-BE49-F238E27FC236}">
-                <a16:creationId xmlns:a16="http://schemas.microsoft.com/office/drawing/2014/main" id="{27E76B17-5F38-B050-5197-5D78DE9684D6}"/>
-              </a:ext>
-            </a:extLst>
-          </p:cNvPr>
-          <p:cNvSpPr/>
-          <p:nvPr/>
-        </p:nvSpPr>
-        <p:spPr>
-          <a:xfrm>
-            <a:off x="1530906" y="1632529"/>
-            <a:ext cx="3349466" cy="354330"/>
+            <a:off x="8331201" y="1034378"/>
+            <a:ext cx="6008815" cy="6845312"/>
           </a:xfrm>
           <a:prstGeom prst="rect">
             <a:avLst/>
           </a:prstGeom>
           <a:noFill/>
           <a:ln/>
-        </p:spPr>
-        <p:txBody>
-          <a:bodyPr wrap="none" lIns="0" tIns="0" rIns="0" bIns="0" rtlCol="0" anchor="t"/>
-          <a:lstStyle/>
-          <a:p>
-            <a:pPr marL="0" indent="0" algn="l">
-              <a:lnSpc>
-                <a:spcPts val="2750"/>
-              </a:lnSpc>
-              <a:buNone/>
-            </a:pPr>
-            <a:r>
-              <a:rPr lang="en-US" sz="2200" b="1" dirty="0">
-                <a:solidFill>
-                  <a:srgbClr val="002060"/>
-                </a:solidFill>
-                <a:latin typeface="Libre Baskerville" pitchFamily="34" charset="0"/>
-                <a:ea typeface="Libre Baskerville" pitchFamily="34" charset="-122"/>
-                <a:cs typeface="Libre Baskerville" pitchFamily="34" charset="-120"/>
-              </a:rPr>
-              <a:t>Volume Surge:</a:t>
-            </a:r>
-            <a:endParaRPr lang="en-US" sz="2200" b="1" dirty="0">
-              <a:solidFill>
-                <a:srgbClr val="002060"/>
-              </a:solidFill>
-            </a:endParaRPr>
-          </a:p>
-        </p:txBody>
-      </p:sp>
-      <p:sp>
-        <p:nvSpPr>
-          <p:cNvPr id="23" name="Text 3">
-            <a:extLst>
-              <a:ext uri="{FF2B5EF4-FFF2-40B4-BE49-F238E27FC236}">
-                <a16:creationId xmlns:a16="http://schemas.microsoft.com/office/drawing/2014/main" id="{4BFA05C9-075C-DD58-92CE-A7FD241B6AAD}"/>
-              </a:ext>
-            </a:extLst>
-          </p:cNvPr>
-          <p:cNvSpPr/>
-          <p:nvPr/>
-        </p:nvSpPr>
-        <p:spPr>
-          <a:xfrm>
-            <a:off x="1530906" y="2122948"/>
-            <a:ext cx="5642491" cy="1088708"/>
-          </a:xfrm>
-          <a:prstGeom prst="rect">
-            <a:avLst/>
-          </a:prstGeom>
-          <a:noFill/>
-          <a:ln/>
+          <a:effectLst>
+            <a:outerShdw blurRad="50800" algn="ctr" rotWithShape="0">
+              <a:schemeClr val="bg1"/>
+            </a:outerShdw>
+          </a:effectLst>
         </p:spPr>
         <p:txBody>
           <a:bodyPr wrap="square" lIns="0" tIns="0" rIns="0" bIns="0" rtlCol="0" anchor="t"/>
@@ -6309,90 +7528,7 @@
               </a:lnSpc>
             </a:pPr>
             <a:r>
-              <a:rPr lang="en-US" sz="1750" dirty="0">
-                <a:solidFill>
-                  <a:srgbClr val="002060"/>
-                </a:solidFill>
-                <a:latin typeface="DM Sans" pitchFamily="34" charset="0"/>
-              </a:rPr>
-              <a:t>Parcel volume increased by +47.84% during the COVID Observation Period (Week 12–53, 2020 vs 2019), well above the pre-COVID baseline (ISGR: +11.40%).</a:t>
-            </a:r>
-          </a:p>
-        </p:txBody>
-      </p:sp>
-      <p:sp>
-        <p:nvSpPr>
-          <p:cNvPr id="24" name="Shape 4">
-            <a:extLst>
-              <a:ext uri="{FF2B5EF4-FFF2-40B4-BE49-F238E27FC236}">
-                <a16:creationId xmlns:a16="http://schemas.microsoft.com/office/drawing/2014/main" id="{3B692721-432C-D241-6693-B1775C0D41F3}"/>
-              </a:ext>
-            </a:extLst>
-          </p:cNvPr>
-          <p:cNvSpPr/>
-          <p:nvPr/>
-        </p:nvSpPr>
-        <p:spPr>
-          <a:xfrm>
-            <a:off x="7456884" y="1554662"/>
-            <a:ext cx="510302" cy="510302"/>
-          </a:xfrm>
-          <a:prstGeom prst="roundRect">
-            <a:avLst>
-              <a:gd name="adj" fmla="val 18669"/>
-            </a:avLst>
-          </a:prstGeom>
-          <a:solidFill>
-            <a:srgbClr val="002060"/>
-          </a:solidFill>
-          <a:ln w="7620">
-            <a:noFill/>
-            <a:prstDash val="solid"/>
-          </a:ln>
-        </p:spPr>
-        <p:txBody>
-          <a:bodyPr/>
-          <a:lstStyle/>
-          <a:p>
-            <a:endParaRPr lang="en-US"/>
-          </a:p>
-        </p:txBody>
-      </p:sp>
-      <p:sp>
-        <p:nvSpPr>
-          <p:cNvPr id="25" name="Text 5">
-            <a:extLst>
-              <a:ext uri="{FF2B5EF4-FFF2-40B4-BE49-F238E27FC236}">
-                <a16:creationId xmlns:a16="http://schemas.microsoft.com/office/drawing/2014/main" id="{CCA37185-E118-A512-F797-3DA5A34DD223}"/>
-              </a:ext>
-            </a:extLst>
-          </p:cNvPr>
-          <p:cNvSpPr/>
-          <p:nvPr/>
-        </p:nvSpPr>
-        <p:spPr>
-          <a:xfrm>
-            <a:off x="8194000" y="1632529"/>
-            <a:ext cx="2980015" cy="354330"/>
-          </a:xfrm>
-          <a:prstGeom prst="rect">
-            <a:avLst/>
-          </a:prstGeom>
-          <a:noFill/>
-          <a:ln/>
-        </p:spPr>
-        <p:txBody>
-          <a:bodyPr wrap="none" lIns="0" tIns="0" rIns="0" bIns="0" rtlCol="0" anchor="t"/>
-          <a:lstStyle/>
-          <a:p>
-            <a:pPr marL="0" indent="0" algn="l">
-              <a:lnSpc>
-                <a:spcPts val="2750"/>
-              </a:lnSpc>
-              <a:buNone/>
-            </a:pPr>
-            <a:r>
-              <a:rPr lang="en-US" sz="2200" b="1" dirty="0">
+              <a:rPr lang="en-US" sz="2000" b="1" dirty="0">
                 <a:solidFill>
                   <a:srgbClr val="002060"/>
                 </a:solidFill>
@@ -6400,53 +7536,9 @@
                 <a:ea typeface="Libre Baskerville" pitchFamily="34" charset="-122"/>
                 <a:cs typeface="Libre Baskerville" pitchFamily="34" charset="-120"/>
               </a:rPr>
-              <a:t>Key Inflection Point</a:t>
-            </a:r>
-            <a:r>
-              <a:rPr lang="en-US" sz="2200" dirty="0">
-                <a:solidFill>
-                  <a:srgbClr val="002060"/>
-                </a:solidFill>
-                <a:latin typeface="Libre Baskerville" pitchFamily="34" charset="0"/>
-                <a:ea typeface="Libre Baskerville" pitchFamily="34" charset="-122"/>
-                <a:cs typeface="Libre Baskerville" pitchFamily="34" charset="-120"/>
-              </a:rPr>
-              <a:t>:</a:t>
-            </a:r>
-            <a:endParaRPr lang="en-US" sz="2200" dirty="0">
-              <a:solidFill>
-                <a:srgbClr val="002060"/>
-              </a:solidFill>
-            </a:endParaRPr>
-          </a:p>
-        </p:txBody>
-      </p:sp>
-      <p:sp>
-        <p:nvSpPr>
-          <p:cNvPr id="26" name="Text 6">
-            <a:extLst>
-              <a:ext uri="{FF2B5EF4-FFF2-40B4-BE49-F238E27FC236}">
-                <a16:creationId xmlns:a16="http://schemas.microsoft.com/office/drawing/2014/main" id="{F9793D12-6BBE-A1F8-3919-1291C029B6B0}"/>
-              </a:ext>
-            </a:extLst>
-          </p:cNvPr>
-          <p:cNvSpPr/>
-          <p:nvPr/>
-        </p:nvSpPr>
-        <p:spPr>
-          <a:xfrm>
-            <a:off x="8194000" y="2122948"/>
-            <a:ext cx="5642610" cy="1088708"/>
-          </a:xfrm>
-          <a:prstGeom prst="rect">
-            <a:avLst/>
-          </a:prstGeom>
-          <a:noFill/>
-          <a:ln/>
-        </p:spPr>
-        <p:txBody>
-          <a:bodyPr wrap="square" lIns="0" tIns="0" rIns="0" bIns="0" rtlCol="0" anchor="t"/>
-          <a:lstStyle/>
+              <a:t>Volume Surge: </a:t>
+            </a:r>
+          </a:p>
           <a:p>
             <a:pPr>
               <a:lnSpc>
@@ -6454,312 +7546,393 @@
               </a:lnSpc>
             </a:pPr>
             <a:r>
-              <a:rPr lang="en-US" sz="1750" dirty="0">
+              <a:rPr lang="en-US" sz="2000" dirty="0">
                 <a:solidFill>
                   <a:srgbClr val="002060"/>
                 </a:solidFill>
                 <a:latin typeface="DM Sans" pitchFamily="34" charset="0"/>
-                <a:ea typeface="DM Sans" pitchFamily="34" charset="-122"/>
-                <a:cs typeface="DM Sans" pitchFamily="34" charset="-120"/>
-              </a:rPr>
-              <a:t>The shift began abruptly after  Week 11, 2020, driven by the WHO pandemic declaration and subsequent work-from-home mandates.</a:t>
-            </a:r>
-            <a:endParaRPr lang="en-US" sz="1750" dirty="0">
+              </a:rPr>
+              <a:t>Total Parcel volume in 2020  37%  compared to 2019 above the growth baseline (ISGR: +11.40%).</a:t>
+            </a:r>
+          </a:p>
+          <a:p>
+            <a:pPr>
+              <a:lnSpc>
+                <a:spcPts val="2850"/>
+              </a:lnSpc>
+            </a:pPr>
+            <a:endParaRPr lang="en-US" sz="2000" b="1" dirty="0">
               <a:solidFill>
                 <a:srgbClr val="002060"/>
               </a:solidFill>
+              <a:latin typeface="Libre Baskerville" pitchFamily="34" charset="0"/>
             </a:endParaRPr>
           </a:p>
-        </p:txBody>
-      </p:sp>
-      <p:sp>
-        <p:nvSpPr>
-          <p:cNvPr id="27" name="Shape 7">
+          <a:p>
+            <a:pPr>
+              <a:lnSpc>
+                <a:spcPts val="2850"/>
+              </a:lnSpc>
+            </a:pPr>
+            <a:endParaRPr lang="en-US" sz="2000" b="1" dirty="0">
+              <a:solidFill>
+                <a:srgbClr val="002060"/>
+              </a:solidFill>
+              <a:latin typeface="Libre Baskerville" pitchFamily="34" charset="0"/>
+            </a:endParaRPr>
+          </a:p>
+          <a:p>
+            <a:pPr>
+              <a:lnSpc>
+                <a:spcPts val="2850"/>
+              </a:lnSpc>
+            </a:pPr>
+            <a:r>
+              <a:rPr lang="en-US" sz="2000" b="1" dirty="0">
+                <a:solidFill>
+                  <a:srgbClr val="002060"/>
+                </a:solidFill>
+                <a:latin typeface="Libre Baskerville" pitchFamily="34" charset="0"/>
+              </a:rPr>
+              <a:t>Customer Segment Health</a:t>
+            </a:r>
+          </a:p>
+          <a:p>
+            <a:r>
+              <a:rPr lang="en-US" sz="2000" dirty="0">
+                <a:solidFill>
+                  <a:srgbClr val="002060"/>
+                </a:solidFill>
+                <a:latin typeface="DM Sans" pitchFamily="34" charset="0"/>
+              </a:rPr>
+              <a:t>Total active customers in 2020: 1,046</a:t>
+            </a:r>
+          </a:p>
+          <a:p>
+            <a:pPr marL="742950" lvl="1" indent="-285750">
+              <a:buFont typeface="Arial" panose="020B0604020202020204" pitchFamily="34" charset="0"/>
+              <a:buChar char="•"/>
+            </a:pPr>
+            <a:r>
+              <a:rPr lang="en-US" sz="2000" b="1" dirty="0">
+                <a:solidFill>
+                  <a:srgbClr val="002060"/>
+                </a:solidFill>
+                <a:latin typeface="DM Sans" pitchFamily="34" charset="0"/>
+              </a:rPr>
+              <a:t>Enterprise: </a:t>
+            </a:r>
+            <a:r>
+              <a:rPr lang="en-US" sz="2000" dirty="0">
+                <a:solidFill>
+                  <a:srgbClr val="002060"/>
+                </a:solidFill>
+                <a:latin typeface="DM Sans" pitchFamily="34" charset="0"/>
+              </a:rPr>
+              <a:t>14 (1.34% of total)</a:t>
+            </a:r>
+          </a:p>
+          <a:p>
+            <a:pPr marL="742950" lvl="1" indent="-285750">
+              <a:buFont typeface="Arial" panose="020B0604020202020204" pitchFamily="34" charset="0"/>
+              <a:buChar char="•"/>
+            </a:pPr>
+            <a:r>
+              <a:rPr lang="en-US" sz="2000" b="1" dirty="0">
+                <a:solidFill>
+                  <a:srgbClr val="002060"/>
+                </a:solidFill>
+                <a:latin typeface="DM Sans" pitchFamily="34" charset="0"/>
+              </a:rPr>
+              <a:t>Large</a:t>
+            </a:r>
+            <a:r>
+              <a:rPr lang="en-US" sz="2000" dirty="0">
+                <a:solidFill>
+                  <a:srgbClr val="002060"/>
+                </a:solidFill>
+                <a:latin typeface="DM Sans" pitchFamily="34" charset="0"/>
+              </a:rPr>
+              <a:t>: 22 (2.10% of total)</a:t>
+            </a:r>
+          </a:p>
+          <a:p>
+            <a:pPr marL="742950" lvl="1" indent="-285750">
+              <a:buFont typeface="Arial" panose="020B0604020202020204" pitchFamily="34" charset="0"/>
+              <a:buChar char="•"/>
+            </a:pPr>
+            <a:r>
+              <a:rPr lang="en-US" sz="2000" b="1" dirty="0">
+                <a:solidFill>
+                  <a:srgbClr val="002060"/>
+                </a:solidFill>
+                <a:latin typeface="DM Sans" pitchFamily="34" charset="0"/>
+              </a:rPr>
+              <a:t>Medium: </a:t>
+            </a:r>
+            <a:r>
+              <a:rPr lang="en-US" sz="2000" dirty="0">
+                <a:solidFill>
+                  <a:srgbClr val="002060"/>
+                </a:solidFill>
+                <a:latin typeface="DM Sans" pitchFamily="34" charset="0"/>
+              </a:rPr>
+              <a:t>234 (22.37% of total)</a:t>
+            </a:r>
+          </a:p>
+          <a:p>
+            <a:pPr marL="742950" lvl="1" indent="-285750">
+              <a:buFont typeface="Arial" panose="020B0604020202020204" pitchFamily="34" charset="0"/>
+              <a:buChar char="•"/>
+            </a:pPr>
+            <a:r>
+              <a:rPr lang="en-US" sz="2000" b="1" dirty="0">
+                <a:solidFill>
+                  <a:srgbClr val="002060"/>
+                </a:solidFill>
+                <a:latin typeface="DM Sans" pitchFamily="34" charset="0"/>
+              </a:rPr>
+              <a:t>Small</a:t>
+            </a:r>
+            <a:r>
+              <a:rPr lang="en-US" sz="2000" dirty="0">
+                <a:solidFill>
+                  <a:srgbClr val="002060"/>
+                </a:solidFill>
+                <a:latin typeface="DM Sans" pitchFamily="34" charset="0"/>
+              </a:rPr>
+              <a:t>: 681 (65.11% of total)</a:t>
+            </a:r>
+          </a:p>
+          <a:p>
+            <a:pPr marL="742950" lvl="1" indent="-285750">
+              <a:buFont typeface="Arial" panose="020B0604020202020204" pitchFamily="34" charset="0"/>
+              <a:buChar char="•"/>
+            </a:pPr>
+            <a:r>
+              <a:rPr lang="en-US" sz="2000" b="1" dirty="0">
+                <a:solidFill>
+                  <a:srgbClr val="002060"/>
+                </a:solidFill>
+                <a:latin typeface="DM Sans" pitchFamily="34" charset="0"/>
+              </a:rPr>
+              <a:t>Other </a:t>
+            </a:r>
+            <a:r>
+              <a:rPr lang="en-US" sz="2000" dirty="0">
+                <a:solidFill>
+                  <a:srgbClr val="002060"/>
+                </a:solidFill>
+                <a:latin typeface="DM Sans" pitchFamily="34" charset="0"/>
+              </a:rPr>
+              <a:t>/emerging accounts: 95 (9.08%) with very low parcel volumes (&lt;1,000)</a:t>
+            </a:r>
+          </a:p>
+          <a:p>
+            <a:pPr marL="285750" indent="-285750">
+              <a:lnSpc>
+                <a:spcPts val="2850"/>
+              </a:lnSpc>
+              <a:buFont typeface="Arial" panose="020B0604020202020204" pitchFamily="34" charset="0"/>
+              <a:buChar char="•"/>
+            </a:pPr>
+            <a:endParaRPr lang="en-US" sz="2000" dirty="0">
+              <a:solidFill>
+                <a:srgbClr val="002060"/>
+              </a:solidFill>
+              <a:latin typeface="DM Sans" pitchFamily="34" charset="0"/>
+              <a:ea typeface="DM Sans" pitchFamily="34" charset="-122"/>
+              <a:cs typeface="DM Sans" pitchFamily="34" charset="-120"/>
+            </a:endParaRPr>
+          </a:p>
+          <a:p>
+            <a:pPr marL="285750" indent="-285750">
+              <a:lnSpc>
+                <a:spcPts val="2850"/>
+              </a:lnSpc>
+              <a:buFont typeface="Arial" panose="020B0604020202020204" pitchFamily="34" charset="0"/>
+              <a:buChar char="•"/>
+            </a:pPr>
+            <a:endParaRPr lang="en-US" sz="2000" dirty="0">
+              <a:solidFill>
+                <a:srgbClr val="002060"/>
+              </a:solidFill>
+              <a:latin typeface="DM Sans" pitchFamily="34" charset="0"/>
+              <a:ea typeface="DM Sans" pitchFamily="34" charset="-122"/>
+              <a:cs typeface="DM Sans" pitchFamily="34" charset="-120"/>
+            </a:endParaRPr>
+          </a:p>
+          <a:p>
+            <a:pPr>
+              <a:lnSpc>
+                <a:spcPts val="2850"/>
+              </a:lnSpc>
+            </a:pPr>
+            <a:r>
+              <a:rPr lang="en-US" sz="2000" b="1" dirty="0">
+                <a:solidFill>
+                  <a:srgbClr val="002060"/>
+                </a:solidFill>
+                <a:latin typeface="Libre Baskerville" pitchFamily="34" charset="0"/>
+              </a:rPr>
+              <a:t>Profitability &amp; Volume Drivers</a:t>
+            </a:r>
+          </a:p>
+          <a:p>
+            <a:r>
+              <a:rPr lang="en-US" sz="2000" dirty="0">
+                <a:solidFill>
+                  <a:srgbClr val="002060"/>
+                </a:solidFill>
+                <a:latin typeface="DM Sans" pitchFamily="34" charset="0"/>
+              </a:rPr>
+              <a:t>Enterprise and Large customers contributed the most to volume, confirming that established high-volume (Enterprise) accounts drove the majority of the parcel volume surge.</a:t>
+            </a:r>
+          </a:p>
+          <a:p>
+            <a:pPr>
+              <a:lnSpc>
+                <a:spcPts val="2850"/>
+              </a:lnSpc>
+            </a:pPr>
+            <a:endParaRPr lang="en-US" sz="2000" dirty="0">
+              <a:solidFill>
+                <a:srgbClr val="002060"/>
+              </a:solidFill>
+              <a:latin typeface="DM Sans" pitchFamily="34" charset="0"/>
+            </a:endParaRPr>
+          </a:p>
+          <a:p>
+            <a:pPr>
+              <a:lnSpc>
+                <a:spcPts val="2850"/>
+              </a:lnSpc>
+            </a:pPr>
+            <a:endParaRPr lang="en-US" sz="2000" dirty="0">
+              <a:solidFill>
+                <a:srgbClr val="002060"/>
+              </a:solidFill>
+              <a:latin typeface="DM Sans" pitchFamily="34" charset="0"/>
+            </a:endParaRPr>
+          </a:p>
+        </p:txBody>
+      </p:sp>
+      <p:grpSp>
+        <p:nvGrpSpPr>
+          <p:cNvPr id="9" name="Group 8">
             <a:extLst>
               <a:ext uri="{FF2B5EF4-FFF2-40B4-BE49-F238E27FC236}">
-                <a16:creationId xmlns:a16="http://schemas.microsoft.com/office/drawing/2014/main" id="{075E778F-4129-D926-7CC0-C1DD1659FE9A}"/>
+                <a16:creationId xmlns:a16="http://schemas.microsoft.com/office/drawing/2014/main" id="{B69FB8C7-A54F-1813-28DA-080D70EF3E48}"/>
               </a:ext>
             </a:extLst>
           </p:cNvPr>
-          <p:cNvSpPr/>
-          <p:nvPr/>
-        </p:nvSpPr>
-        <p:spPr>
-          <a:xfrm>
-            <a:off x="793790" y="4261665"/>
-            <a:ext cx="510302" cy="510302"/>
-          </a:xfrm>
-          <a:prstGeom prst="roundRect">
-            <a:avLst>
-              <a:gd name="adj" fmla="val 18669"/>
-            </a:avLst>
-          </a:prstGeom>
-          <a:solidFill>
-            <a:srgbClr val="002060"/>
-          </a:solidFill>
-          <a:ln w="7620">
-            <a:noFill/>
-            <a:prstDash val="solid"/>
-          </a:ln>
-        </p:spPr>
-        <p:txBody>
-          <a:bodyPr/>
-          <a:lstStyle/>
-          <a:p>
-            <a:endParaRPr lang="en-US"/>
-          </a:p>
-        </p:txBody>
-      </p:sp>
-      <p:sp>
-        <p:nvSpPr>
-          <p:cNvPr id="28" name="Text 8">
-            <a:extLst>
-              <a:ext uri="{FF2B5EF4-FFF2-40B4-BE49-F238E27FC236}">
-                <a16:creationId xmlns:a16="http://schemas.microsoft.com/office/drawing/2014/main" id="{AAED84F5-0552-1D96-0E0D-EC3220ECBBF5}"/>
-              </a:ext>
-            </a:extLst>
-          </p:cNvPr>
-          <p:cNvSpPr/>
-          <p:nvPr/>
-        </p:nvSpPr>
-        <p:spPr>
-          <a:xfrm>
-            <a:off x="1530906" y="4339532"/>
-            <a:ext cx="2835235" cy="354330"/>
-          </a:xfrm>
-          <a:prstGeom prst="rect">
-            <a:avLst/>
-          </a:prstGeom>
-          <a:noFill/>
-          <a:ln/>
-        </p:spPr>
-        <p:txBody>
-          <a:bodyPr wrap="none" lIns="0" tIns="0" rIns="0" bIns="0" rtlCol="0" anchor="t"/>
-          <a:lstStyle/>
-          <a:p>
-            <a:pPr marL="0" indent="0" algn="l">
-              <a:lnSpc>
-                <a:spcPts val="2750"/>
-              </a:lnSpc>
-              <a:buNone/>
-            </a:pPr>
-            <a:r>
-              <a:rPr lang="en-US" sz="2200" b="1" dirty="0">
-                <a:solidFill>
-                  <a:srgbClr val="002060"/>
-                </a:solidFill>
-                <a:latin typeface="Libre Baskerville" pitchFamily="34" charset="0"/>
-                <a:ea typeface="Libre Baskerville" pitchFamily="34" charset="-122"/>
-                <a:cs typeface="Libre Baskerville" pitchFamily="34" charset="-120"/>
-              </a:rPr>
-              <a:t>Segment Health:</a:t>
-            </a:r>
-            <a:endParaRPr lang="en-US" sz="2200" b="1" dirty="0">
+          <p:cNvGrpSpPr/>
+          <p:nvPr/>
+        </p:nvGrpSpPr>
+        <p:grpSpPr>
+          <a:xfrm>
+            <a:off x="290384" y="1056508"/>
+            <a:ext cx="7699429" cy="6845312"/>
+            <a:chOff x="290383" y="1106948"/>
+            <a:chExt cx="7699429" cy="6845312"/>
+          </a:xfrm>
+        </p:grpSpPr>
+        <p:pic>
+          <p:nvPicPr>
+            <p:cNvPr id="5" name="Picture 4" descr="A screenshot of a graph&#10;&#10;AI-generated content may be incorrect.">
+              <a:extLst>
+                <a:ext uri="{FF2B5EF4-FFF2-40B4-BE49-F238E27FC236}">
+                  <a16:creationId xmlns:a16="http://schemas.microsoft.com/office/drawing/2014/main" id="{8695196B-4087-51A8-5C6D-592008986D4F}"/>
+                </a:ext>
+              </a:extLst>
+            </p:cNvPr>
+            <p:cNvPicPr>
+              <a:picLocks noChangeAspect="1"/>
+            </p:cNvPicPr>
+            <p:nvPr/>
+          </p:nvPicPr>
+          <p:blipFill>
+            <a:blip r:embed="rId3"/>
+            <a:stretch>
+              <a:fillRect/>
+            </a:stretch>
+          </p:blipFill>
+          <p:spPr>
+            <a:xfrm>
+              <a:off x="290383" y="1106948"/>
+              <a:ext cx="7699429" cy="6845312"/>
+            </a:xfrm>
+            <a:prstGeom prst="rect">
+              <a:avLst/>
+            </a:prstGeom>
+          </p:spPr>
+        </p:pic>
+        <p:sp>
+          <p:nvSpPr>
+            <p:cNvPr id="7" name="Rectangle 6">
+              <a:extLst>
+                <a:ext uri="{FF2B5EF4-FFF2-40B4-BE49-F238E27FC236}">
+                  <a16:creationId xmlns:a16="http://schemas.microsoft.com/office/drawing/2014/main" id="{5B4EAE67-E202-C95B-0BD8-E6D4F7A54382}"/>
+                </a:ext>
+              </a:extLst>
+            </p:cNvPr>
+            <p:cNvSpPr/>
+            <p:nvPr/>
+          </p:nvSpPr>
+          <p:spPr>
+            <a:xfrm>
+              <a:off x="5094521" y="1654630"/>
+              <a:ext cx="333828" cy="303763"/>
+            </a:xfrm>
+            <a:prstGeom prst="rect">
+              <a:avLst/>
+            </a:prstGeom>
+            <a:solidFill>
+              <a:schemeClr val="bg1"/>
+            </a:solidFill>
+            <a:ln>
               <a:solidFill>
-                <a:srgbClr val="002060"/>
+                <a:schemeClr val="bg1"/>
               </a:solidFill>
-            </a:endParaRPr>
-          </a:p>
-        </p:txBody>
-      </p:sp>
-      <p:sp>
-        <p:nvSpPr>
-          <p:cNvPr id="29" name="Text 9">
-            <a:extLst>
-              <a:ext uri="{FF2B5EF4-FFF2-40B4-BE49-F238E27FC236}">
-                <a16:creationId xmlns:a16="http://schemas.microsoft.com/office/drawing/2014/main" id="{2CBFE24F-11B6-8F61-81C0-1A5B46943108}"/>
-              </a:ext>
-            </a:extLst>
-          </p:cNvPr>
-          <p:cNvSpPr/>
-          <p:nvPr/>
-        </p:nvSpPr>
-        <p:spPr>
-          <a:xfrm>
-            <a:off x="1530906" y="4829951"/>
-            <a:ext cx="5642491" cy="1451610"/>
-          </a:xfrm>
-          <a:prstGeom prst="rect">
-            <a:avLst/>
-          </a:prstGeom>
-          <a:noFill/>
-          <a:ln/>
-        </p:spPr>
-        <p:txBody>
-          <a:bodyPr wrap="square" lIns="0" tIns="0" rIns="0" bIns="0" rtlCol="0" anchor="t"/>
-          <a:lstStyle/>
-          <a:p>
-            <a:pPr marL="0" indent="0" algn="l">
-              <a:lnSpc>
-                <a:spcPts val="2850"/>
-              </a:lnSpc>
-              <a:buNone/>
-            </a:pPr>
-            <a:r>
-              <a:rPr lang="en-US" sz="1750" dirty="0">
-                <a:solidFill>
-                  <a:srgbClr val="002060"/>
-                </a:solidFill>
-                <a:latin typeface="DM Sans" pitchFamily="34" charset="0"/>
-                <a:ea typeface="DM Sans" pitchFamily="34" charset="-122"/>
-                <a:cs typeface="DM Sans" pitchFamily="34" charset="-120"/>
-              </a:rPr>
-              <a:t>1046 customer base in 2020, from which 56% of the customers were high growth accounts, 7% stable accounts, 36% declining accounts and 1% lost accounts during the pandemic.  The highest revenue impacting accounts were from enterprise group confirming that established customers drove the majority of the volume surge.</a:t>
-            </a:r>
-            <a:endParaRPr lang="en-US" sz="1750" dirty="0">
-              <a:solidFill>
-                <a:srgbClr val="002060"/>
-              </a:solidFill>
-            </a:endParaRPr>
-          </a:p>
-        </p:txBody>
-      </p:sp>
-      <p:sp>
-        <p:nvSpPr>
-          <p:cNvPr id="30" name="Shape 10">
-            <a:extLst>
-              <a:ext uri="{FF2B5EF4-FFF2-40B4-BE49-F238E27FC236}">
-                <a16:creationId xmlns:a16="http://schemas.microsoft.com/office/drawing/2014/main" id="{5904CA9B-23A0-1B87-35A9-A2F9897F2E24}"/>
-              </a:ext>
-            </a:extLst>
-          </p:cNvPr>
-          <p:cNvSpPr/>
-          <p:nvPr/>
-        </p:nvSpPr>
-        <p:spPr>
-          <a:xfrm>
-            <a:off x="7456884" y="4261659"/>
-            <a:ext cx="510302" cy="510302"/>
-          </a:xfrm>
-          <a:prstGeom prst="roundRect">
-            <a:avLst>
-              <a:gd name="adj" fmla="val 18669"/>
-            </a:avLst>
-          </a:prstGeom>
-          <a:solidFill>
-            <a:srgbClr val="002060"/>
-          </a:solidFill>
-          <a:ln w="7620">
-            <a:noFill/>
-            <a:prstDash val="solid"/>
-          </a:ln>
-        </p:spPr>
-        <p:txBody>
-          <a:bodyPr/>
-          <a:lstStyle/>
-          <a:p>
-            <a:endParaRPr lang="en-US"/>
-          </a:p>
-        </p:txBody>
-      </p:sp>
-      <p:sp>
-        <p:nvSpPr>
-          <p:cNvPr id="31" name="Text 11">
-            <a:extLst>
-              <a:ext uri="{FF2B5EF4-FFF2-40B4-BE49-F238E27FC236}">
-                <a16:creationId xmlns:a16="http://schemas.microsoft.com/office/drawing/2014/main" id="{04D3D4EF-2D39-36BE-22B6-4F9100C7D796}"/>
-              </a:ext>
-            </a:extLst>
-          </p:cNvPr>
-          <p:cNvSpPr/>
-          <p:nvPr/>
-        </p:nvSpPr>
-        <p:spPr>
-          <a:xfrm>
-            <a:off x="8194000" y="4339526"/>
-            <a:ext cx="2835235" cy="354330"/>
-          </a:xfrm>
-          <a:prstGeom prst="rect">
-            <a:avLst/>
-          </a:prstGeom>
-          <a:noFill/>
-          <a:ln/>
-        </p:spPr>
-        <p:txBody>
-          <a:bodyPr wrap="none" lIns="0" tIns="0" rIns="0" bIns="0" rtlCol="0" anchor="t"/>
-          <a:lstStyle/>
-          <a:p>
-            <a:pPr marL="0" indent="0" algn="l">
-              <a:lnSpc>
-                <a:spcPts val="2750"/>
-              </a:lnSpc>
-              <a:buNone/>
-            </a:pPr>
-            <a:r>
-              <a:rPr lang="en-US" sz="2200" b="1" dirty="0">
-                <a:solidFill>
-                  <a:srgbClr val="002060"/>
-                </a:solidFill>
-                <a:latin typeface="Libre Baskerville" pitchFamily="34" charset="0"/>
-                <a:ea typeface="Libre Baskerville" pitchFamily="34" charset="-122"/>
-                <a:cs typeface="Libre Baskerville" pitchFamily="34" charset="-120"/>
-              </a:rPr>
-              <a:t>Profitability:</a:t>
-            </a:r>
-            <a:endParaRPr lang="en-US" sz="2200" b="1" dirty="0">
-              <a:solidFill>
-                <a:srgbClr val="002060"/>
-              </a:solidFill>
-            </a:endParaRPr>
-          </a:p>
-        </p:txBody>
-      </p:sp>
-      <p:sp>
-        <p:nvSpPr>
-          <p:cNvPr id="32" name="Text 12">
-            <a:extLst>
-              <a:ext uri="{FF2B5EF4-FFF2-40B4-BE49-F238E27FC236}">
-                <a16:creationId xmlns:a16="http://schemas.microsoft.com/office/drawing/2014/main" id="{79A11D34-FC1F-E10E-D1E9-04A91A96BC6D}"/>
-              </a:ext>
-            </a:extLst>
-          </p:cNvPr>
-          <p:cNvSpPr/>
-          <p:nvPr/>
-        </p:nvSpPr>
-        <p:spPr>
-          <a:xfrm>
-            <a:off x="8194000" y="4829945"/>
-            <a:ext cx="5642610" cy="1451610"/>
-          </a:xfrm>
-          <a:prstGeom prst="rect">
-            <a:avLst/>
-          </a:prstGeom>
-          <a:noFill/>
-          <a:ln/>
-        </p:spPr>
-        <p:txBody>
-          <a:bodyPr wrap="square" lIns="0" tIns="0" rIns="0" bIns="0" rtlCol="0" anchor="t"/>
-          <a:lstStyle/>
-          <a:p>
-            <a:pPr marL="0" indent="0" algn="l">
-              <a:lnSpc>
-                <a:spcPts val="2850"/>
-              </a:lnSpc>
-              <a:buNone/>
-            </a:pPr>
-            <a:r>
-              <a:rPr lang="en-US" sz="1750" dirty="0">
-                <a:solidFill>
-                  <a:srgbClr val="002060"/>
-                </a:solidFill>
-                <a:latin typeface="DM Sans" pitchFamily="34" charset="0"/>
-                <a:ea typeface="DM Sans" pitchFamily="34" charset="-122"/>
-                <a:cs typeface="DM Sans" pitchFamily="34" charset="-120"/>
-              </a:rPr>
-              <a:t>Despite the high number of customers, the Small/other customer segments showed high volatility (e.g., 42% of these groups were Declining), suggesting a high-risk, low-value portion of the new market.</a:t>
-            </a:r>
-            <a:endParaRPr lang="en-US" sz="1750" dirty="0">
-              <a:solidFill>
-                <a:srgbClr val="002060"/>
-              </a:solidFill>
-            </a:endParaRPr>
-          </a:p>
-        </p:txBody>
-      </p:sp>
+            </a:ln>
+          </p:spPr>
+          <p:style>
+            <a:lnRef idx="2">
+              <a:schemeClr val="accent1">
+                <a:shade val="15000"/>
+              </a:schemeClr>
+            </a:lnRef>
+            <a:fillRef idx="1">
+              <a:schemeClr val="accent1"/>
+            </a:fillRef>
+            <a:effectRef idx="0">
+              <a:schemeClr val="accent1"/>
+            </a:effectRef>
+            <a:fontRef idx="minor">
+              <a:schemeClr val="lt1"/>
+            </a:fontRef>
+          </p:style>
+          <p:txBody>
+            <a:bodyPr rtlCol="0" anchor="ctr"/>
+            <a:lstStyle/>
+            <a:p>
+              <a:pPr algn="ctr"/>
+              <a:r>
+                <a:rPr lang="en-US" sz="1100" dirty="0">
+                  <a:solidFill>
+                    <a:schemeClr val="tx1"/>
+                  </a:solidFill>
+                </a:rPr>
+                <a:t>14</a:t>
+              </a:r>
+            </a:p>
+          </p:txBody>
+        </p:sp>
+      </p:grpSp>
     </p:spTree>
     <p:extLst>
       <p:ext uri="{BB962C8B-B14F-4D97-AF65-F5344CB8AC3E}">
-        <p14:creationId xmlns:p14="http://schemas.microsoft.com/office/powerpoint/2010/main" val="4201886563"/>
+        <p14:creationId xmlns:p14="http://schemas.microsoft.com/office/powerpoint/2010/main" val="4286866197"/>
       </p:ext>
     </p:extLst>
   </p:cSld>
@@ -6772,6 +7945,14 @@
 <file path=ppt/slides/slide4.xml><?xml version="1.0" encoding="utf-8"?>
 <p:sld xmlns:a="http://schemas.openxmlformats.org/drawingml/2006/main" xmlns:r="http://schemas.openxmlformats.org/officeDocument/2006/relationships" xmlns:p="http://schemas.openxmlformats.org/presentationml/2006/main">
   <p:cSld name="Slide 4">
+    <p:bg>
+      <p:bgPr>
+        <a:solidFill>
+          <a:schemeClr val="bg1"/>
+        </a:solidFill>
+        <a:effectLst/>
+      </p:bgPr>
+    </p:bg>
     <p:spTree>
       <p:nvGrpSpPr>
         <p:cNvPr id="1" name=""/>
@@ -6794,8 +7975,8 @@
         </p:nvSpPr>
         <p:spPr>
           <a:xfrm>
-            <a:off x="1636845" y="419874"/>
-            <a:ext cx="10895702" cy="765452"/>
+            <a:off x="222422" y="780868"/>
+            <a:ext cx="14049632" cy="765452"/>
           </a:xfrm>
           <a:prstGeom prst="rect">
             <a:avLst/>
@@ -6832,7 +8013,7 @@
         </p:nvSpPr>
         <p:spPr>
           <a:xfrm>
-            <a:off x="793790" y="2868747"/>
+            <a:off x="793790" y="3377927"/>
             <a:ext cx="13042821" cy="1291416"/>
           </a:xfrm>
           <a:prstGeom prst="roundRect">
@@ -6866,7 +8047,7 @@
         </p:nvSpPr>
         <p:spPr>
           <a:xfrm>
-            <a:off x="801410" y="1999035"/>
+            <a:off x="801410" y="2508215"/>
             <a:ext cx="13027581" cy="650319"/>
           </a:xfrm>
           <a:prstGeom prst="rect">
@@ -6895,7 +8076,7 @@
         </p:nvSpPr>
         <p:spPr>
           <a:xfrm>
-            <a:off x="1028462" y="2142743"/>
+            <a:off x="1028462" y="2651923"/>
             <a:ext cx="2799397" cy="362903"/>
           </a:xfrm>
           <a:prstGeom prst="rect">
@@ -6941,7 +8122,7 @@
         </p:nvSpPr>
         <p:spPr>
           <a:xfrm>
-            <a:off x="4289108" y="2142743"/>
+            <a:off x="4289108" y="2651923"/>
             <a:ext cx="2795588" cy="362903"/>
           </a:xfrm>
           <a:prstGeom prst="rect">
@@ -6987,7 +8168,7 @@
         </p:nvSpPr>
         <p:spPr>
           <a:xfrm>
-            <a:off x="7545943" y="2142743"/>
+            <a:off x="7545943" y="2651923"/>
             <a:ext cx="2795588" cy="362903"/>
           </a:xfrm>
           <a:prstGeom prst="rect">
@@ -7033,7 +8214,7 @@
         </p:nvSpPr>
         <p:spPr>
           <a:xfrm>
-            <a:off x="10802779" y="2142743"/>
+            <a:off x="10802779" y="2651923"/>
             <a:ext cx="2799397" cy="362903"/>
           </a:xfrm>
           <a:prstGeom prst="rect">
@@ -7079,7 +8260,7 @@
         </p:nvSpPr>
         <p:spPr>
           <a:xfrm>
-            <a:off x="801410" y="2649354"/>
+            <a:off x="801410" y="3158534"/>
             <a:ext cx="13027581" cy="650319"/>
           </a:xfrm>
           <a:prstGeom prst="rect">
@@ -7108,7 +8289,7 @@
         </p:nvSpPr>
         <p:spPr>
           <a:xfrm>
-            <a:off x="1028462" y="2793062"/>
+            <a:off x="1028462" y="3302242"/>
             <a:ext cx="2799397" cy="362903"/>
           </a:xfrm>
           <a:prstGeom prst="rect">
@@ -7154,7 +8335,7 @@
         </p:nvSpPr>
         <p:spPr>
           <a:xfrm>
-            <a:off x="4289108" y="2793062"/>
+            <a:off x="4289108" y="3302242"/>
             <a:ext cx="2795588" cy="362903"/>
           </a:xfrm>
           <a:prstGeom prst="rect">
@@ -7182,7 +8363,7 @@
                 <a:ea typeface="DM Sans" pitchFamily="34" charset="-122"/>
                 <a:cs typeface="DM Sans" pitchFamily="34" charset="-120"/>
               </a:rPr>
-              <a:t>43,110,710</a:t>
+              <a:t>43 million</a:t>
             </a:r>
             <a:endParaRPr lang="en-US" sz="1750" dirty="0">
               <a:solidFill>
@@ -7200,7 +8381,7 @@
         </p:nvSpPr>
         <p:spPr>
           <a:xfrm>
-            <a:off x="7545943" y="2793062"/>
+            <a:off x="7545943" y="3302242"/>
             <a:ext cx="2795588" cy="362903"/>
           </a:xfrm>
           <a:prstGeom prst="rect">
@@ -7228,7 +8409,7 @@
                 <a:ea typeface="DM Sans" pitchFamily="34" charset="-122"/>
                 <a:cs typeface="DM Sans" pitchFamily="34" charset="-120"/>
               </a:rPr>
-              <a:t>63,735,887</a:t>
+              <a:t>63 million</a:t>
             </a:r>
             <a:endParaRPr lang="en-US" sz="1750" dirty="0">
               <a:solidFill>
@@ -7246,7 +8427,7 @@
         </p:nvSpPr>
         <p:spPr>
           <a:xfrm>
-            <a:off x="10802779" y="2793062"/>
+            <a:off x="10802779" y="3302242"/>
             <a:ext cx="2799397" cy="362903"/>
           </a:xfrm>
           <a:prstGeom prst="rect">
@@ -7292,7 +8473,7 @@
         </p:nvSpPr>
         <p:spPr>
           <a:xfrm>
-            <a:off x="1028462" y="3443382"/>
+            <a:off x="1028462" y="3952562"/>
             <a:ext cx="2799397" cy="362903"/>
           </a:xfrm>
           <a:prstGeom prst="rect">
@@ -7338,7 +8519,7 @@
         </p:nvSpPr>
         <p:spPr>
           <a:xfrm>
-            <a:off x="4289108" y="3443382"/>
+            <a:off x="4289108" y="3952562"/>
             <a:ext cx="2795588" cy="362903"/>
           </a:xfrm>
           <a:prstGeom prst="rect">
@@ -7384,7 +8565,7 @@
         </p:nvSpPr>
         <p:spPr>
           <a:xfrm>
-            <a:off x="7545943" y="3443382"/>
+            <a:off x="7545943" y="3952562"/>
             <a:ext cx="2795588" cy="362903"/>
           </a:xfrm>
           <a:prstGeom prst="rect">
@@ -7430,7 +8611,7 @@
         </p:nvSpPr>
         <p:spPr>
           <a:xfrm>
-            <a:off x="10802779" y="3443382"/>
+            <a:off x="10802779" y="3952562"/>
             <a:ext cx="2799397" cy="362903"/>
           </a:xfrm>
           <a:prstGeom prst="rect">
@@ -7476,13 +8657,15 @@
         </p:nvSpPr>
         <p:spPr>
           <a:xfrm>
-            <a:off x="801410" y="4518670"/>
-            <a:ext cx="13042821" cy="2595508"/>
-          </a:xfrm>
-          <a:prstGeom prst="rect">
-            <a:avLst/>
-          </a:prstGeom>
-          <a:noFill/>
+            <a:off x="563285" y="5280053"/>
+            <a:ext cx="13042821" cy="2437928"/>
+          </a:xfrm>
+          <a:prstGeom prst="rect">
+            <a:avLst/>
+          </a:prstGeom>
+          <a:solidFill>
+            <a:schemeClr val="bg1"/>
+          </a:solidFill>
           <a:ln/>
         </p:spPr>
         <p:txBody>
@@ -7529,12 +8712,6 @@
               </a:rPr>
               <a:t>This suggests that revenue likely grew by a similar percentage during the same period.</a:t>
             </a:r>
-            <a:endParaRPr lang="en-US" altLang="en-US" sz="2000" dirty="0">
-              <a:solidFill>
-                <a:srgbClr val="002060"/>
-              </a:solidFill>
-              <a:latin typeface="DM Sans" pitchFamily="34" charset="0"/>
-            </a:endParaRPr>
           </a:p>
           <a:p>
             <a:pPr marL="285750" lvl="0" indent="-285750" fontAlgn="base">
@@ -7550,6 +8727,27 @@
               <a:buFont typeface="Arial" panose="020B0604020202020204" pitchFamily="34" charset="0"/>
               <a:buChar char="•"/>
             </a:pPr>
+            <a:endParaRPr lang="en-US" altLang="en-US" sz="2000" dirty="0">
+              <a:solidFill>
+                <a:srgbClr val="002060"/>
+              </a:solidFill>
+              <a:latin typeface="DM Sans" pitchFamily="34" charset="0"/>
+            </a:endParaRPr>
+          </a:p>
+          <a:p>
+            <a:pPr marL="285750" indent="-285750" fontAlgn="base">
+              <a:lnSpc>
+                <a:spcPct val="150000"/>
+              </a:lnSpc>
+              <a:spcBef>
+                <a:spcPct val="0"/>
+              </a:spcBef>
+              <a:spcAft>
+                <a:spcPct val="0"/>
+              </a:spcAft>
+              <a:buFont typeface="Arial" panose="020B0604020202020204" pitchFamily="34" charset="0"/>
+              <a:buChar char="•"/>
+            </a:pPr>
             <a:r>
               <a:rPr lang="en-US" altLang="en-US" sz="2000" b="1" dirty="0">
                 <a:solidFill>
@@ -7566,8 +8764,27 @@
                 </a:solidFill>
                 <a:latin typeface="DM Sans" pitchFamily="34" charset="0"/>
               </a:rPr>
-              <a:t>Slight decline of −2.36%, indicating stable customer retention with minor churn.</a:t>
-            </a:r>
+              <a:t>Slight decline of −2.36% in the number of customers ABC catered to in 2020(</a:t>
+            </a:r>
+            <a:r>
+              <a:rPr lang="en-US" altLang="en-US" sz="2000" dirty="0" err="1">
+                <a:solidFill>
+                  <a:srgbClr val="002060"/>
+                </a:solidFill>
+                <a:latin typeface="DM Sans" pitchFamily="34" charset="0"/>
+              </a:rPr>
+              <a:t>Wk</a:t>
+            </a:r>
+            <a:r>
+              <a:rPr lang="en-US" altLang="en-US" sz="2000" dirty="0">
+                <a:solidFill>
+                  <a:srgbClr val="002060"/>
+                </a:solidFill>
+                <a:latin typeface="DM Sans" pitchFamily="34" charset="0"/>
+              </a:rPr>
+              <a:t> 12-53) compared to the same period in 2019.</a:t>
+            </a:r>
+            <a:endParaRPr lang="en-US" sz="2000" dirty="0"/>
           </a:p>
           <a:p>
             <a:pPr marL="285750" lvl="0" indent="-285750" fontAlgn="base">
@@ -7583,15 +8800,12 @@
               <a:buFont typeface="Arial" panose="020B0604020202020204" pitchFamily="34" charset="0"/>
               <a:buChar char="•"/>
             </a:pPr>
-            <a:r>
-              <a:rPr lang="en-US" altLang="en-US" sz="2000" dirty="0">
-                <a:solidFill>
-                  <a:srgbClr val="002060"/>
-                </a:solidFill>
-                <a:latin typeface="DM Sans" pitchFamily="34" charset="0"/>
-              </a:rPr>
-              <a:t>COVID drove accelerated e-commerce activity, resulting in above-normal growth compared to ISGR (11.40%).</a:t>
-            </a:r>
+            <a:endParaRPr lang="en-US" altLang="en-US" sz="2000" dirty="0">
+              <a:solidFill>
+                <a:srgbClr val="002060"/>
+              </a:solidFill>
+              <a:latin typeface="DM Sans" pitchFamily="34" charset="0"/>
+            </a:endParaRPr>
           </a:p>
         </p:txBody>
       </p:sp>
@@ -7643,7 +8857,7 @@
           <p:nvPr/>
         </p:nvPicPr>
         <p:blipFill>
-          <a:blip r:embed="rId2"/>
+          <a:blip r:embed="rId3"/>
           <a:stretch>
             <a:fillRect/>
           </a:stretch>
@@ -7676,7 +8890,7 @@
         <p:spPr>
           <a:xfrm>
             <a:off x="10214467" y="1420681"/>
-            <a:ext cx="4415933" cy="6524863"/>
+            <a:ext cx="4415933" cy="5601533"/>
           </a:xfrm>
           <a:prstGeom prst="rect">
             <a:avLst/>
@@ -7825,34 +9039,7 @@
                   <a:srgbClr val="002060"/>
                 </a:solidFill>
               </a:rPr>
-              <a:t>A new weekly baseline emerged (1.2m minimum).</a:t>
-            </a:r>
-          </a:p>
-          <a:p>
-            <a:endParaRPr lang="en-US" sz="2000" dirty="0">
-              <a:solidFill>
-                <a:srgbClr val="002060"/>
-              </a:solidFill>
-            </a:endParaRPr>
-          </a:p>
-          <a:p>
-            <a:r>
-              <a:rPr lang="en-US" sz="2000" b="1" dirty="0">
-                <a:solidFill>
-                  <a:srgbClr val="002060"/>
-                </a:solidFill>
-              </a:rPr>
-              <a:t>2020 Peak</a:t>
-            </a:r>
-          </a:p>
-          <a:p>
-            <a:r>
-              <a:rPr lang="en-US" sz="2000" dirty="0">
-                <a:solidFill>
-                  <a:srgbClr val="002060"/>
-                </a:solidFill>
-              </a:rPr>
-              <a:t>Record end-of-year peak reached 3.0M parcels.</a:t>
+              <a:t>A new weekly baseline emerged (1.2m minimum). And a record end-of-year peak reaching 3M parcels.</a:t>
             </a:r>
           </a:p>
           <a:p>
@@ -7967,7 +9154,7 @@
         </p:blipFill>
         <p:spPr>
           <a:xfrm>
-            <a:off x="251308" y="1515649"/>
+            <a:off x="0" y="1399535"/>
             <a:ext cx="14256421" cy="6137754"/>
           </a:xfrm>
           <a:prstGeom prst="rect">
@@ -8127,7 +9314,7 @@
               <a:buNone/>
             </a:pPr>
             <a:r>
-              <a:rPr lang="en-US" sz="1650" b="1" dirty="0">
+              <a:rPr lang="en-US" sz="1650" dirty="0">
                 <a:solidFill>
                   <a:srgbClr val="002060"/>
                 </a:solidFill>
@@ -8135,18 +9322,7 @@
                 <a:ea typeface="DM Sans" pitchFamily="34" charset="-122"/>
                 <a:cs typeface="DM Sans" pitchFamily="34" charset="-120"/>
               </a:rPr>
-              <a:t>NARRATIVE:</a:t>
-            </a:r>
-            <a:r>
-              <a:rPr lang="en-US" sz="1650" dirty="0">
-                <a:solidFill>
-                  <a:srgbClr val="002060"/>
-                </a:solidFill>
-                <a:latin typeface="DM Sans" pitchFamily="34" charset="0"/>
-                <a:ea typeface="DM Sans" pitchFamily="34" charset="-122"/>
-                <a:cs typeface="DM Sans" pitchFamily="34" charset="-120"/>
-              </a:rPr>
-              <a:t> A rapid sequence of events created the operational necessity for our growth.</a:t>
+              <a:t>A rapid sequence of events created the operational necessity for our growth.</a:t>
             </a:r>
             <a:endParaRPr lang="en-US" sz="1650" dirty="0">
               <a:solidFill>
@@ -9112,7 +10288,13 @@
     </p:bg>
     <p:spTree>
       <p:nvGrpSpPr>
-        <p:cNvPr id="1" name=""/>
+        <p:cNvPr id="1" name="">
+          <a:extLst>
+            <a:ext uri="{FF2B5EF4-FFF2-40B4-BE49-F238E27FC236}">
+              <a16:creationId xmlns:a16="http://schemas.microsoft.com/office/drawing/2014/main" id="{1AA8B98C-CA67-3493-AE6A-1D1017CD2019}"/>
+            </a:ext>
+          </a:extLst>
+        </p:cNvPr>
         <p:cNvGrpSpPr/>
         <p:nvPr/>
       </p:nvGrpSpPr>
@@ -9124,12 +10306,145 @@
           <a:chExt cx="0" cy="0"/>
         </a:xfrm>
       </p:grpSpPr>
+      <p:sp>
+        <p:nvSpPr>
+          <p:cNvPr id="4" name="TextBox 3">
+            <a:extLst>
+              <a:ext uri="{FF2B5EF4-FFF2-40B4-BE49-F238E27FC236}">
+                <a16:creationId xmlns:a16="http://schemas.microsoft.com/office/drawing/2014/main" id="{B00BA1D1-9074-3CBA-2584-F851BA94CD17}"/>
+              </a:ext>
+            </a:extLst>
+          </p:cNvPr>
+          <p:cNvSpPr txBox="1"/>
+          <p:nvPr/>
+        </p:nvSpPr>
+        <p:spPr>
+          <a:xfrm>
+            <a:off x="7525267" y="2397212"/>
+            <a:ext cx="6900172" cy="3477875"/>
+          </a:xfrm>
+          <a:prstGeom prst="rect">
+            <a:avLst/>
+          </a:prstGeom>
+          <a:noFill/>
+        </p:spPr>
+        <p:txBody>
+          <a:bodyPr wrap="square" rtlCol="0">
+            <a:spAutoFit/>
+          </a:bodyPr>
+          <a:lstStyle/>
+          <a:p>
+            <a:endParaRPr lang="en-US" sz="2000" b="1" dirty="0">
+              <a:solidFill>
+                <a:srgbClr val="002060"/>
+              </a:solidFill>
+              <a:latin typeface="DM Sans" pitchFamily="2" charset="0"/>
+            </a:endParaRPr>
+          </a:p>
+          <a:p>
+            <a:r>
+              <a:rPr lang="en-US" sz="2000" b="1" dirty="0">
+                <a:solidFill>
+                  <a:srgbClr val="002060"/>
+                </a:solidFill>
+                <a:latin typeface="DM Sans" pitchFamily="2" charset="0"/>
+              </a:rPr>
+              <a:t>Volume Surge</a:t>
+            </a:r>
+            <a:r>
+              <a:rPr lang="en-US" sz="2000" dirty="0">
+                <a:solidFill>
+                  <a:srgbClr val="002060"/>
+                </a:solidFill>
+                <a:latin typeface="DM Sans" pitchFamily="2" charset="0"/>
+              </a:rPr>
+              <a:t>: 2020 weekly volumes were consistently higher than 2019 during peak season, confirming that COVID-19 significantly increased peak season parcel demand. Total 2020 peak volume stood at 18.1m as against 2019 volume of 15.4 (17% growth)</a:t>
+            </a:r>
+          </a:p>
+          <a:p>
+            <a:endParaRPr lang="en-US" sz="2000" dirty="0">
+              <a:solidFill>
+                <a:srgbClr val="002060"/>
+              </a:solidFill>
+              <a:latin typeface="DM Sans" pitchFamily="2" charset="0"/>
+            </a:endParaRPr>
+          </a:p>
+          <a:p>
+            <a:r>
+              <a:rPr lang="en-US" sz="2000" b="1" dirty="0">
+                <a:solidFill>
+                  <a:srgbClr val="002060"/>
+                </a:solidFill>
+                <a:latin typeface="DM Sans" pitchFamily="2" charset="0"/>
+              </a:rPr>
+              <a:t>Strategic Insight</a:t>
+            </a:r>
+            <a:r>
+              <a:rPr lang="en-US" sz="2000" dirty="0">
+                <a:solidFill>
+                  <a:srgbClr val="002060"/>
+                </a:solidFill>
+                <a:latin typeface="DM Sans" pitchFamily="2" charset="0"/>
+              </a:rPr>
+              <a:t>: ABC should expect a higher baseline post-pandemic due to accelerated customer habit formation (Shift to online shopping) </a:t>
+            </a:r>
+          </a:p>
+          <a:p>
+            <a:endParaRPr lang="en-US" sz="2000" dirty="0">
+              <a:solidFill>
+                <a:srgbClr val="002060"/>
+              </a:solidFill>
+              <a:latin typeface="DM Sans" pitchFamily="2" charset="0"/>
+            </a:endParaRPr>
+          </a:p>
+        </p:txBody>
+      </p:sp>
+      <p:sp>
+        <p:nvSpPr>
+          <p:cNvPr id="2" name="TextBox 1">
+            <a:extLst>
+              <a:ext uri="{FF2B5EF4-FFF2-40B4-BE49-F238E27FC236}">
+                <a16:creationId xmlns:a16="http://schemas.microsoft.com/office/drawing/2014/main" id="{FF34EB03-7918-A0EF-D43C-C4DF19B7C721}"/>
+              </a:ext>
+            </a:extLst>
+          </p:cNvPr>
+          <p:cNvSpPr txBox="1"/>
+          <p:nvPr/>
+        </p:nvSpPr>
+        <p:spPr>
+          <a:xfrm>
+            <a:off x="684042" y="277409"/>
+            <a:ext cx="10059164" cy="638636"/>
+          </a:xfrm>
+          <a:prstGeom prst="rect">
+            <a:avLst/>
+          </a:prstGeom>
+          <a:noFill/>
+        </p:spPr>
+        <p:txBody>
+          <a:bodyPr wrap="none" rtlCol="0">
+            <a:spAutoFit/>
+          </a:bodyPr>
+          <a:lstStyle/>
+          <a:p>
+            <a:r>
+              <a:rPr lang="en-US" sz="3550" b="1" dirty="0">
+                <a:solidFill>
+                  <a:srgbClr val="002060"/>
+                </a:solidFill>
+                <a:latin typeface="Libre Baskerville" pitchFamily="34" charset="0"/>
+              </a:rPr>
+              <a:t>COVID-19’s Impact on 2020 Peak Season</a:t>
+            </a:r>
+          </a:p>
+        </p:txBody>
+      </p:sp>
       <p:pic>
         <p:nvPicPr>
-          <p:cNvPr id="3" name="Picture 2" descr="A graph of blue and orange bars&#10;&#10;AI-generated content may be incorrect.">
+          <p:cNvPr id="6" name="Picture 5" descr="A graph of a number of blue and orange squares&#10;&#10;AI-generated content may be incorrect.">
             <a:extLst>
               <a:ext uri="{FF2B5EF4-FFF2-40B4-BE49-F238E27FC236}">
-                <a16:creationId xmlns:a16="http://schemas.microsoft.com/office/drawing/2014/main" id="{6FFDB3B3-AA9B-5844-9060-7D67C09D625D}"/>
+                <a16:creationId xmlns:a16="http://schemas.microsoft.com/office/drawing/2014/main" id="{A5942A41-4282-E841-F9A3-F8290C2F14F7}"/>
               </a:ext>
             </a:extLst>
           </p:cNvPr>
@@ -9146,127 +10461,18 @@
         </p:blipFill>
         <p:spPr>
           <a:xfrm>
-            <a:off x="814192" y="1014609"/>
-            <a:ext cx="12641481" cy="5022936"/>
+            <a:off x="313151" y="1314009"/>
+            <a:ext cx="6791984" cy="4989688"/>
           </a:xfrm>
           <a:prstGeom prst="rect">
             <a:avLst/>
           </a:prstGeom>
         </p:spPr>
       </p:pic>
-      <p:sp>
-        <p:nvSpPr>
-          <p:cNvPr id="4" name="TextBox 3">
-            <a:extLst>
-              <a:ext uri="{FF2B5EF4-FFF2-40B4-BE49-F238E27FC236}">
-                <a16:creationId xmlns:a16="http://schemas.microsoft.com/office/drawing/2014/main" id="{0905B28E-9564-DB70-A154-8EA54F3C3D83}"/>
-              </a:ext>
-            </a:extLst>
-          </p:cNvPr>
-          <p:cNvSpPr txBox="1"/>
-          <p:nvPr/>
-        </p:nvSpPr>
-        <p:spPr>
-          <a:xfrm>
-            <a:off x="313151" y="6309434"/>
-            <a:ext cx="14112288" cy="1323439"/>
-          </a:xfrm>
-          <a:prstGeom prst="rect">
-            <a:avLst/>
-          </a:prstGeom>
-          <a:noFill/>
-        </p:spPr>
-        <p:txBody>
-          <a:bodyPr wrap="square" rtlCol="0">
-            <a:spAutoFit/>
-          </a:bodyPr>
-          <a:lstStyle/>
-          <a:p>
-            <a:r>
-              <a:rPr lang="en-US" sz="2000" b="1" dirty="0">
-                <a:solidFill>
-                  <a:srgbClr val="002060"/>
-                </a:solidFill>
-                <a:latin typeface="DM Sans" pitchFamily="2" charset="0"/>
-              </a:rPr>
-              <a:t>2020 Volume Surge</a:t>
-            </a:r>
-            <a:r>
-              <a:rPr lang="en-US" sz="2000" dirty="0">
-                <a:solidFill>
-                  <a:srgbClr val="002060"/>
-                </a:solidFill>
-                <a:latin typeface="DM Sans" pitchFamily="2" charset="0"/>
-              </a:rPr>
-              <a:t>: 2020 volumes were consistently higher than 2019, confirming that COVID-19 significantly increased peak season parcel demand.</a:t>
-            </a:r>
-          </a:p>
-          <a:p>
-            <a:r>
-              <a:rPr lang="en-US" sz="2000" b="1" dirty="0">
-                <a:solidFill>
-                  <a:srgbClr val="002060"/>
-                </a:solidFill>
-                <a:latin typeface="DM Sans" pitchFamily="2" charset="0"/>
-              </a:rPr>
-              <a:t>Strategic Insight</a:t>
-            </a:r>
-            <a:r>
-              <a:rPr lang="en-US" sz="2000" dirty="0">
-                <a:solidFill>
-                  <a:srgbClr val="002060"/>
-                </a:solidFill>
-                <a:latin typeface="DM Sans" pitchFamily="2" charset="0"/>
-              </a:rPr>
-              <a:t>: ABC should expect a higher baseline post-pandemic due to accelerated customer habit formation (Shift to online shopping) </a:t>
-            </a:r>
-          </a:p>
-        </p:txBody>
-      </p:sp>
-      <p:sp>
-        <p:nvSpPr>
-          <p:cNvPr id="2" name="TextBox 1">
-            <a:extLst>
-              <a:ext uri="{FF2B5EF4-FFF2-40B4-BE49-F238E27FC236}">
-                <a16:creationId xmlns:a16="http://schemas.microsoft.com/office/drawing/2014/main" id="{09AC2C4C-5658-9379-CBDB-D364CA316EAB}"/>
-              </a:ext>
-            </a:extLst>
-          </p:cNvPr>
-          <p:cNvSpPr txBox="1"/>
-          <p:nvPr/>
-        </p:nvSpPr>
-        <p:spPr>
-          <a:xfrm>
-            <a:off x="684042" y="277409"/>
-            <a:ext cx="10059164" cy="638636"/>
-          </a:xfrm>
-          <a:prstGeom prst="rect">
-            <a:avLst/>
-          </a:prstGeom>
-          <a:noFill/>
-        </p:spPr>
-        <p:txBody>
-          <a:bodyPr wrap="none" rtlCol="0">
-            <a:spAutoFit/>
-          </a:bodyPr>
-          <a:lstStyle/>
-          <a:p>
-            <a:r>
-              <a:rPr lang="en-US" sz="3550" b="1" dirty="0">
-                <a:solidFill>
-                  <a:srgbClr val="002060"/>
-                </a:solidFill>
-                <a:latin typeface="Libre Baskerville" pitchFamily="34" charset="0"/>
-              </a:rPr>
-              <a:t>COVID-19’s Impact on 2020 Peak Season</a:t>
-            </a:r>
-          </a:p>
-        </p:txBody>
-      </p:sp>
     </p:spTree>
     <p:extLst>
       <p:ext uri="{BB962C8B-B14F-4D97-AF65-F5344CB8AC3E}">
-        <p14:creationId xmlns:p14="http://schemas.microsoft.com/office/powerpoint/2010/main" val="1806358773"/>
+        <p14:creationId xmlns:p14="http://schemas.microsoft.com/office/powerpoint/2010/main" val="1400347811"/>
       </p:ext>
     </p:extLst>
   </p:cSld>
@@ -9289,7 +10495,13 @@
     </p:bg>
     <p:spTree>
       <p:nvGrpSpPr>
-        <p:cNvPr id="1" name=""/>
+        <p:cNvPr id="1" name="">
+          <a:extLst>
+            <a:ext uri="{FF2B5EF4-FFF2-40B4-BE49-F238E27FC236}">
+              <a16:creationId xmlns:a16="http://schemas.microsoft.com/office/drawing/2014/main" id="{60510960-F2C1-D06A-FC2A-8EBE84EC2DD9}"/>
+            </a:ext>
+          </a:extLst>
+        </p:cNvPr>
         <p:cNvGrpSpPr/>
         <p:nvPr/>
       </p:nvGrpSpPr>
@@ -9303,10 +10515,10 @@
       </p:grpSpPr>
       <p:sp>
         <p:nvSpPr>
-          <p:cNvPr id="4" name="TextBox 3">
+          <p:cNvPr id="2" name="TextBox 1">
             <a:extLst>
               <a:ext uri="{FF2B5EF4-FFF2-40B4-BE49-F238E27FC236}">
-                <a16:creationId xmlns:a16="http://schemas.microsoft.com/office/drawing/2014/main" id="{090E51ED-40D4-12C4-31B5-3D9578A51C8F}"/>
+                <a16:creationId xmlns:a16="http://schemas.microsoft.com/office/drawing/2014/main" id="{6DFFABA4-17A9-52D3-D3F2-C53FF6F40E0D}"/>
               </a:ext>
             </a:extLst>
           </p:cNvPr>
@@ -9315,108 +10527,8 @@
         </p:nvSpPr>
         <p:spPr>
           <a:xfrm>
-            <a:off x="261108" y="5654645"/>
-            <a:ext cx="13972250" cy="2246769"/>
-          </a:xfrm>
-          <a:prstGeom prst="rect">
-            <a:avLst/>
-          </a:prstGeom>
-          <a:noFill/>
-        </p:spPr>
-        <p:txBody>
-          <a:bodyPr wrap="square" rtlCol="0">
-            <a:spAutoFit/>
-          </a:bodyPr>
-          <a:lstStyle/>
-          <a:p>
-            <a:r>
-              <a:rPr lang="en-US" sz="2000" b="1" dirty="0">
-                <a:solidFill>
-                  <a:srgbClr val="002060"/>
-                </a:solidFill>
-                <a:latin typeface="DM Sans" pitchFamily="2" charset="0"/>
-              </a:rPr>
-              <a:t>Small Customers</a:t>
-            </a:r>
-            <a:r>
-              <a:rPr lang="en-US" sz="2000" dirty="0">
-                <a:solidFill>
-                  <a:srgbClr val="002060"/>
-                </a:solidFill>
-                <a:latin typeface="DM Sans" pitchFamily="2" charset="0"/>
-              </a:rPr>
-              <a:t>: Experienced a substantial decline (-15.96%), suggesting they were disproportionately impacted by the pandemic (closures/consolidation).</a:t>
-            </a:r>
-          </a:p>
-          <a:p>
-            <a:r>
-              <a:rPr lang="en-US" sz="2000" b="1" dirty="0">
-                <a:solidFill>
-                  <a:srgbClr val="002060"/>
-                </a:solidFill>
-                <a:latin typeface="DM Sans" pitchFamily="2" charset="0"/>
-              </a:rPr>
-              <a:t>Medium Customers</a:t>
-            </a:r>
-            <a:r>
-              <a:rPr lang="en-US" sz="2000" dirty="0">
-                <a:solidFill>
-                  <a:srgbClr val="002060"/>
-                </a:solidFill>
-                <a:latin typeface="DM Sans" pitchFamily="2" charset="0"/>
-              </a:rPr>
-              <a:t>: showed significant growth (+6%).</a:t>
-            </a:r>
-          </a:p>
-          <a:p>
-            <a:r>
-              <a:rPr lang="en-US" sz="2000" b="1" dirty="0">
-                <a:solidFill>
-                  <a:srgbClr val="002060"/>
-                </a:solidFill>
-                <a:latin typeface="DM Sans" pitchFamily="2" charset="0"/>
-              </a:rPr>
-              <a:t>Large Customers</a:t>
-            </a:r>
-            <a:r>
-              <a:rPr lang="en-US" sz="2000" dirty="0">
-                <a:solidFill>
-                  <a:srgbClr val="002060"/>
-                </a:solidFill>
-                <a:latin typeface="DM Sans" pitchFamily="2" charset="0"/>
-              </a:rPr>
-              <a:t>: the highest percentage growth (+0.67%), confirming volume acquisition in the higher-tier segments.</a:t>
-            </a:r>
-          </a:p>
-          <a:p>
-            <a:r>
-              <a:rPr lang="en-US" sz="2000" dirty="0">
-                <a:solidFill>
-                  <a:srgbClr val="002060"/>
-                </a:solidFill>
-                <a:latin typeface="DM Sans" pitchFamily="2" charset="0"/>
-              </a:rPr>
-              <a:t>A new segment of customer emerged in 2020 which we categorized as others. They had volumes lower than 1k and they contributed 9.1% of 2020 volumes.</a:t>
-            </a:r>
-          </a:p>
-        </p:txBody>
-      </p:sp>
-      <p:sp>
-        <p:nvSpPr>
-          <p:cNvPr id="2" name="TextBox 1">
-            <a:extLst>
-              <a:ext uri="{FF2B5EF4-FFF2-40B4-BE49-F238E27FC236}">
-                <a16:creationId xmlns:a16="http://schemas.microsoft.com/office/drawing/2014/main" id="{02E72C60-E9CB-362B-BB50-BF13500114A3}"/>
-              </a:ext>
-            </a:extLst>
-          </p:cNvPr>
-          <p:cNvSpPr txBox="1"/>
-          <p:nvPr/>
-        </p:nvSpPr>
-        <p:spPr>
-          <a:xfrm>
-            <a:off x="349984" y="161372"/>
-            <a:ext cx="12181540" cy="638636"/>
+            <a:off x="458268" y="328186"/>
+            <a:ext cx="11469807" cy="638636"/>
           </a:xfrm>
           <a:prstGeom prst="rect">
             <a:avLst/>
@@ -9436,17 +10548,170 @@
                 </a:solidFill>
                 <a:latin typeface="Libre Baskerville" pitchFamily="34" charset="0"/>
               </a:rPr>
-              <a:t>Pandemic Effects Across Customer Segments (1/2)</a:t>
+              <a:t>Pandemic Effects Across Customer Segments </a:t>
+            </a:r>
+          </a:p>
+        </p:txBody>
+      </p:sp>
+      <p:sp>
+        <p:nvSpPr>
+          <p:cNvPr id="6" name="Rectangle 5">
+            <a:extLst>
+              <a:ext uri="{FF2B5EF4-FFF2-40B4-BE49-F238E27FC236}">
+                <a16:creationId xmlns:a16="http://schemas.microsoft.com/office/drawing/2014/main" id="{91A47D82-1C45-34A2-6595-1000DB0CEAAA}"/>
+              </a:ext>
+            </a:extLst>
+          </p:cNvPr>
+          <p:cNvSpPr/>
+          <p:nvPr/>
+        </p:nvSpPr>
+        <p:spPr>
+          <a:xfrm>
+            <a:off x="9010028" y="1312812"/>
+            <a:ext cx="5233736" cy="6424862"/>
+          </a:xfrm>
+          <a:prstGeom prst="rect">
+            <a:avLst/>
+          </a:prstGeom>
+          <a:solidFill>
+            <a:schemeClr val="bg1"/>
+          </a:solidFill>
+          <a:ln>
+            <a:solidFill>
+              <a:schemeClr val="bg1"/>
+            </a:solidFill>
+          </a:ln>
+        </p:spPr>
+        <p:style>
+          <a:lnRef idx="2">
+            <a:schemeClr val="accent1">
+              <a:shade val="15000"/>
+            </a:schemeClr>
+          </a:lnRef>
+          <a:fillRef idx="1">
+            <a:schemeClr val="accent1"/>
+          </a:fillRef>
+          <a:effectRef idx="0">
+            <a:schemeClr val="accent1"/>
+          </a:effectRef>
+          <a:fontRef idx="minor">
+            <a:schemeClr val="lt1"/>
+          </a:fontRef>
+        </p:style>
+        <p:txBody>
+          <a:bodyPr rtlCol="0" anchor="ctr"/>
+          <a:lstStyle/>
+          <a:p>
+            <a:r>
+              <a:rPr lang="en-US" sz="2000" b="1" dirty="0">
+                <a:solidFill>
+                  <a:srgbClr val="002060"/>
+                </a:solidFill>
+                <a:latin typeface="DM Sans" pitchFamily="2" charset="0"/>
+              </a:rPr>
+              <a:t>Large Customers</a:t>
+            </a:r>
+            <a:r>
+              <a:rPr lang="en-US" sz="2000" dirty="0">
+                <a:solidFill>
+                  <a:srgbClr val="002060"/>
+                </a:solidFill>
+                <a:latin typeface="DM Sans" pitchFamily="2" charset="0"/>
+              </a:rPr>
+              <a:t>: the highest percentage growth (+47%), confirming volume acquisition in the higher-tier segments.</a:t>
+            </a:r>
+          </a:p>
+          <a:p>
+            <a:endParaRPr lang="en-US" sz="2000" dirty="0">
+              <a:solidFill>
+                <a:srgbClr val="002060"/>
+              </a:solidFill>
+              <a:latin typeface="DM Sans" pitchFamily="2" charset="0"/>
+            </a:endParaRPr>
+          </a:p>
+          <a:p>
+            <a:endParaRPr lang="en-US" sz="2000" dirty="0">
+              <a:solidFill>
+                <a:srgbClr val="002060"/>
+              </a:solidFill>
+              <a:latin typeface="DM Sans" pitchFamily="2" charset="0"/>
+            </a:endParaRPr>
+          </a:p>
+          <a:p>
+            <a:r>
+              <a:rPr lang="en-US" sz="2000" b="1" dirty="0">
+                <a:solidFill>
+                  <a:srgbClr val="002060"/>
+                </a:solidFill>
+                <a:latin typeface="DM Sans" pitchFamily="2" charset="0"/>
+              </a:rPr>
+              <a:t>Medium &amp; Enterprise Customers</a:t>
+            </a:r>
+            <a:r>
+              <a:rPr lang="en-US" sz="2000" dirty="0">
+                <a:solidFill>
+                  <a:srgbClr val="002060"/>
+                </a:solidFill>
+                <a:latin typeface="DM Sans" pitchFamily="2" charset="0"/>
+              </a:rPr>
+              <a:t>: showed significant growth (34% and 17% respectively).</a:t>
+            </a:r>
+          </a:p>
+          <a:p>
+            <a:endParaRPr lang="en-US" sz="2000" dirty="0">
+              <a:solidFill>
+                <a:srgbClr val="002060"/>
+              </a:solidFill>
+              <a:latin typeface="DM Sans" pitchFamily="2" charset="0"/>
+            </a:endParaRPr>
+          </a:p>
+          <a:p>
+            <a:r>
+              <a:rPr lang="en-US" sz="2000" b="1" dirty="0">
+                <a:solidFill>
+                  <a:srgbClr val="002060"/>
+                </a:solidFill>
+                <a:latin typeface="DM Sans" pitchFamily="2" charset="0"/>
+              </a:rPr>
+              <a:t>Small Customers</a:t>
+            </a:r>
+            <a:r>
+              <a:rPr lang="en-US" sz="2000" dirty="0">
+                <a:solidFill>
+                  <a:srgbClr val="002060"/>
+                </a:solidFill>
+                <a:latin typeface="DM Sans" pitchFamily="2" charset="0"/>
+              </a:rPr>
+              <a:t>: Experienced a substantial decline (-15.96%), suggesting they were disproportionately impacted by the pandemic (closures/consolidation).</a:t>
+            </a:r>
+          </a:p>
+          <a:p>
+            <a:endParaRPr lang="en-US" sz="2000" dirty="0">
+              <a:solidFill>
+                <a:srgbClr val="002060"/>
+              </a:solidFill>
+              <a:latin typeface="DM Sans" pitchFamily="2" charset="0"/>
+            </a:endParaRPr>
+          </a:p>
+          <a:p>
+            <a:r>
+              <a:rPr lang="en-US" sz="2000" dirty="0">
+                <a:solidFill>
+                  <a:srgbClr val="002060"/>
+                </a:solidFill>
+                <a:latin typeface="DM Sans" pitchFamily="2" charset="0"/>
+              </a:rPr>
+              <a:t>A new segment of customer emerged in 2020 which we categorized as others. They had volumes lower than 1k and they contributed 9.1% of 2020 volumes.</a:t>
             </a:r>
           </a:p>
         </p:txBody>
       </p:sp>
       <p:pic>
         <p:nvPicPr>
-          <p:cNvPr id="10" name="Picture 9" descr="A pie chart with numbers and a number of percentages&#10;&#10;AI-generated content may be incorrect.">
+          <p:cNvPr id="15" name="Picture 14">
             <a:extLst>
               <a:ext uri="{FF2B5EF4-FFF2-40B4-BE49-F238E27FC236}">
-                <a16:creationId xmlns:a16="http://schemas.microsoft.com/office/drawing/2014/main" id="{A1D69358-C36D-4B8D-77A3-C2116FFA4AB3}"/>
+                <a16:creationId xmlns:a16="http://schemas.microsoft.com/office/drawing/2014/main" id="{2027D207-41EA-27E9-ED9F-8D6ED5017409}"/>
               </a:ext>
             </a:extLst>
           </p:cNvPr>
@@ -9463,38 +10728,8 @@
         </p:blipFill>
         <p:spPr>
           <a:xfrm>
-            <a:off x="6460958" y="957444"/>
-            <a:ext cx="8073189" cy="4576702"/>
-          </a:xfrm>
-          <a:prstGeom prst="rect">
-            <a:avLst/>
-          </a:prstGeom>
-        </p:spPr>
-      </p:pic>
-      <p:pic>
-        <p:nvPicPr>
-          <p:cNvPr id="14" name="Picture 13" descr="A pie chart with numbers and a number of percentages&#10;&#10;AI-generated content may be incorrect.">
-            <a:extLst>
-              <a:ext uri="{FF2B5EF4-FFF2-40B4-BE49-F238E27FC236}">
-                <a16:creationId xmlns:a16="http://schemas.microsoft.com/office/drawing/2014/main" id="{DFA64C60-AFE2-F994-D3C4-D35BE61BD365}"/>
-              </a:ext>
-            </a:extLst>
-          </p:cNvPr>
-          <p:cNvPicPr>
-            <a:picLocks noChangeAspect="1"/>
-          </p:cNvPicPr>
-          <p:nvPr/>
-        </p:nvPicPr>
-        <p:blipFill>
-          <a:blip r:embed="rId3"/>
-          <a:stretch>
-            <a:fillRect/>
-          </a:stretch>
-        </p:blipFill>
-        <p:spPr>
-          <a:xfrm>
-            <a:off x="261108" y="920507"/>
-            <a:ext cx="6217087" cy="4553917"/>
+            <a:off x="675983" y="2321754"/>
+            <a:ext cx="7872932" cy="3102861"/>
           </a:xfrm>
           <a:prstGeom prst="rect">
             <a:avLst/>
@@ -9504,7 +10739,7 @@
     </p:spTree>
     <p:extLst>
       <p:ext uri="{BB962C8B-B14F-4D97-AF65-F5344CB8AC3E}">
-        <p14:creationId xmlns:p14="http://schemas.microsoft.com/office/powerpoint/2010/main" val="2952070450"/>
+        <p14:creationId xmlns:p14="http://schemas.microsoft.com/office/powerpoint/2010/main" val="2787815850"/>
       </p:ext>
     </p:extLst>
   </p:cSld>

</xml_diff>